<commit_message>
almost done presentation and speach
</commit_message>
<xml_diff>
--- a/ВКР/Презентация/ПронинАС_ВКР_презентация.pptx
+++ b/ВКР/Презентация/ПронинАС_ВКР_презентация.pptx
@@ -5,21 +5,25 @@
     <p:sldMasterId id="2147483648" r:id="rId1"/>
   </p:sldMasterIdLst>
   <p:notesMasterIdLst>
-    <p:notesMasterId r:id="rId14"/>
+    <p:notesMasterId r:id="rId18"/>
   </p:notesMasterIdLst>
   <p:sldIdLst>
     <p:sldId id="256" r:id="rId2"/>
-    <p:sldId id="296" r:id="rId3"/>
-    <p:sldId id="293" r:id="rId4"/>
+    <p:sldId id="304" r:id="rId3"/>
+    <p:sldId id="296" r:id="rId4"/>
     <p:sldId id="282" r:id="rId5"/>
-    <p:sldId id="297" r:id="rId6"/>
-    <p:sldId id="298" r:id="rId7"/>
-    <p:sldId id="302" r:id="rId8"/>
-    <p:sldId id="303" r:id="rId9"/>
-    <p:sldId id="299" r:id="rId10"/>
-    <p:sldId id="300" r:id="rId11"/>
-    <p:sldId id="266" r:id="rId12"/>
-    <p:sldId id="301" r:id="rId13"/>
+    <p:sldId id="293" r:id="rId6"/>
+    <p:sldId id="297" r:id="rId7"/>
+    <p:sldId id="307" r:id="rId8"/>
+    <p:sldId id="298" r:id="rId9"/>
+    <p:sldId id="309" r:id="rId10"/>
+    <p:sldId id="302" r:id="rId11"/>
+    <p:sldId id="303" r:id="rId12"/>
+    <p:sldId id="308" r:id="rId13"/>
+    <p:sldId id="306" r:id="rId14"/>
+    <p:sldId id="305" r:id="rId15"/>
+    <p:sldId id="266" r:id="rId16"/>
+    <p:sldId id="301" r:id="rId17"/>
   </p:sldIdLst>
   <p:sldSz cx="12192000" cy="6858000"/>
   <p:notesSz cx="6858000" cy="9144000"/>
@@ -208,7 +212,7 @@
           <a:p>
             <a:fld id="{A1FA72BB-6139-4A02-8082-35B9C9D89E0C}" type="datetimeFigureOut">
               <a:rPr lang="ru-RU" smtClean="0"/>
-              <a:t>25.05.2023</a:t>
+              <a:t>26.05.2023</a:t>
             </a:fld>
             <a:endParaRPr lang="ru-RU"/>
           </a:p>
@@ -549,7 +553,343 @@
     </p:spTree>
     <p:extLst>
       <p:ext uri="{BB962C8B-B14F-4D97-AF65-F5344CB8AC3E}">
-        <p14:creationId xmlns:p14="http://schemas.microsoft.com/office/powerpoint/2010/main" val="4025421042"/>
+        <p14:creationId xmlns:p14="http://schemas.microsoft.com/office/powerpoint/2010/main" val="2736747403"/>
+      </p:ext>
+    </p:extLst>
+  </p:cSld>
+  <p:clrMapOvr>
+    <a:masterClrMapping/>
+  </p:clrMapOvr>
+</p:notes>
+</file>
+
+<file path=ppt/notesSlides/notesSlide10.xml><?xml version="1.0" encoding="utf-8"?>
+<p:notes xmlns:a="http://schemas.openxmlformats.org/drawingml/2006/main" xmlns:r="http://schemas.openxmlformats.org/officeDocument/2006/relationships" xmlns:p="http://schemas.openxmlformats.org/presentationml/2006/main">
+  <p:cSld>
+    <p:spTree>
+      <p:nvGrpSpPr>
+        <p:cNvPr id="1" name=""/>
+        <p:cNvGrpSpPr/>
+        <p:nvPr/>
+      </p:nvGrpSpPr>
+      <p:grpSpPr>
+        <a:xfrm>
+          <a:off x="0" y="0"/>
+          <a:ext cx="0" cy="0"/>
+          <a:chOff x="0" y="0"/>
+          <a:chExt cx="0" cy="0"/>
+        </a:xfrm>
+      </p:grpSpPr>
+      <p:sp>
+        <p:nvSpPr>
+          <p:cNvPr id="2" name="Образ слайда 1"/>
+          <p:cNvSpPr>
+            <a:spLocks noGrp="1" noRot="1" noChangeAspect="1"/>
+          </p:cNvSpPr>
+          <p:nvPr>
+            <p:ph type="sldImg"/>
+          </p:nvPr>
+        </p:nvSpPr>
+        <p:spPr/>
+      </p:sp>
+      <p:sp>
+        <p:nvSpPr>
+          <p:cNvPr id="3" name="Заметки 2"/>
+          <p:cNvSpPr>
+            <a:spLocks noGrp="1"/>
+          </p:cNvSpPr>
+          <p:nvPr>
+            <p:ph type="body" idx="1"/>
+          </p:nvPr>
+        </p:nvSpPr>
+        <p:spPr/>
+        <p:txBody>
+          <a:bodyPr/>
+          <a:lstStyle/>
+          <a:p>
+            <a:endParaRPr lang="ru-RU" dirty="0"/>
+          </a:p>
+        </p:txBody>
+      </p:sp>
+      <p:sp>
+        <p:nvSpPr>
+          <p:cNvPr id="4" name="Номер слайда 3"/>
+          <p:cNvSpPr>
+            <a:spLocks noGrp="1"/>
+          </p:cNvSpPr>
+          <p:nvPr>
+            <p:ph type="sldNum" sz="quarter" idx="5"/>
+          </p:nvPr>
+        </p:nvSpPr>
+        <p:spPr/>
+        <p:txBody>
+          <a:bodyPr/>
+          <a:lstStyle/>
+          <a:p>
+            <a:fld id="{E3BF92F7-6176-4844-94CE-FF1FD83770F1}" type="slidenum">
+              <a:rPr lang="ru-RU" smtClean="0"/>
+              <a:t>13</a:t>
+            </a:fld>
+            <a:endParaRPr lang="ru-RU"/>
+          </a:p>
+        </p:txBody>
+      </p:sp>
+    </p:spTree>
+    <p:extLst>
+      <p:ext uri="{BB962C8B-B14F-4D97-AF65-F5344CB8AC3E}">
+        <p14:creationId xmlns:p14="http://schemas.microsoft.com/office/powerpoint/2010/main" val="869867913"/>
+      </p:ext>
+    </p:extLst>
+  </p:cSld>
+  <p:clrMapOvr>
+    <a:masterClrMapping/>
+  </p:clrMapOvr>
+</p:notes>
+</file>
+
+<file path=ppt/notesSlides/notesSlide11.xml><?xml version="1.0" encoding="utf-8"?>
+<p:notes xmlns:a="http://schemas.openxmlformats.org/drawingml/2006/main" xmlns:r="http://schemas.openxmlformats.org/officeDocument/2006/relationships" xmlns:p="http://schemas.openxmlformats.org/presentationml/2006/main">
+  <p:cSld>
+    <p:spTree>
+      <p:nvGrpSpPr>
+        <p:cNvPr id="1" name=""/>
+        <p:cNvGrpSpPr/>
+        <p:nvPr/>
+      </p:nvGrpSpPr>
+      <p:grpSpPr>
+        <a:xfrm>
+          <a:off x="0" y="0"/>
+          <a:ext cx="0" cy="0"/>
+          <a:chOff x="0" y="0"/>
+          <a:chExt cx="0" cy="0"/>
+        </a:xfrm>
+      </p:grpSpPr>
+      <p:sp>
+        <p:nvSpPr>
+          <p:cNvPr id="2" name="Образ слайда 1"/>
+          <p:cNvSpPr>
+            <a:spLocks noGrp="1" noRot="1" noChangeAspect="1"/>
+          </p:cNvSpPr>
+          <p:nvPr>
+            <p:ph type="sldImg"/>
+          </p:nvPr>
+        </p:nvSpPr>
+        <p:spPr/>
+      </p:sp>
+      <p:sp>
+        <p:nvSpPr>
+          <p:cNvPr id="3" name="Заметки 2"/>
+          <p:cNvSpPr>
+            <a:spLocks noGrp="1"/>
+          </p:cNvSpPr>
+          <p:nvPr>
+            <p:ph type="body" idx="1"/>
+          </p:nvPr>
+        </p:nvSpPr>
+        <p:spPr/>
+        <p:txBody>
+          <a:bodyPr/>
+          <a:lstStyle/>
+          <a:p>
+            <a:endParaRPr lang="ru-RU" dirty="0"/>
+          </a:p>
+        </p:txBody>
+      </p:sp>
+      <p:sp>
+        <p:nvSpPr>
+          <p:cNvPr id="4" name="Номер слайда 3"/>
+          <p:cNvSpPr>
+            <a:spLocks noGrp="1"/>
+          </p:cNvSpPr>
+          <p:nvPr>
+            <p:ph type="sldNum" sz="quarter" idx="5"/>
+          </p:nvPr>
+        </p:nvSpPr>
+        <p:spPr/>
+        <p:txBody>
+          <a:bodyPr/>
+          <a:lstStyle/>
+          <a:p>
+            <a:fld id="{E3BF92F7-6176-4844-94CE-FF1FD83770F1}" type="slidenum">
+              <a:rPr lang="ru-RU" smtClean="0"/>
+              <a:t>14</a:t>
+            </a:fld>
+            <a:endParaRPr lang="ru-RU"/>
+          </a:p>
+        </p:txBody>
+      </p:sp>
+    </p:spTree>
+    <p:extLst>
+      <p:ext uri="{BB962C8B-B14F-4D97-AF65-F5344CB8AC3E}">
+        <p14:creationId xmlns:p14="http://schemas.microsoft.com/office/powerpoint/2010/main" val="593661695"/>
+      </p:ext>
+    </p:extLst>
+  </p:cSld>
+  <p:clrMapOvr>
+    <a:masterClrMapping/>
+  </p:clrMapOvr>
+</p:notes>
+</file>
+
+<file path=ppt/notesSlides/notesSlide12.xml><?xml version="1.0" encoding="utf-8"?>
+<p:notes xmlns:a="http://schemas.openxmlformats.org/drawingml/2006/main" xmlns:r="http://schemas.openxmlformats.org/officeDocument/2006/relationships" xmlns:p="http://schemas.openxmlformats.org/presentationml/2006/main">
+  <p:cSld>
+    <p:spTree>
+      <p:nvGrpSpPr>
+        <p:cNvPr id="1" name=""/>
+        <p:cNvGrpSpPr/>
+        <p:nvPr/>
+      </p:nvGrpSpPr>
+      <p:grpSpPr>
+        <a:xfrm>
+          <a:off x="0" y="0"/>
+          <a:ext cx="0" cy="0"/>
+          <a:chOff x="0" y="0"/>
+          <a:chExt cx="0" cy="0"/>
+        </a:xfrm>
+      </p:grpSpPr>
+      <p:sp>
+        <p:nvSpPr>
+          <p:cNvPr id="2" name="Образ слайда 1"/>
+          <p:cNvSpPr>
+            <a:spLocks noGrp="1" noRot="1" noChangeAspect="1"/>
+          </p:cNvSpPr>
+          <p:nvPr>
+            <p:ph type="sldImg"/>
+          </p:nvPr>
+        </p:nvSpPr>
+        <p:spPr/>
+      </p:sp>
+      <p:sp>
+        <p:nvSpPr>
+          <p:cNvPr id="3" name="Заметки 2"/>
+          <p:cNvSpPr>
+            <a:spLocks noGrp="1"/>
+          </p:cNvSpPr>
+          <p:nvPr>
+            <p:ph type="body" idx="1"/>
+          </p:nvPr>
+        </p:nvSpPr>
+        <p:spPr/>
+        <p:txBody>
+          <a:bodyPr/>
+          <a:lstStyle/>
+          <a:p>
+            <a:endParaRPr lang="ru-RU" dirty="0"/>
+          </a:p>
+        </p:txBody>
+      </p:sp>
+      <p:sp>
+        <p:nvSpPr>
+          <p:cNvPr id="4" name="Номер слайда 3"/>
+          <p:cNvSpPr>
+            <a:spLocks noGrp="1"/>
+          </p:cNvSpPr>
+          <p:nvPr>
+            <p:ph type="sldNum" sz="quarter" idx="5"/>
+          </p:nvPr>
+        </p:nvSpPr>
+        <p:spPr/>
+        <p:txBody>
+          <a:bodyPr/>
+          <a:lstStyle/>
+          <a:p>
+            <a:fld id="{E3BF92F7-6176-4844-94CE-FF1FD83770F1}" type="slidenum">
+              <a:rPr lang="ru-RU" smtClean="0"/>
+              <a:t>15</a:t>
+            </a:fld>
+            <a:endParaRPr lang="ru-RU"/>
+          </a:p>
+        </p:txBody>
+      </p:sp>
+    </p:spTree>
+    <p:extLst>
+      <p:ext uri="{BB962C8B-B14F-4D97-AF65-F5344CB8AC3E}">
+        <p14:creationId xmlns:p14="http://schemas.microsoft.com/office/powerpoint/2010/main" val="1687902653"/>
+      </p:ext>
+    </p:extLst>
+  </p:cSld>
+  <p:clrMapOvr>
+    <a:masterClrMapping/>
+  </p:clrMapOvr>
+</p:notes>
+</file>
+
+<file path=ppt/notesSlides/notesSlide13.xml><?xml version="1.0" encoding="utf-8"?>
+<p:notes xmlns:a="http://schemas.openxmlformats.org/drawingml/2006/main" xmlns:r="http://schemas.openxmlformats.org/officeDocument/2006/relationships" xmlns:p="http://schemas.openxmlformats.org/presentationml/2006/main">
+  <p:cSld>
+    <p:spTree>
+      <p:nvGrpSpPr>
+        <p:cNvPr id="1" name=""/>
+        <p:cNvGrpSpPr/>
+        <p:nvPr/>
+      </p:nvGrpSpPr>
+      <p:grpSpPr>
+        <a:xfrm>
+          <a:off x="0" y="0"/>
+          <a:ext cx="0" cy="0"/>
+          <a:chOff x="0" y="0"/>
+          <a:chExt cx="0" cy="0"/>
+        </a:xfrm>
+      </p:grpSpPr>
+      <p:sp>
+        <p:nvSpPr>
+          <p:cNvPr id="2" name="Образ слайда 1"/>
+          <p:cNvSpPr>
+            <a:spLocks noGrp="1" noRot="1" noChangeAspect="1"/>
+          </p:cNvSpPr>
+          <p:nvPr>
+            <p:ph type="sldImg"/>
+          </p:nvPr>
+        </p:nvSpPr>
+        <p:spPr/>
+      </p:sp>
+      <p:sp>
+        <p:nvSpPr>
+          <p:cNvPr id="3" name="Заметки 2"/>
+          <p:cNvSpPr>
+            <a:spLocks noGrp="1"/>
+          </p:cNvSpPr>
+          <p:nvPr>
+            <p:ph type="body" idx="1"/>
+          </p:nvPr>
+        </p:nvSpPr>
+        <p:spPr/>
+        <p:txBody>
+          <a:bodyPr/>
+          <a:lstStyle/>
+          <a:p>
+            <a:endParaRPr lang="ru-RU" dirty="0"/>
+          </a:p>
+        </p:txBody>
+      </p:sp>
+      <p:sp>
+        <p:nvSpPr>
+          <p:cNvPr id="4" name="Номер слайда 3"/>
+          <p:cNvSpPr>
+            <a:spLocks noGrp="1"/>
+          </p:cNvSpPr>
+          <p:nvPr>
+            <p:ph type="sldNum" sz="quarter" idx="5"/>
+          </p:nvPr>
+        </p:nvSpPr>
+        <p:spPr/>
+        <p:txBody>
+          <a:bodyPr/>
+          <a:lstStyle/>
+          <a:p>
+            <a:fld id="{E3BF92F7-6176-4844-94CE-FF1FD83770F1}" type="slidenum">
+              <a:rPr lang="ru-RU" smtClean="0"/>
+              <a:t>16</a:t>
+            </a:fld>
+            <a:endParaRPr lang="ru-RU"/>
+          </a:p>
+        </p:txBody>
+      </p:sp>
+    </p:spTree>
+    <p:extLst>
+      <p:ext uri="{BB962C8B-B14F-4D97-AF65-F5344CB8AC3E}">
+        <p14:creationId xmlns:p14="http://schemas.microsoft.com/office/powerpoint/2010/main" val="442648345"/>
       </p:ext>
     </p:extLst>
   </p:cSld>
@@ -624,7 +964,7 @@
           <a:p>
             <a:fld id="{E3BF92F7-6176-4844-94CE-FF1FD83770F1}" type="slidenum">
               <a:rPr lang="ru-RU" smtClean="0"/>
-              <a:t>5</a:t>
+              <a:t>3</a:t>
             </a:fld>
             <a:endParaRPr lang="ru-RU"/>
           </a:p>
@@ -633,7 +973,7 @@
     </p:spTree>
     <p:extLst>
       <p:ext uri="{BB962C8B-B14F-4D97-AF65-F5344CB8AC3E}">
-        <p14:creationId xmlns:p14="http://schemas.microsoft.com/office/powerpoint/2010/main" val="4293579522"/>
+        <p14:creationId xmlns:p14="http://schemas.microsoft.com/office/powerpoint/2010/main" val="4025421042"/>
       </p:ext>
     </p:extLst>
   </p:cSld>
@@ -717,7 +1057,7 @@
     </p:spTree>
     <p:extLst>
       <p:ext uri="{BB962C8B-B14F-4D97-AF65-F5344CB8AC3E}">
-        <p14:creationId xmlns:p14="http://schemas.microsoft.com/office/powerpoint/2010/main" val="1917486223"/>
+        <p14:creationId xmlns:p14="http://schemas.microsoft.com/office/powerpoint/2010/main" val="4293579522"/>
       </p:ext>
     </p:extLst>
   </p:cSld>
@@ -801,7 +1141,7 @@
     </p:spTree>
     <p:extLst>
       <p:ext uri="{BB962C8B-B14F-4D97-AF65-F5344CB8AC3E}">
-        <p14:creationId xmlns:p14="http://schemas.microsoft.com/office/powerpoint/2010/main" val="2640042963"/>
+        <p14:creationId xmlns:p14="http://schemas.microsoft.com/office/powerpoint/2010/main" val="1171195830"/>
       </p:ext>
     </p:extLst>
   </p:cSld>
@@ -885,7 +1225,7 @@
     </p:spTree>
     <p:extLst>
       <p:ext uri="{BB962C8B-B14F-4D97-AF65-F5344CB8AC3E}">
-        <p14:creationId xmlns:p14="http://schemas.microsoft.com/office/powerpoint/2010/main" val="3348031459"/>
+        <p14:creationId xmlns:p14="http://schemas.microsoft.com/office/powerpoint/2010/main" val="1917486223"/>
       </p:ext>
     </p:extLst>
   </p:cSld>
@@ -969,7 +1309,7 @@
     </p:spTree>
     <p:extLst>
       <p:ext uri="{BB962C8B-B14F-4D97-AF65-F5344CB8AC3E}">
-        <p14:creationId xmlns:p14="http://schemas.microsoft.com/office/powerpoint/2010/main" val="1135437258"/>
+        <p14:creationId xmlns:p14="http://schemas.microsoft.com/office/powerpoint/2010/main" val="1031094145"/>
       </p:ext>
     </p:extLst>
   </p:cSld>
@@ -1053,7 +1393,7 @@
     </p:spTree>
     <p:extLst>
       <p:ext uri="{BB962C8B-B14F-4D97-AF65-F5344CB8AC3E}">
-        <p14:creationId xmlns:p14="http://schemas.microsoft.com/office/powerpoint/2010/main" val="2759279327"/>
+        <p14:creationId xmlns:p14="http://schemas.microsoft.com/office/powerpoint/2010/main" val="2640042963"/>
       </p:ext>
     </p:extLst>
   </p:cSld>
@@ -1137,7 +1477,7 @@
     </p:spTree>
     <p:extLst>
       <p:ext uri="{BB962C8B-B14F-4D97-AF65-F5344CB8AC3E}">
-        <p14:creationId xmlns:p14="http://schemas.microsoft.com/office/powerpoint/2010/main" val="1687902653"/>
+        <p14:creationId xmlns:p14="http://schemas.microsoft.com/office/powerpoint/2010/main" val="3348031459"/>
       </p:ext>
     </p:extLst>
   </p:cSld>
@@ -1221,7 +1561,7 @@
     </p:spTree>
     <p:extLst>
       <p:ext uri="{BB962C8B-B14F-4D97-AF65-F5344CB8AC3E}">
-        <p14:creationId xmlns:p14="http://schemas.microsoft.com/office/powerpoint/2010/main" val="442648345"/>
+        <p14:creationId xmlns:p14="http://schemas.microsoft.com/office/powerpoint/2010/main" val="463232708"/>
       </p:ext>
     </p:extLst>
   </p:cSld>
@@ -1378,7 +1718,7 @@
           <a:p>
             <a:fld id="{B15FD32F-C120-4D0E-9C37-E017B9568546}" type="datetime1">
               <a:rPr lang="ru-RU" smtClean="0"/>
-              <a:t>25.05.2023</a:t>
+              <a:t>26.05.2023</a:t>
             </a:fld>
             <a:endParaRPr lang="ru-RU"/>
           </a:p>
@@ -1576,7 +1916,7 @@
           <a:p>
             <a:fld id="{ADE0A76F-9E88-4C25-AC34-9496CF6B05A5}" type="datetime1">
               <a:rPr lang="ru-RU" smtClean="0"/>
-              <a:t>25.05.2023</a:t>
+              <a:t>26.05.2023</a:t>
             </a:fld>
             <a:endParaRPr lang="ru-RU"/>
           </a:p>
@@ -1784,7 +2124,7 @@
           <a:p>
             <a:fld id="{C05BEFB0-B7CC-46E1-93CA-7CBDF3DD5763}" type="datetime1">
               <a:rPr lang="ru-RU" smtClean="0"/>
-              <a:t>25.05.2023</a:t>
+              <a:t>26.05.2023</a:t>
             </a:fld>
             <a:endParaRPr lang="ru-RU"/>
           </a:p>
@@ -1982,7 +2322,7 @@
           <a:p>
             <a:fld id="{FB4F63C6-2E24-4C53-A45A-54950449F445}" type="datetime1">
               <a:rPr lang="ru-RU" smtClean="0"/>
-              <a:t>25.05.2023</a:t>
+              <a:t>26.05.2023</a:t>
             </a:fld>
             <a:endParaRPr lang="ru-RU"/>
           </a:p>
@@ -2257,7 +2597,7 @@
           <a:p>
             <a:fld id="{8048CBC4-0F2F-47CB-B3E5-FEFB02445499}" type="datetime1">
               <a:rPr lang="ru-RU" smtClean="0"/>
-              <a:t>25.05.2023</a:t>
+              <a:t>26.05.2023</a:t>
             </a:fld>
             <a:endParaRPr lang="ru-RU"/>
           </a:p>
@@ -2522,7 +2862,7 @@
           <a:p>
             <a:fld id="{DA2A9EE1-5AB8-4E59-965C-274797A469D4}" type="datetime1">
               <a:rPr lang="ru-RU" smtClean="0"/>
-              <a:t>25.05.2023</a:t>
+              <a:t>26.05.2023</a:t>
             </a:fld>
             <a:endParaRPr lang="ru-RU"/>
           </a:p>
@@ -2934,7 +3274,7 @@
           <a:p>
             <a:fld id="{86833C64-03F7-434D-B18D-FA6C3C8C1E4A}" type="datetime1">
               <a:rPr lang="ru-RU" smtClean="0"/>
-              <a:t>25.05.2023</a:t>
+              <a:t>26.05.2023</a:t>
             </a:fld>
             <a:endParaRPr lang="ru-RU"/>
           </a:p>
@@ -3075,7 +3415,7 @@
           <a:p>
             <a:fld id="{5AA3AB51-AD61-4418-AEE1-AA4936610230}" type="datetime1">
               <a:rPr lang="ru-RU" smtClean="0"/>
-              <a:t>25.05.2023</a:t>
+              <a:t>26.05.2023</a:t>
             </a:fld>
             <a:endParaRPr lang="ru-RU"/>
           </a:p>
@@ -3188,7 +3528,7 @@
           <a:p>
             <a:fld id="{BD022448-F95F-4840-8027-53F0CAF45C26}" type="datetime1">
               <a:rPr lang="ru-RU" smtClean="0"/>
-              <a:t>25.05.2023</a:t>
+              <a:t>26.05.2023</a:t>
             </a:fld>
             <a:endParaRPr lang="ru-RU"/>
           </a:p>
@@ -3499,7 +3839,7 @@
           <a:p>
             <a:fld id="{B797729C-76AD-421A-A62E-9C609ECFB945}" type="datetime1">
               <a:rPr lang="ru-RU" smtClean="0"/>
-              <a:t>25.05.2023</a:t>
+              <a:t>26.05.2023</a:t>
             </a:fld>
             <a:endParaRPr lang="ru-RU"/>
           </a:p>
@@ -3787,7 +4127,7 @@
           <a:p>
             <a:fld id="{47A17012-466B-4E09-87BC-C5A3A51EB5C7}" type="datetime1">
               <a:rPr lang="ru-RU" smtClean="0"/>
-              <a:t>25.05.2023</a:t>
+              <a:t>26.05.2023</a:t>
             </a:fld>
             <a:endParaRPr lang="ru-RU"/>
           </a:p>
@@ -4028,7 +4368,7 @@
           <a:p>
             <a:fld id="{A817B2BF-99C7-4566-96C2-6748A8E5D4C1}" type="datetime1">
               <a:rPr lang="ru-RU" smtClean="0"/>
-              <a:t>25.05.2023</a:t>
+              <a:t>26.05.2023</a:t>
             </a:fld>
             <a:endParaRPr lang="ru-RU"/>
           </a:p>
@@ -4461,7 +4801,7 @@
         <p:spPr>
           <a:xfrm>
             <a:off x="768953" y="2828835"/>
-            <a:ext cx="10654094" cy="1384995"/>
+            <a:ext cx="10654094" cy="1815882"/>
           </a:xfrm>
           <a:prstGeom prst="rect">
             <a:avLst/>
@@ -4486,21 +4826,31 @@
           <a:p>
             <a:pPr algn="ctr"/>
             <a:r>
-              <a:rPr lang="ru-RU" sz="2800" b="1" dirty="0">
+              <a:rPr lang="ru-RU" sz="2800" dirty="0">
                 <a:latin typeface="Times New Roman" panose="02020603050405020304" pitchFamily="18" charset="0"/>
                 <a:cs typeface="Times New Roman" panose="02020603050405020304" pitchFamily="18" charset="0"/>
               </a:rPr>
-              <a:t>Классификация существующих методов</a:t>
+              <a:t>«Метод анализа активности пользователей системы</a:t>
             </a:r>
           </a:p>
           <a:p>
             <a:pPr algn="ctr"/>
             <a:r>
-              <a:rPr lang="ru-RU" sz="2800" b="1" dirty="0">
+              <a:rPr lang="ru-RU" sz="2800" dirty="0">
                 <a:latin typeface="Times New Roman" panose="02020603050405020304" pitchFamily="18" charset="0"/>
                 <a:cs typeface="Times New Roman" panose="02020603050405020304" pitchFamily="18" charset="0"/>
               </a:rPr>
-              <a:t>анализа пользовательской активности</a:t>
+              <a:t>автоматизированного проектирования с использованием</a:t>
+            </a:r>
+          </a:p>
+          <a:p>
+            <a:pPr algn="ctr"/>
+            <a:r>
+              <a:rPr lang="ru-RU" sz="2800" dirty="0">
+                <a:latin typeface="Times New Roman" panose="02020603050405020304" pitchFamily="18" charset="0"/>
+                <a:cs typeface="Times New Roman" panose="02020603050405020304" pitchFamily="18" charset="0"/>
+              </a:rPr>
+              <a:t>поиска последовательных шаблонов.»</a:t>
             </a:r>
           </a:p>
         </p:txBody>
@@ -4853,7 +5203,7 @@
           <a:p>
             <a:r>
               <a:rPr lang="ru-RU" sz="4000" b="1" dirty="0"/>
-              <a:t>Заголовок</a:t>
+              <a:t>Генерация кандидатов</a:t>
             </a:r>
           </a:p>
         </p:txBody>
@@ -4887,55 +5237,46 @@
           </a:p>
         </p:txBody>
       </p:sp>
-      <p:sp>
-        <p:nvSpPr>
-          <p:cNvPr id="5" name="Объект 2">
-            <a:extLst>
-              <a:ext uri="{FF2B5EF4-FFF2-40B4-BE49-F238E27FC236}">
-                <a16:creationId xmlns:a16="http://schemas.microsoft.com/office/drawing/2014/main" id="{02C33000-B0B7-4509-AD8C-600B0EFAA229}"/>
-              </a:ext>
-            </a:extLst>
-          </p:cNvPr>
-          <p:cNvSpPr>
-            <a:spLocks noGrp="1"/>
-          </p:cNvSpPr>
-          <p:nvPr>
-            <p:ph idx="1"/>
-          </p:nvPr>
-        </p:nvSpPr>
+      <p:pic>
+        <p:nvPicPr>
+          <p:cNvPr id="8" name="Рисунок 7">
+            <a:extLst>
+              <a:ext uri="{FF2B5EF4-FFF2-40B4-BE49-F238E27FC236}">
+                <a16:creationId xmlns:a16="http://schemas.microsoft.com/office/drawing/2014/main" id="{6AF78E23-D493-4862-A255-AD1BF5665867}"/>
+              </a:ext>
+            </a:extLst>
+          </p:cNvPr>
+          <p:cNvPicPr>
+            <a:picLocks noChangeAspect="1"/>
+          </p:cNvPicPr>
+          <p:nvPr/>
+        </p:nvPicPr>
+        <p:blipFill>
+          <a:blip r:embed="rId3">
+            <a:extLst>
+              <a:ext uri="{28A0092B-C50C-407E-A947-70E740481C1C}">
+                <a14:useLocalDpi xmlns:a14="http://schemas.microsoft.com/office/drawing/2010/main" val="0"/>
+              </a:ext>
+            </a:extLst>
+          </a:blip>
+          <a:stretch>
+            <a:fillRect/>
+          </a:stretch>
+        </p:blipFill>
         <p:spPr>
           <a:xfrm>
-            <a:off x="428017" y="863601"/>
-            <a:ext cx="11182378" cy="5994398"/>
+            <a:off x="212659" y="954733"/>
+            <a:ext cx="11766681" cy="5401617"/>
           </a:xfrm>
+          <a:prstGeom prst="rect">
+            <a:avLst/>
+          </a:prstGeom>
         </p:spPr>
-        <p:txBody>
-          <a:bodyPr>
-            <a:noAutofit/>
-          </a:bodyPr>
-          <a:lstStyle/>
-          <a:p>
-            <a:pPr indent="0">
-              <a:lnSpc>
-                <a:spcPct val="100000"/>
-              </a:lnSpc>
-              <a:buNone/>
-            </a:pPr>
-            <a:r>
-              <a:rPr lang="ru-RU" sz="2600" dirty="0">
-                <a:effectLst/>
-                <a:latin typeface="Times New Roman" panose="02020603050405020304" pitchFamily="18" charset="0"/>
-                <a:ea typeface="Times New Roman" panose="02020603050405020304" pitchFamily="18" charset="0"/>
-              </a:rPr>
-              <a:t>Исследование (не более 3ех плакатов)</a:t>
-            </a:r>
-          </a:p>
-        </p:txBody>
-      </p:sp>
+      </p:pic>
     </p:spTree>
     <p:extLst>
       <p:ext uri="{BB962C8B-B14F-4D97-AF65-F5344CB8AC3E}">
-        <p14:creationId xmlns:p14="http://schemas.microsoft.com/office/powerpoint/2010/main" val="1845485602"/>
+        <p14:creationId xmlns:p14="http://schemas.microsoft.com/office/powerpoint/2010/main" val="2884998727"/>
       </p:ext>
     </p:extLst>
   </p:cSld>
@@ -4992,7 +5333,7 @@
           <a:p>
             <a:r>
               <a:rPr lang="ru-RU" sz="4000" b="1" dirty="0"/>
-              <a:t>Заключение</a:t>
+              <a:t>Проверка поддержки кандидата сессией</a:t>
             </a:r>
           </a:p>
         </p:txBody>
@@ -5026,192 +5367,46 @@
           </a:p>
         </p:txBody>
       </p:sp>
-      <p:sp>
-        <p:nvSpPr>
-          <p:cNvPr id="5" name="Объект 2">
-            <a:extLst>
-              <a:ext uri="{FF2B5EF4-FFF2-40B4-BE49-F238E27FC236}">
-                <a16:creationId xmlns:a16="http://schemas.microsoft.com/office/drawing/2014/main" id="{02C33000-B0B7-4509-AD8C-600B0EFAA229}"/>
-              </a:ext>
-            </a:extLst>
-          </p:cNvPr>
-          <p:cNvSpPr>
-            <a:spLocks noGrp="1"/>
-          </p:cNvSpPr>
-          <p:nvPr>
-            <p:ph idx="1"/>
-          </p:nvPr>
-        </p:nvSpPr>
+      <p:pic>
+        <p:nvPicPr>
+          <p:cNvPr id="10" name="Рисунок 9">
+            <a:extLst>
+              <a:ext uri="{FF2B5EF4-FFF2-40B4-BE49-F238E27FC236}">
+                <a16:creationId xmlns:a16="http://schemas.microsoft.com/office/drawing/2014/main" id="{581815B5-8490-4C22-A79B-494F79BC9F15}"/>
+              </a:ext>
+            </a:extLst>
+          </p:cNvPr>
+          <p:cNvPicPr>
+            <a:picLocks noChangeAspect="1"/>
+          </p:cNvPicPr>
+          <p:nvPr/>
+        </p:nvPicPr>
+        <p:blipFill>
+          <a:blip r:embed="rId3">
+            <a:extLst>
+              <a:ext uri="{28A0092B-C50C-407E-A947-70E740481C1C}">
+                <a14:useLocalDpi xmlns:a14="http://schemas.microsoft.com/office/drawing/2010/main" val="0"/>
+              </a:ext>
+            </a:extLst>
+          </a:blip>
+          <a:stretch>
+            <a:fillRect/>
+          </a:stretch>
+        </p:blipFill>
         <p:spPr>
           <a:xfrm>
-            <a:off x="428017" y="863601"/>
-            <a:ext cx="11182378" cy="5994398"/>
+            <a:off x="1431260" y="863601"/>
+            <a:ext cx="8509114" cy="5860444"/>
           </a:xfrm>
+          <a:prstGeom prst="rect">
+            <a:avLst/>
+          </a:prstGeom>
         </p:spPr>
-        <p:txBody>
-          <a:bodyPr>
-            <a:noAutofit/>
-          </a:bodyPr>
-          <a:lstStyle/>
-          <a:p>
-            <a:pPr indent="0">
-              <a:lnSpc>
-                <a:spcPct val="100000"/>
-              </a:lnSpc>
-              <a:buNone/>
-            </a:pPr>
-            <a:r>
-              <a:rPr lang="ru-RU" sz="2600" dirty="0">
-                <a:effectLst/>
-                <a:latin typeface="Times New Roman" panose="02020603050405020304" pitchFamily="18" charset="0"/>
-                <a:ea typeface="Times New Roman" panose="02020603050405020304" pitchFamily="18" charset="0"/>
-              </a:rPr>
-              <a:t>По итогу проделанной работы была достигнута </a:t>
-            </a:r>
-            <a:r>
-              <a:rPr lang="ru-RU" sz="2600" b="1" dirty="0">
-                <a:effectLst/>
-                <a:latin typeface="Times New Roman" panose="02020603050405020304" pitchFamily="18" charset="0"/>
-                <a:ea typeface="Times New Roman" panose="02020603050405020304" pitchFamily="18" charset="0"/>
-              </a:rPr>
-              <a:t>цель</a:t>
-            </a:r>
-            <a:r>
-              <a:rPr lang="ru-RU" sz="2600" dirty="0">
-                <a:effectLst/>
-                <a:latin typeface="Times New Roman" panose="02020603050405020304" pitchFamily="18" charset="0"/>
-                <a:ea typeface="Times New Roman" panose="02020603050405020304" pitchFamily="18" charset="0"/>
-              </a:rPr>
-              <a:t> - разработан и программно реализован метод анализа активности пользователей САПР с использованием поиска последовательных шаблонов.</a:t>
-            </a:r>
-          </a:p>
-          <a:p>
-            <a:pPr indent="0">
-              <a:lnSpc>
-                <a:spcPct val="100000"/>
-              </a:lnSpc>
-              <a:buNone/>
-            </a:pPr>
-            <a:r>
-              <a:rPr lang="ru-RU" sz="2600" dirty="0">
-                <a:effectLst/>
-                <a:latin typeface="Times New Roman" panose="02020603050405020304" pitchFamily="18" charset="0"/>
-                <a:ea typeface="Times New Roman" panose="02020603050405020304" pitchFamily="18" charset="0"/>
-              </a:rPr>
-              <a:t>Также были решены все поставленные </a:t>
-            </a:r>
-            <a:r>
-              <a:rPr lang="ru-RU" sz="2600" b="1" dirty="0">
-                <a:effectLst/>
-                <a:latin typeface="Times New Roman" panose="02020603050405020304" pitchFamily="18" charset="0"/>
-                <a:ea typeface="Times New Roman" panose="02020603050405020304" pitchFamily="18" charset="0"/>
-              </a:rPr>
-              <a:t>задачи</a:t>
-            </a:r>
-            <a:r>
-              <a:rPr lang="ru-RU" sz="2600" dirty="0">
-                <a:effectLst/>
-                <a:latin typeface="Times New Roman" panose="02020603050405020304" pitchFamily="18" charset="0"/>
-                <a:ea typeface="Times New Roman" panose="02020603050405020304" pitchFamily="18" charset="0"/>
-              </a:rPr>
-              <a:t>, а именно:</a:t>
-            </a:r>
-          </a:p>
-          <a:p>
-            <a:pPr marL="742950" indent="-514350">
-              <a:lnSpc>
-                <a:spcPct val="100000"/>
-              </a:lnSpc>
-              <a:buFont typeface="+mj-lt"/>
-              <a:buAutoNum type="arabicParenR"/>
-            </a:pPr>
-            <a:r>
-              <a:rPr lang="ru-RU" sz="2600" dirty="0">
-                <a:effectLst/>
-                <a:latin typeface="Times New Roman" panose="02020603050405020304" pitchFamily="18" charset="0"/>
-                <a:ea typeface="Times New Roman" panose="02020603050405020304" pitchFamily="18" charset="0"/>
-              </a:rPr>
-              <a:t>рассмотрены существующие решения в области анализа активности пользователей, выбраны для них критерии оценки и проведено сравнение;</a:t>
-            </a:r>
-          </a:p>
-          <a:p>
-            <a:pPr marL="742950" indent="-514350">
-              <a:lnSpc>
-                <a:spcPct val="100000"/>
-              </a:lnSpc>
-              <a:buFont typeface="+mj-lt"/>
-              <a:buAutoNum type="arabicParenR"/>
-            </a:pPr>
-            <a:r>
-              <a:rPr lang="ru-RU" sz="2600" dirty="0">
-                <a:effectLst/>
-                <a:latin typeface="Times New Roman" panose="02020603050405020304" pitchFamily="18" charset="0"/>
-                <a:ea typeface="Times New Roman" panose="02020603050405020304" pitchFamily="18" charset="0"/>
-              </a:rPr>
-              <a:t>формализована задача в виде IDEF0-диаграммы;</a:t>
-            </a:r>
-          </a:p>
-          <a:p>
-            <a:pPr marL="742950" indent="-514350">
-              <a:lnSpc>
-                <a:spcPct val="100000"/>
-              </a:lnSpc>
-              <a:buFont typeface="+mj-lt"/>
-              <a:buAutoNum type="arabicParenR"/>
-            </a:pPr>
-            <a:r>
-              <a:rPr lang="ru-RU" sz="2600" dirty="0">
-                <a:effectLst/>
-                <a:latin typeface="Times New Roman" panose="02020603050405020304" pitchFamily="18" charset="0"/>
-                <a:ea typeface="Times New Roman" panose="02020603050405020304" pitchFamily="18" charset="0"/>
-              </a:rPr>
-              <a:t>разработан метод анализа активности пользователей САПР с использованием поиска последовательных шаблонов;</a:t>
-            </a:r>
-          </a:p>
-          <a:p>
-            <a:pPr marL="742950" indent="-514350">
-              <a:lnSpc>
-                <a:spcPct val="100000"/>
-              </a:lnSpc>
-              <a:buFont typeface="+mj-lt"/>
-              <a:buAutoNum type="arabicParenR"/>
-            </a:pPr>
-            <a:r>
-              <a:rPr lang="ru-RU" sz="2600" dirty="0">
-                <a:effectLst/>
-                <a:latin typeface="Times New Roman" panose="02020603050405020304" pitchFamily="18" charset="0"/>
-                <a:ea typeface="Times New Roman" panose="02020603050405020304" pitchFamily="18" charset="0"/>
-              </a:rPr>
-              <a:t>разработано программное обеспечение, реализующее описанный метод;</a:t>
-            </a:r>
-            <a:endParaRPr lang="ru-RU" sz="2600" dirty="0">
-              <a:latin typeface="Times New Roman" panose="02020603050405020304" pitchFamily="18" charset="0"/>
-              <a:ea typeface="Times New Roman" panose="02020603050405020304" pitchFamily="18" charset="0"/>
-            </a:endParaRPr>
-          </a:p>
-          <a:p>
-            <a:pPr marL="742950" indent="-514350">
-              <a:lnSpc>
-                <a:spcPct val="100000"/>
-              </a:lnSpc>
-              <a:buFont typeface="+mj-lt"/>
-              <a:buAutoNum type="arabicParenR"/>
-            </a:pPr>
-            <a:r>
-              <a:rPr lang="ru-RU" sz="2600" dirty="0">
-                <a:effectLst/>
-                <a:latin typeface="Times New Roman" panose="02020603050405020304" pitchFamily="18" charset="0"/>
-                <a:ea typeface="Times New Roman" panose="02020603050405020304" pitchFamily="18" charset="0"/>
-              </a:rPr>
-              <a:t>исследованы характеристики разработанного метода.</a:t>
-            </a:r>
-          </a:p>
-        </p:txBody>
-      </p:sp>
+      </p:pic>
     </p:spTree>
     <p:extLst>
       <p:ext uri="{BB962C8B-B14F-4D97-AF65-F5344CB8AC3E}">
-        <p14:creationId xmlns:p14="http://schemas.microsoft.com/office/powerpoint/2010/main" val="1045649332"/>
+        <p14:creationId xmlns:p14="http://schemas.microsoft.com/office/powerpoint/2010/main" val="1246671588"/>
       </p:ext>
     </p:extLst>
   </p:cSld>
@@ -5240,10 +5435,39 @@
       </p:grpSpPr>
       <p:sp>
         <p:nvSpPr>
-          <p:cNvPr id="2" name="Заголовок 1">
-            <a:extLst>
-              <a:ext uri="{FF2B5EF4-FFF2-40B4-BE49-F238E27FC236}">
-                <a16:creationId xmlns:a16="http://schemas.microsoft.com/office/drawing/2014/main" id="{1802D59D-6A83-151A-EEA2-678960399BE4}"/>
+          <p:cNvPr id="3" name="Номер слайда 2">
+            <a:extLst>
+              <a:ext uri="{FF2B5EF4-FFF2-40B4-BE49-F238E27FC236}">
+                <a16:creationId xmlns:a16="http://schemas.microsoft.com/office/drawing/2014/main" id="{EB930BD0-D85B-F112-101C-B409455C44FB}"/>
+              </a:ext>
+            </a:extLst>
+          </p:cNvPr>
+          <p:cNvSpPr>
+            <a:spLocks noGrp="1"/>
+          </p:cNvSpPr>
+          <p:nvPr>
+            <p:ph type="sldNum" sz="quarter" idx="12"/>
+          </p:nvPr>
+        </p:nvSpPr>
+        <p:spPr/>
+        <p:txBody>
+          <a:bodyPr/>
+          <a:lstStyle/>
+          <a:p>
+            <a:fld id="{E83D2FD5-BBDA-43D0-B172-791327EA2B6A}" type="slidenum">
+              <a:rPr lang="ru-RU" smtClean="0"/>
+              <a:t>12</a:t>
+            </a:fld>
+            <a:endParaRPr lang="ru-RU" dirty="0"/>
+          </a:p>
+        </p:txBody>
+      </p:sp>
+      <p:sp>
+        <p:nvSpPr>
+          <p:cNvPr id="8" name="Заголовок 1">
+            <a:extLst>
+              <a:ext uri="{FF2B5EF4-FFF2-40B4-BE49-F238E27FC236}">
+                <a16:creationId xmlns:a16="http://schemas.microsoft.com/office/drawing/2014/main" id="{01D085E6-0A87-43C3-BE5C-E9A5A77E04E8}"/>
               </a:ext>
             </a:extLst>
           </p:cNvPr>
@@ -5267,16 +5491,78 @@
           <a:lstStyle/>
           <a:p>
             <a:r>
-              <a:rPr lang="ru-RU" sz="4000" b="1" dirty="0">
-                <a:effectLst/>
-                <a:ea typeface="Times New Roman" panose="02020603050405020304" pitchFamily="18" charset="0"/>
-              </a:rPr>
-              <a:t>Перспективы дальнейшего развития</a:t>
-            </a:r>
-            <a:endParaRPr lang="ru-RU" sz="4000" b="1" dirty="0"/>
-          </a:p>
-        </p:txBody>
-      </p:sp>
+              <a:rPr lang="ru-RU" sz="4000" b="1" dirty="0"/>
+              <a:t>Структура программного обеспечения</a:t>
+            </a:r>
+          </a:p>
+        </p:txBody>
+      </p:sp>
+      <p:pic>
+        <p:nvPicPr>
+          <p:cNvPr id="16" name="Рисунок 15">
+            <a:extLst>
+              <a:ext uri="{FF2B5EF4-FFF2-40B4-BE49-F238E27FC236}">
+                <a16:creationId xmlns:a16="http://schemas.microsoft.com/office/drawing/2014/main" id="{30CB8442-7DB8-4899-AD4A-EF25A7B91276}"/>
+              </a:ext>
+            </a:extLst>
+          </p:cNvPr>
+          <p:cNvPicPr>
+            <a:picLocks noChangeAspect="1"/>
+          </p:cNvPicPr>
+          <p:nvPr/>
+        </p:nvPicPr>
+        <p:blipFill>
+          <a:blip r:embed="rId3">
+            <a:extLst>
+              <a:ext uri="{28A0092B-C50C-407E-A947-70E740481C1C}">
+                <a14:useLocalDpi xmlns:a14="http://schemas.microsoft.com/office/drawing/2010/main" val="0"/>
+              </a:ext>
+            </a:extLst>
+          </a:blip>
+          <a:stretch>
+            <a:fillRect/>
+          </a:stretch>
+        </p:blipFill>
+        <p:spPr>
+          <a:xfrm>
+            <a:off x="361950" y="1123950"/>
+            <a:ext cx="11468100" cy="4972050"/>
+          </a:xfrm>
+          <a:prstGeom prst="rect">
+            <a:avLst/>
+          </a:prstGeom>
+        </p:spPr>
+      </p:pic>
+    </p:spTree>
+    <p:extLst>
+      <p:ext uri="{BB962C8B-B14F-4D97-AF65-F5344CB8AC3E}">
+        <p14:creationId xmlns:p14="http://schemas.microsoft.com/office/powerpoint/2010/main" val="4253709830"/>
+      </p:ext>
+    </p:extLst>
+  </p:cSld>
+  <p:clrMapOvr>
+    <a:masterClrMapping/>
+  </p:clrMapOvr>
+</p:sld>
+</file>
+
+<file path=ppt/slides/slide13.xml><?xml version="1.0" encoding="utf-8"?>
+<p:sld xmlns:a="http://schemas.openxmlformats.org/drawingml/2006/main" xmlns:r="http://schemas.openxmlformats.org/officeDocument/2006/relationships" xmlns:p="http://schemas.openxmlformats.org/presentationml/2006/main">
+  <p:cSld>
+    <p:spTree>
+      <p:nvGrpSpPr>
+        <p:cNvPr id="1" name=""/>
+        <p:cNvGrpSpPr/>
+        <p:nvPr/>
+      </p:nvGrpSpPr>
+      <p:grpSpPr>
+        <a:xfrm>
+          <a:off x="0" y="0"/>
+          <a:ext cx="0" cy="0"/>
+          <a:chOff x="0" y="0"/>
+          <a:chExt cx="0" cy="0"/>
+        </a:xfrm>
+      </p:grpSpPr>
       <p:sp>
         <p:nvSpPr>
           <p:cNvPr id="3" name="Номер слайда 2">
@@ -5300,7 +5586,396 @@
           <a:p>
             <a:fld id="{E83D2FD5-BBDA-43D0-B172-791327EA2B6A}" type="slidenum">
               <a:rPr lang="ru-RU" smtClean="0"/>
-              <a:t>12</a:t>
+              <a:t>13</a:t>
+            </a:fld>
+            <a:endParaRPr lang="ru-RU" dirty="0"/>
+          </a:p>
+        </p:txBody>
+      </p:sp>
+      <p:pic>
+        <p:nvPicPr>
+          <p:cNvPr id="9" name="Рисунок 8">
+            <a:extLst>
+              <a:ext uri="{FF2B5EF4-FFF2-40B4-BE49-F238E27FC236}">
+                <a16:creationId xmlns:a16="http://schemas.microsoft.com/office/drawing/2014/main" id="{49C3ED79-218A-4A76-B661-A42743A1F43B}"/>
+              </a:ext>
+            </a:extLst>
+          </p:cNvPr>
+          <p:cNvPicPr>
+            <a:picLocks noChangeAspect="1"/>
+          </p:cNvPicPr>
+          <p:nvPr/>
+        </p:nvPicPr>
+        <p:blipFill>
+          <a:blip r:embed="rId3"/>
+          <a:stretch>
+            <a:fillRect/>
+          </a:stretch>
+        </p:blipFill>
+        <p:spPr>
+          <a:xfrm>
+            <a:off x="4186614" y="1814320"/>
+            <a:ext cx="3818771" cy="3929460"/>
+          </a:xfrm>
+          <a:prstGeom prst="rect">
+            <a:avLst/>
+          </a:prstGeom>
+        </p:spPr>
+      </p:pic>
+      <p:pic>
+        <p:nvPicPr>
+          <p:cNvPr id="11" name="Рисунок 10">
+            <a:extLst>
+              <a:ext uri="{FF2B5EF4-FFF2-40B4-BE49-F238E27FC236}">
+                <a16:creationId xmlns:a16="http://schemas.microsoft.com/office/drawing/2014/main" id="{304A529D-E51E-4A96-97BD-17E7BA6944B4}"/>
+              </a:ext>
+            </a:extLst>
+          </p:cNvPr>
+          <p:cNvPicPr>
+            <a:picLocks noChangeAspect="1"/>
+          </p:cNvPicPr>
+          <p:nvPr/>
+        </p:nvPicPr>
+        <p:blipFill>
+          <a:blip r:embed="rId4"/>
+          <a:stretch>
+            <a:fillRect/>
+          </a:stretch>
+        </p:blipFill>
+        <p:spPr>
+          <a:xfrm>
+            <a:off x="8005385" y="1814320"/>
+            <a:ext cx="3880188" cy="3929459"/>
+          </a:xfrm>
+          <a:prstGeom prst="rect">
+            <a:avLst/>
+          </a:prstGeom>
+        </p:spPr>
+      </p:pic>
+      <p:pic>
+        <p:nvPicPr>
+          <p:cNvPr id="13" name="Рисунок 12">
+            <a:extLst>
+              <a:ext uri="{FF2B5EF4-FFF2-40B4-BE49-F238E27FC236}">
+                <a16:creationId xmlns:a16="http://schemas.microsoft.com/office/drawing/2014/main" id="{95D77AF7-455D-41F6-AAE6-3828594AA7DC}"/>
+              </a:ext>
+            </a:extLst>
+          </p:cNvPr>
+          <p:cNvPicPr>
+            <a:picLocks noChangeAspect="1"/>
+          </p:cNvPicPr>
+          <p:nvPr/>
+        </p:nvPicPr>
+        <p:blipFill>
+          <a:blip r:embed="rId5"/>
+          <a:stretch>
+            <a:fillRect/>
+          </a:stretch>
+        </p:blipFill>
+        <p:spPr>
+          <a:xfrm>
+            <a:off x="306426" y="1814319"/>
+            <a:ext cx="3824427" cy="3929460"/>
+          </a:xfrm>
+          <a:prstGeom prst="rect">
+            <a:avLst/>
+          </a:prstGeom>
+        </p:spPr>
+      </p:pic>
+      <p:sp>
+        <p:nvSpPr>
+          <p:cNvPr id="14" name="Заголовок 1">
+            <a:extLst>
+              <a:ext uri="{FF2B5EF4-FFF2-40B4-BE49-F238E27FC236}">
+                <a16:creationId xmlns:a16="http://schemas.microsoft.com/office/drawing/2014/main" id="{96E9992D-08DE-4AC4-B03C-21F4A6B3A7E5}"/>
+              </a:ext>
+            </a:extLst>
+          </p:cNvPr>
+          <p:cNvSpPr txBox="1">
+            <a:spLocks/>
+          </p:cNvSpPr>
+          <p:nvPr/>
+        </p:nvSpPr>
+        <p:spPr>
+          <a:xfrm>
+            <a:off x="436894" y="1"/>
+            <a:ext cx="11755105" cy="1384916"/>
+          </a:xfrm>
+          <a:prstGeom prst="rect">
+            <a:avLst/>
+          </a:prstGeom>
+        </p:spPr>
+        <p:txBody>
+          <a:bodyPr vert="horz" lIns="91440" tIns="45720" rIns="91440" bIns="45720" rtlCol="0" anchor="ctr">
+            <a:noAutofit/>
+          </a:bodyPr>
+          <a:lstStyle>
+            <a:lvl1pPr algn="l" defTabSz="914400" rtl="0" eaLnBrk="1" latinLnBrk="0" hangingPunct="1">
+              <a:lnSpc>
+                <a:spcPct val="90000"/>
+              </a:lnSpc>
+              <a:spcBef>
+                <a:spcPct val="0"/>
+              </a:spcBef>
+              <a:buNone/>
+              <a:defRPr sz="4400" kern="1200">
+                <a:solidFill>
+                  <a:schemeClr val="tx1"/>
+                </a:solidFill>
+                <a:latin typeface="+mj-lt"/>
+                <a:ea typeface="+mj-ea"/>
+                <a:cs typeface="+mj-cs"/>
+              </a:defRPr>
+            </a:lvl1pPr>
+          </a:lstStyle>
+          <a:p>
+            <a:r>
+              <a:rPr lang="ru-RU" sz="4000" b="1" dirty="0"/>
+              <a:t>Сравнительный анализ времени выполнения метода</a:t>
+            </a:r>
+            <a:br>
+              <a:rPr lang="ru-RU" sz="4000" b="1" dirty="0"/>
+            </a:br>
+            <a:r>
+              <a:rPr lang="ru-RU" sz="4000" b="1" dirty="0"/>
+              <a:t>в зависимости от параметров</a:t>
+            </a:r>
+          </a:p>
+        </p:txBody>
+      </p:sp>
+    </p:spTree>
+    <p:extLst>
+      <p:ext uri="{BB962C8B-B14F-4D97-AF65-F5344CB8AC3E}">
+        <p14:creationId xmlns:p14="http://schemas.microsoft.com/office/powerpoint/2010/main" val="3140211488"/>
+      </p:ext>
+    </p:extLst>
+  </p:cSld>
+  <p:clrMapOvr>
+    <a:masterClrMapping/>
+  </p:clrMapOvr>
+</p:sld>
+</file>
+
+<file path=ppt/slides/slide14.xml><?xml version="1.0" encoding="utf-8"?>
+<p:sld xmlns:a="http://schemas.openxmlformats.org/drawingml/2006/main" xmlns:r="http://schemas.openxmlformats.org/officeDocument/2006/relationships" xmlns:p="http://schemas.openxmlformats.org/presentationml/2006/main">
+  <p:cSld>
+    <p:spTree>
+      <p:nvGrpSpPr>
+        <p:cNvPr id="1" name=""/>
+        <p:cNvGrpSpPr/>
+        <p:nvPr/>
+      </p:nvGrpSpPr>
+      <p:grpSpPr>
+        <a:xfrm>
+          <a:off x="0" y="0"/>
+          <a:ext cx="0" cy="0"/>
+          <a:chOff x="0" y="0"/>
+          <a:chExt cx="0" cy="0"/>
+        </a:xfrm>
+      </p:grpSpPr>
+      <p:sp>
+        <p:nvSpPr>
+          <p:cNvPr id="3" name="Номер слайда 2">
+            <a:extLst>
+              <a:ext uri="{FF2B5EF4-FFF2-40B4-BE49-F238E27FC236}">
+                <a16:creationId xmlns:a16="http://schemas.microsoft.com/office/drawing/2014/main" id="{EB930BD0-D85B-F112-101C-B409455C44FB}"/>
+              </a:ext>
+            </a:extLst>
+          </p:cNvPr>
+          <p:cNvSpPr>
+            <a:spLocks noGrp="1"/>
+          </p:cNvSpPr>
+          <p:nvPr>
+            <p:ph type="sldNum" sz="quarter" idx="12"/>
+          </p:nvPr>
+        </p:nvSpPr>
+        <p:spPr/>
+        <p:txBody>
+          <a:bodyPr/>
+          <a:lstStyle/>
+          <a:p>
+            <a:fld id="{E83D2FD5-BBDA-43D0-B172-791327EA2B6A}" type="slidenum">
+              <a:rPr lang="ru-RU" smtClean="0"/>
+              <a:t>14</a:t>
+            </a:fld>
+            <a:endParaRPr lang="ru-RU" dirty="0"/>
+          </a:p>
+        </p:txBody>
+      </p:sp>
+      <p:pic>
+        <p:nvPicPr>
+          <p:cNvPr id="6" name="Рисунок 5">
+            <a:extLst>
+              <a:ext uri="{FF2B5EF4-FFF2-40B4-BE49-F238E27FC236}">
+                <a16:creationId xmlns:a16="http://schemas.microsoft.com/office/drawing/2014/main" id="{E4AF167E-B902-4DA5-9117-6696044BFD8B}"/>
+              </a:ext>
+            </a:extLst>
+          </p:cNvPr>
+          <p:cNvPicPr>
+            <a:picLocks noChangeAspect="1"/>
+          </p:cNvPicPr>
+          <p:nvPr/>
+        </p:nvPicPr>
+        <p:blipFill>
+          <a:blip r:embed="rId3"/>
+          <a:stretch>
+            <a:fillRect/>
+          </a:stretch>
+        </p:blipFill>
+        <p:spPr>
+          <a:xfrm>
+            <a:off x="2532802" y="1201751"/>
+            <a:ext cx="6077798" cy="5039428"/>
+          </a:xfrm>
+          <a:prstGeom prst="rect">
+            <a:avLst/>
+          </a:prstGeom>
+        </p:spPr>
+      </p:pic>
+      <p:sp>
+        <p:nvSpPr>
+          <p:cNvPr id="16" name="Заголовок 1">
+            <a:extLst>
+              <a:ext uri="{FF2B5EF4-FFF2-40B4-BE49-F238E27FC236}">
+                <a16:creationId xmlns:a16="http://schemas.microsoft.com/office/drawing/2014/main" id="{63212DA7-C870-40ED-9C9F-C1361A03DD47}"/>
+              </a:ext>
+            </a:extLst>
+          </p:cNvPr>
+          <p:cNvSpPr txBox="1">
+            <a:spLocks/>
+          </p:cNvSpPr>
+          <p:nvPr/>
+        </p:nvSpPr>
+        <p:spPr>
+          <a:xfrm>
+            <a:off x="436894" y="1"/>
+            <a:ext cx="11755105" cy="1384916"/>
+          </a:xfrm>
+          <a:prstGeom prst="rect">
+            <a:avLst/>
+          </a:prstGeom>
+        </p:spPr>
+        <p:txBody>
+          <a:bodyPr vert="horz" lIns="91440" tIns="45720" rIns="91440" bIns="45720" rtlCol="0" anchor="ctr">
+            <a:noAutofit/>
+          </a:bodyPr>
+          <a:lstStyle>
+            <a:lvl1pPr algn="l" defTabSz="914400" rtl="0" eaLnBrk="1" latinLnBrk="0" hangingPunct="1">
+              <a:lnSpc>
+                <a:spcPct val="90000"/>
+              </a:lnSpc>
+              <a:spcBef>
+                <a:spcPct val="0"/>
+              </a:spcBef>
+              <a:buNone/>
+              <a:defRPr sz="4400" kern="1200">
+                <a:solidFill>
+                  <a:schemeClr val="tx1"/>
+                </a:solidFill>
+                <a:latin typeface="+mj-lt"/>
+                <a:ea typeface="+mj-ea"/>
+                <a:cs typeface="+mj-cs"/>
+              </a:defRPr>
+            </a:lvl1pPr>
+          </a:lstStyle>
+          <a:p>
+            <a:r>
+              <a:rPr lang="ru-RU" sz="4000" b="1" i="0" u="none" strike="noStrike" baseline="0" dirty="0"/>
+              <a:t>Сравнительный анализ времени выполнения этапов метода</a:t>
+            </a:r>
+            <a:endParaRPr lang="ru-RU" sz="4000" b="1" dirty="0"/>
+          </a:p>
+        </p:txBody>
+      </p:sp>
+    </p:spTree>
+    <p:extLst>
+      <p:ext uri="{BB962C8B-B14F-4D97-AF65-F5344CB8AC3E}">
+        <p14:creationId xmlns:p14="http://schemas.microsoft.com/office/powerpoint/2010/main" val="4098407753"/>
+      </p:ext>
+    </p:extLst>
+  </p:cSld>
+  <p:clrMapOvr>
+    <a:masterClrMapping/>
+  </p:clrMapOvr>
+</p:sld>
+</file>
+
+<file path=ppt/slides/slide15.xml><?xml version="1.0" encoding="utf-8"?>
+<p:sld xmlns:a="http://schemas.openxmlformats.org/drawingml/2006/main" xmlns:r="http://schemas.openxmlformats.org/officeDocument/2006/relationships" xmlns:p="http://schemas.openxmlformats.org/presentationml/2006/main">
+  <p:cSld>
+    <p:spTree>
+      <p:nvGrpSpPr>
+        <p:cNvPr id="1" name=""/>
+        <p:cNvGrpSpPr/>
+        <p:nvPr/>
+      </p:nvGrpSpPr>
+      <p:grpSpPr>
+        <a:xfrm>
+          <a:off x="0" y="0"/>
+          <a:ext cx="0" cy="0"/>
+          <a:chOff x="0" y="0"/>
+          <a:chExt cx="0" cy="0"/>
+        </a:xfrm>
+      </p:grpSpPr>
+      <p:sp>
+        <p:nvSpPr>
+          <p:cNvPr id="2" name="Заголовок 1">
+            <a:extLst>
+              <a:ext uri="{FF2B5EF4-FFF2-40B4-BE49-F238E27FC236}">
+                <a16:creationId xmlns:a16="http://schemas.microsoft.com/office/drawing/2014/main" id="{1802D59D-6A83-151A-EEA2-678960399BE4}"/>
+              </a:ext>
+            </a:extLst>
+          </p:cNvPr>
+          <p:cNvSpPr>
+            <a:spLocks noGrp="1"/>
+          </p:cNvSpPr>
+          <p:nvPr>
+            <p:ph type="title"/>
+          </p:nvPr>
+        </p:nvSpPr>
+        <p:spPr>
+          <a:xfrm>
+            <a:off x="428017" y="0"/>
+            <a:ext cx="10515600" cy="863601"/>
+          </a:xfrm>
+        </p:spPr>
+        <p:txBody>
+          <a:bodyPr>
+            <a:normAutofit/>
+          </a:bodyPr>
+          <a:lstStyle/>
+          <a:p>
+            <a:r>
+              <a:rPr lang="ru-RU" sz="4000" b="1" dirty="0"/>
+              <a:t>Заключение</a:t>
+            </a:r>
+          </a:p>
+        </p:txBody>
+      </p:sp>
+      <p:sp>
+        <p:nvSpPr>
+          <p:cNvPr id="3" name="Номер слайда 2">
+            <a:extLst>
+              <a:ext uri="{FF2B5EF4-FFF2-40B4-BE49-F238E27FC236}">
+                <a16:creationId xmlns:a16="http://schemas.microsoft.com/office/drawing/2014/main" id="{EB930BD0-D85B-F112-101C-B409455C44FB}"/>
+              </a:ext>
+            </a:extLst>
+          </p:cNvPr>
+          <p:cNvSpPr>
+            <a:spLocks noGrp="1"/>
+          </p:cNvSpPr>
+          <p:nvPr>
+            <p:ph type="sldNum" sz="quarter" idx="12"/>
+          </p:nvPr>
+        </p:nvSpPr>
+        <p:spPr/>
+        <p:txBody>
+          <a:bodyPr/>
+          <a:lstStyle/>
+          <a:p>
+            <a:fld id="{E83D2FD5-BBDA-43D0-B172-791327EA2B6A}" type="slidenum">
+              <a:rPr lang="ru-RU" smtClean="0"/>
+              <a:t>15</a:t>
             </a:fld>
             <a:endParaRPr lang="ru-RU" dirty="0"/>
           </a:p>
@@ -5346,7 +6021,23 @@
                 <a:latin typeface="Times New Roman" panose="02020603050405020304" pitchFamily="18" charset="0"/>
                 <a:ea typeface="Times New Roman" panose="02020603050405020304" pitchFamily="18" charset="0"/>
               </a:rPr>
-              <a:t>Слайд о перспективах дальнейшего развития</a:t>
+              <a:t>По итогу проделанной работы была достигнута </a:t>
+            </a:r>
+            <a:r>
+              <a:rPr lang="ru-RU" sz="2600" b="1" dirty="0">
+                <a:effectLst/>
+                <a:latin typeface="Times New Roman" panose="02020603050405020304" pitchFamily="18" charset="0"/>
+                <a:ea typeface="Times New Roman" panose="02020603050405020304" pitchFamily="18" charset="0"/>
+              </a:rPr>
+              <a:t>цель</a:t>
+            </a:r>
+            <a:r>
+              <a:rPr lang="ru-RU" sz="2600" dirty="0">
+                <a:effectLst/>
+                <a:latin typeface="Times New Roman" panose="02020603050405020304" pitchFamily="18" charset="0"/>
+                <a:ea typeface="Times New Roman" panose="02020603050405020304" pitchFamily="18" charset="0"/>
+              </a:rPr>
+              <a:t> - разработан и программно реализован метод анализа активности пользователей САПР с использованием поиска последовательных шаблонов.</a:t>
             </a:r>
           </a:p>
           <a:p>
@@ -5362,24 +6053,300 @@
                 <a:latin typeface="Times New Roman" panose="02020603050405020304" pitchFamily="18" charset="0"/>
                 <a:ea typeface="Times New Roman" panose="02020603050405020304" pitchFamily="18" charset="0"/>
               </a:rPr>
-              <a:t>(Не будет вопросов о недостатках)</a:t>
-            </a:r>
-          </a:p>
-          <a:p>
-            <a:pPr indent="0">
-              <a:lnSpc>
-                <a:spcPct val="100000"/>
-              </a:lnSpc>
-              <a:buNone/>
-            </a:pPr>
+              <a:t>Также были решены все поставленные </a:t>
+            </a:r>
+            <a:r>
+              <a:rPr lang="ru-RU" sz="2600" b="1" dirty="0">
+                <a:effectLst/>
+                <a:latin typeface="Times New Roman" panose="02020603050405020304" pitchFamily="18" charset="0"/>
+                <a:ea typeface="Times New Roman" panose="02020603050405020304" pitchFamily="18" charset="0"/>
+              </a:rPr>
+              <a:t>задачи</a:t>
+            </a:r>
             <a:r>
               <a:rPr lang="ru-RU" sz="2600" dirty="0">
                 <a:effectLst/>
                 <a:latin typeface="Times New Roman" panose="02020603050405020304" pitchFamily="18" charset="0"/>
                 <a:ea typeface="Times New Roman" panose="02020603050405020304" pitchFamily="18" charset="0"/>
               </a:rPr>
-              <a:t>(Неплохо иметь ссылку на статью)</a:t>
-            </a:r>
+              <a:t>, а именно:</a:t>
+            </a:r>
+          </a:p>
+          <a:p>
+            <a:pPr marL="742950" indent="-514350">
+              <a:lnSpc>
+                <a:spcPct val="100000"/>
+              </a:lnSpc>
+              <a:buFont typeface="+mj-lt"/>
+              <a:buAutoNum type="arabicParenR"/>
+            </a:pPr>
+            <a:r>
+              <a:rPr lang="ru-RU" sz="2600" dirty="0">
+                <a:effectLst/>
+                <a:latin typeface="Times New Roman" panose="02020603050405020304" pitchFamily="18" charset="0"/>
+                <a:ea typeface="Times New Roman" panose="02020603050405020304" pitchFamily="18" charset="0"/>
+              </a:rPr>
+              <a:t>рассмотрены существующие решения в области анализа активности пользователей, выбраны для них критерии оценки и проведено сравнение;</a:t>
+            </a:r>
+          </a:p>
+          <a:p>
+            <a:pPr marL="742950" indent="-514350">
+              <a:lnSpc>
+                <a:spcPct val="100000"/>
+              </a:lnSpc>
+              <a:buFont typeface="+mj-lt"/>
+              <a:buAutoNum type="arabicParenR"/>
+            </a:pPr>
+            <a:r>
+              <a:rPr lang="ru-RU" sz="2600" dirty="0">
+                <a:effectLst/>
+                <a:latin typeface="Times New Roman" panose="02020603050405020304" pitchFamily="18" charset="0"/>
+                <a:ea typeface="Times New Roman" panose="02020603050405020304" pitchFamily="18" charset="0"/>
+              </a:rPr>
+              <a:t>формализована задача в виде IDEF0-диаграммы;</a:t>
+            </a:r>
+          </a:p>
+          <a:p>
+            <a:pPr marL="742950" indent="-514350">
+              <a:lnSpc>
+                <a:spcPct val="100000"/>
+              </a:lnSpc>
+              <a:buFont typeface="+mj-lt"/>
+              <a:buAutoNum type="arabicParenR"/>
+            </a:pPr>
+            <a:r>
+              <a:rPr lang="ru-RU" sz="2600" dirty="0">
+                <a:effectLst/>
+                <a:latin typeface="Times New Roman" panose="02020603050405020304" pitchFamily="18" charset="0"/>
+                <a:ea typeface="Times New Roman" panose="02020603050405020304" pitchFamily="18" charset="0"/>
+              </a:rPr>
+              <a:t>разработан метод анализа активности пользователей САПР с использованием поиска последовательных шаблонов;</a:t>
+            </a:r>
+          </a:p>
+          <a:p>
+            <a:pPr marL="742950" indent="-514350">
+              <a:lnSpc>
+                <a:spcPct val="100000"/>
+              </a:lnSpc>
+              <a:buFont typeface="+mj-lt"/>
+              <a:buAutoNum type="arabicParenR"/>
+            </a:pPr>
+            <a:r>
+              <a:rPr lang="ru-RU" sz="2600" dirty="0">
+                <a:effectLst/>
+                <a:latin typeface="Times New Roman" panose="02020603050405020304" pitchFamily="18" charset="0"/>
+                <a:ea typeface="Times New Roman" panose="02020603050405020304" pitchFamily="18" charset="0"/>
+              </a:rPr>
+              <a:t>разработано программное обеспечение, реализующее описанный метод;</a:t>
+            </a:r>
+            <a:endParaRPr lang="ru-RU" sz="2600" dirty="0">
+              <a:latin typeface="Times New Roman" panose="02020603050405020304" pitchFamily="18" charset="0"/>
+              <a:ea typeface="Times New Roman" panose="02020603050405020304" pitchFamily="18" charset="0"/>
+            </a:endParaRPr>
+          </a:p>
+          <a:p>
+            <a:pPr marL="742950" indent="-514350">
+              <a:lnSpc>
+                <a:spcPct val="100000"/>
+              </a:lnSpc>
+              <a:buFont typeface="+mj-lt"/>
+              <a:buAutoNum type="arabicParenR"/>
+            </a:pPr>
+            <a:r>
+              <a:rPr lang="ru-RU" sz="2600" dirty="0">
+                <a:effectLst/>
+                <a:latin typeface="Times New Roman" panose="02020603050405020304" pitchFamily="18" charset="0"/>
+                <a:ea typeface="Times New Roman" panose="02020603050405020304" pitchFamily="18" charset="0"/>
+              </a:rPr>
+              <a:t>исследованы характеристики разработанного метода.</a:t>
+            </a:r>
+          </a:p>
+        </p:txBody>
+      </p:sp>
+    </p:spTree>
+    <p:extLst>
+      <p:ext uri="{BB962C8B-B14F-4D97-AF65-F5344CB8AC3E}">
+        <p14:creationId xmlns:p14="http://schemas.microsoft.com/office/powerpoint/2010/main" val="1045649332"/>
+      </p:ext>
+    </p:extLst>
+  </p:cSld>
+  <p:clrMapOvr>
+    <a:masterClrMapping/>
+  </p:clrMapOvr>
+</p:sld>
+</file>
+
+<file path=ppt/slides/slide16.xml><?xml version="1.0" encoding="utf-8"?>
+<p:sld xmlns:a="http://schemas.openxmlformats.org/drawingml/2006/main" xmlns:r="http://schemas.openxmlformats.org/officeDocument/2006/relationships" xmlns:p="http://schemas.openxmlformats.org/presentationml/2006/main">
+  <p:cSld>
+    <p:spTree>
+      <p:nvGrpSpPr>
+        <p:cNvPr id="1" name=""/>
+        <p:cNvGrpSpPr/>
+        <p:nvPr/>
+      </p:nvGrpSpPr>
+      <p:grpSpPr>
+        <a:xfrm>
+          <a:off x="0" y="0"/>
+          <a:ext cx="0" cy="0"/>
+          <a:chOff x="0" y="0"/>
+          <a:chExt cx="0" cy="0"/>
+        </a:xfrm>
+      </p:grpSpPr>
+      <p:sp>
+        <p:nvSpPr>
+          <p:cNvPr id="2" name="Заголовок 1">
+            <a:extLst>
+              <a:ext uri="{FF2B5EF4-FFF2-40B4-BE49-F238E27FC236}">
+                <a16:creationId xmlns:a16="http://schemas.microsoft.com/office/drawing/2014/main" id="{1802D59D-6A83-151A-EEA2-678960399BE4}"/>
+              </a:ext>
+            </a:extLst>
+          </p:cNvPr>
+          <p:cNvSpPr>
+            <a:spLocks noGrp="1"/>
+          </p:cNvSpPr>
+          <p:nvPr>
+            <p:ph type="title"/>
+          </p:nvPr>
+        </p:nvSpPr>
+        <p:spPr>
+          <a:xfrm>
+            <a:off x="428017" y="0"/>
+            <a:ext cx="10515600" cy="863601"/>
+          </a:xfrm>
+        </p:spPr>
+        <p:txBody>
+          <a:bodyPr>
+            <a:normAutofit/>
+          </a:bodyPr>
+          <a:lstStyle/>
+          <a:p>
+            <a:r>
+              <a:rPr lang="ru-RU" sz="4000" b="1" dirty="0">
+                <a:effectLst/>
+                <a:ea typeface="Times New Roman" panose="02020603050405020304" pitchFamily="18" charset="0"/>
+              </a:rPr>
+              <a:t>Перспективы дальнейшего развития</a:t>
+            </a:r>
+            <a:endParaRPr lang="ru-RU" sz="4000" b="1" dirty="0"/>
+          </a:p>
+        </p:txBody>
+      </p:sp>
+      <p:sp>
+        <p:nvSpPr>
+          <p:cNvPr id="3" name="Номер слайда 2">
+            <a:extLst>
+              <a:ext uri="{FF2B5EF4-FFF2-40B4-BE49-F238E27FC236}">
+                <a16:creationId xmlns:a16="http://schemas.microsoft.com/office/drawing/2014/main" id="{EB930BD0-D85B-F112-101C-B409455C44FB}"/>
+              </a:ext>
+            </a:extLst>
+          </p:cNvPr>
+          <p:cNvSpPr>
+            <a:spLocks noGrp="1"/>
+          </p:cNvSpPr>
+          <p:nvPr>
+            <p:ph type="sldNum" sz="quarter" idx="12"/>
+          </p:nvPr>
+        </p:nvSpPr>
+        <p:spPr/>
+        <p:txBody>
+          <a:bodyPr/>
+          <a:lstStyle/>
+          <a:p>
+            <a:fld id="{E83D2FD5-BBDA-43D0-B172-791327EA2B6A}" type="slidenum">
+              <a:rPr lang="ru-RU" smtClean="0"/>
+              <a:t>16</a:t>
+            </a:fld>
+            <a:endParaRPr lang="ru-RU" dirty="0"/>
+          </a:p>
+        </p:txBody>
+      </p:sp>
+      <p:sp>
+        <p:nvSpPr>
+          <p:cNvPr id="5" name="Объект 2">
+            <a:extLst>
+              <a:ext uri="{FF2B5EF4-FFF2-40B4-BE49-F238E27FC236}">
+                <a16:creationId xmlns:a16="http://schemas.microsoft.com/office/drawing/2014/main" id="{02C33000-B0B7-4509-AD8C-600B0EFAA229}"/>
+              </a:ext>
+            </a:extLst>
+          </p:cNvPr>
+          <p:cNvSpPr>
+            <a:spLocks noGrp="1"/>
+          </p:cNvSpPr>
+          <p:nvPr>
+            <p:ph idx="1"/>
+          </p:nvPr>
+        </p:nvSpPr>
+        <p:spPr>
+          <a:xfrm>
+            <a:off x="428017" y="863601"/>
+            <a:ext cx="11182378" cy="5994398"/>
+          </a:xfrm>
+        </p:spPr>
+        <p:txBody>
+          <a:bodyPr>
+            <a:noAutofit/>
+          </a:bodyPr>
+          <a:lstStyle/>
+          <a:p>
+            <a:pPr marL="685800" indent="-457200">
+              <a:lnSpc>
+                <a:spcPct val="100000"/>
+              </a:lnSpc>
+            </a:pPr>
+            <a:r>
+              <a:rPr lang="ru-RU" sz="2600" dirty="0">
+                <a:latin typeface="Times New Roman" panose="02020603050405020304" pitchFamily="18" charset="0"/>
+                <a:ea typeface="Times New Roman" panose="02020603050405020304" pitchFamily="18" charset="0"/>
+              </a:rPr>
+              <a:t>в</a:t>
+            </a:r>
+            <a:r>
+              <a:rPr lang="ru-RU" sz="2600" dirty="0">
+                <a:effectLst/>
+                <a:latin typeface="Times New Roman" panose="02020603050405020304" pitchFamily="18" charset="0"/>
+                <a:ea typeface="Times New Roman" panose="02020603050405020304" pitchFamily="18" charset="0"/>
+              </a:rPr>
+              <a:t>озможность предсказания следующей команды;</a:t>
+            </a:r>
+          </a:p>
+          <a:p>
+            <a:pPr marL="685800" indent="-457200">
+              <a:lnSpc>
+                <a:spcPct val="100000"/>
+              </a:lnSpc>
+            </a:pPr>
+            <a:r>
+              <a:rPr lang="ru-RU" sz="2600" dirty="0">
+                <a:latin typeface="Times New Roman" panose="02020603050405020304" pitchFamily="18" charset="0"/>
+                <a:ea typeface="Times New Roman" panose="02020603050405020304" pitchFamily="18" charset="0"/>
+              </a:rPr>
+              <a:t>подсчет процента содержания найденных последовательностей в сессиях или других характеристик для получения дополнительной информации;</a:t>
+            </a:r>
+            <a:endParaRPr lang="ru-RU" sz="2600" dirty="0">
+              <a:effectLst/>
+              <a:latin typeface="Times New Roman" panose="02020603050405020304" pitchFamily="18" charset="0"/>
+              <a:ea typeface="Times New Roman" panose="02020603050405020304" pitchFamily="18" charset="0"/>
+            </a:endParaRPr>
+          </a:p>
+          <a:p>
+            <a:pPr marL="685800" indent="-457200">
+              <a:lnSpc>
+                <a:spcPct val="100000"/>
+              </a:lnSpc>
+            </a:pPr>
+            <a:r>
+              <a:rPr lang="ru-RU" sz="2600" dirty="0">
+                <a:latin typeface="Times New Roman" panose="02020603050405020304" pitchFamily="18" charset="0"/>
+                <a:ea typeface="Times New Roman" panose="02020603050405020304" pitchFamily="18" charset="0"/>
+              </a:rPr>
+              <a:t>Что-то еще.</a:t>
+            </a:r>
+            <a:endParaRPr lang="ru-RU" sz="2600" dirty="0">
+              <a:effectLst/>
+              <a:latin typeface="Times New Roman" panose="02020603050405020304" pitchFamily="18" charset="0"/>
+              <a:ea typeface="Times New Roman" panose="02020603050405020304" pitchFamily="18" charset="0"/>
+            </a:endParaRPr>
           </a:p>
         </p:txBody>
       </p:sp>
@@ -5443,7 +6410,7 @@
           <a:p>
             <a:r>
               <a:rPr lang="ru-RU" sz="4000" b="1" dirty="0"/>
-              <a:t>Цель и задачи</a:t>
+              <a:t>Актуальность</a:t>
             </a:r>
           </a:p>
         </p:txBody>
@@ -5505,143 +6472,93 @@
           </a:bodyPr>
           <a:lstStyle/>
           <a:p>
-            <a:pPr indent="0">
+            <a:pPr marL="685800" indent="-457200">
               <a:lnSpc>
                 <a:spcPct val="100000"/>
               </a:lnSpc>
-              <a:buNone/>
             </a:pPr>
             <a:r>
-              <a:rPr lang="ru-RU" sz="2600" b="1" dirty="0">
+              <a:rPr lang="ru-RU" sz="2600" dirty="0">
                 <a:effectLst/>
                 <a:latin typeface="Times New Roman" panose="02020603050405020304" pitchFamily="18" charset="0"/>
                 <a:ea typeface="Times New Roman" panose="02020603050405020304" pitchFamily="18" charset="0"/>
               </a:rPr>
-              <a:t>Цель: </a:t>
-            </a:r>
+              <a:t>Оптимизация пользовательского опыта</a:t>
+            </a:r>
+            <a:endParaRPr lang="en-US" sz="2600" dirty="0">
+              <a:effectLst/>
+              <a:latin typeface="Times New Roman" panose="02020603050405020304" pitchFamily="18" charset="0"/>
+              <a:ea typeface="Times New Roman" panose="02020603050405020304" pitchFamily="18" charset="0"/>
+            </a:endParaRPr>
+          </a:p>
+          <a:p>
+            <a:pPr marL="685800" indent="-457200">
+              <a:lnSpc>
+                <a:spcPct val="100000"/>
+              </a:lnSpc>
+            </a:pPr>
             <a:r>
               <a:rPr lang="ru-RU" sz="2600" dirty="0">
+                <a:solidFill>
+                  <a:schemeClr val="bg1">
+                    <a:lumMod val="50000"/>
+                  </a:schemeClr>
+                </a:solidFill>
+                <a:effectLst/>
                 <a:latin typeface="Times New Roman" panose="02020603050405020304" pitchFamily="18" charset="0"/>
                 <a:ea typeface="Times New Roman" panose="02020603050405020304" pitchFamily="18" charset="0"/>
               </a:rPr>
-              <a:t>разработать и программно реализовать метод анализа активности пользователей САПР с использованием поиска последовательных шаблонов.</a:t>
-            </a:r>
+              <a:t>Выявление необычного или нежелательного поведения</a:t>
+            </a:r>
+            <a:endParaRPr lang="en-US" sz="2600" dirty="0">
+              <a:solidFill>
+                <a:schemeClr val="bg1">
+                  <a:lumMod val="50000"/>
+                </a:schemeClr>
+              </a:solidFill>
+              <a:effectLst/>
+              <a:latin typeface="Times New Roman" panose="02020603050405020304" pitchFamily="18" charset="0"/>
+              <a:ea typeface="Times New Roman" panose="02020603050405020304" pitchFamily="18" charset="0"/>
+            </a:endParaRPr>
+          </a:p>
+          <a:p>
+            <a:pPr marL="685800" indent="-457200">
+              <a:lnSpc>
+                <a:spcPct val="100000"/>
+              </a:lnSpc>
+            </a:pPr>
+            <a:r>
+              <a:rPr lang="ru-RU" sz="2600" dirty="0">
+                <a:effectLst/>
+                <a:latin typeface="Times New Roman" panose="02020603050405020304" pitchFamily="18" charset="0"/>
+                <a:ea typeface="Times New Roman" panose="02020603050405020304" pitchFamily="18" charset="0"/>
+              </a:rPr>
+              <a:t>Улучшение процесса разработки</a:t>
+            </a:r>
+            <a:endParaRPr lang="en-US" sz="2600" dirty="0">
+              <a:effectLst/>
+              <a:latin typeface="Times New Roman" panose="02020603050405020304" pitchFamily="18" charset="0"/>
+              <a:ea typeface="Times New Roman" panose="02020603050405020304" pitchFamily="18" charset="0"/>
+            </a:endParaRPr>
+          </a:p>
+          <a:p>
+            <a:pPr marL="685800" indent="-457200">
+              <a:lnSpc>
+                <a:spcPct val="100000"/>
+              </a:lnSpc>
+            </a:pPr>
             <a:endParaRPr lang="ru-RU" sz="2600" dirty="0">
               <a:effectLst/>
               <a:latin typeface="Times New Roman" panose="02020603050405020304" pitchFamily="18" charset="0"/>
               <a:ea typeface="Times New Roman" panose="02020603050405020304" pitchFamily="18" charset="0"/>
             </a:endParaRPr>
           </a:p>
-          <a:p>
-            <a:pPr indent="0">
-              <a:lnSpc>
-                <a:spcPct val="100000"/>
-              </a:lnSpc>
-              <a:buNone/>
-            </a:pPr>
-            <a:r>
-              <a:rPr lang="ru-RU" sz="2600" b="1" dirty="0">
-                <a:latin typeface="Times New Roman" panose="02020603050405020304" pitchFamily="18" charset="0"/>
-                <a:ea typeface="Times New Roman" panose="02020603050405020304" pitchFamily="18" charset="0"/>
-              </a:rPr>
-              <a:t>Задачи</a:t>
-            </a:r>
-            <a:r>
-              <a:rPr lang="ru-RU" sz="2600" dirty="0">
-                <a:latin typeface="Times New Roman" panose="02020603050405020304" pitchFamily="18" charset="0"/>
-                <a:ea typeface="Times New Roman" panose="02020603050405020304" pitchFamily="18" charset="0"/>
-              </a:rPr>
-              <a:t>:</a:t>
-            </a:r>
-          </a:p>
-          <a:p>
-            <a:pPr marL="685800" indent="-457200">
-              <a:lnSpc>
-                <a:spcPct val="100000"/>
-              </a:lnSpc>
-              <a:buFont typeface="+mj-lt"/>
-              <a:buAutoNum type="arabicParenR"/>
-            </a:pPr>
-            <a:r>
-              <a:rPr lang="ru-RU" sz="2600" dirty="0">
-                <a:latin typeface="Times New Roman" panose="02020603050405020304" pitchFamily="18" charset="0"/>
-                <a:ea typeface="Times New Roman" panose="02020603050405020304" pitchFamily="18" charset="0"/>
-              </a:rPr>
-              <a:t> рассмотреть существующие решения в области анализа активности пользователей, выбрать для них критерии оценки и сравнить;</a:t>
-            </a:r>
-          </a:p>
-          <a:p>
-            <a:pPr marL="685800" indent="-457200">
-              <a:lnSpc>
-                <a:spcPct val="100000"/>
-              </a:lnSpc>
-              <a:buFont typeface="+mj-lt"/>
-              <a:buAutoNum type="arabicParenR"/>
-            </a:pPr>
-            <a:r>
-              <a:rPr lang="ru-RU" sz="2600" dirty="0">
-                <a:latin typeface="Times New Roman" panose="02020603050405020304" pitchFamily="18" charset="0"/>
-                <a:ea typeface="Times New Roman" panose="02020603050405020304" pitchFamily="18" charset="0"/>
-              </a:rPr>
-              <a:t>формализовать задачу в виде IDEF0-диаграммы;</a:t>
-            </a:r>
-          </a:p>
-          <a:p>
-            <a:pPr marL="685800" indent="-457200">
-              <a:lnSpc>
-                <a:spcPct val="100000"/>
-              </a:lnSpc>
-              <a:buFont typeface="+mj-lt"/>
-              <a:buAutoNum type="arabicParenR"/>
-            </a:pPr>
-            <a:r>
-              <a:rPr lang="ru-RU" sz="2600" dirty="0">
-                <a:latin typeface="Times New Roman" panose="02020603050405020304" pitchFamily="18" charset="0"/>
-                <a:ea typeface="Times New Roman" panose="02020603050405020304" pitchFamily="18" charset="0"/>
-              </a:rPr>
-              <a:t>разработать метод анализа активности пользователей САПР с использованием поиска последовательных шаблонов;</a:t>
-            </a:r>
-          </a:p>
-          <a:p>
-            <a:pPr marL="685800" indent="-457200">
-              <a:lnSpc>
-                <a:spcPct val="100000"/>
-              </a:lnSpc>
-              <a:buFont typeface="+mj-lt"/>
-              <a:buAutoNum type="arabicParenR"/>
-            </a:pPr>
-            <a:r>
-              <a:rPr lang="ru-RU" sz="2600" dirty="0">
-                <a:effectLst/>
-                <a:latin typeface="Times New Roman" panose="02020603050405020304" pitchFamily="18" charset="0"/>
-                <a:ea typeface="Times New Roman" panose="02020603050405020304" pitchFamily="18" charset="0"/>
-              </a:rPr>
-              <a:t>разработать программное обеспечение, реализующее описанный метод;</a:t>
-            </a:r>
-          </a:p>
-          <a:p>
-            <a:pPr marL="685800" indent="-457200">
-              <a:lnSpc>
-                <a:spcPct val="100000"/>
-              </a:lnSpc>
-              <a:buFont typeface="+mj-lt"/>
-              <a:buAutoNum type="arabicParenR"/>
-            </a:pPr>
-            <a:r>
-              <a:rPr lang="ru-RU" sz="2600" dirty="0">
-                <a:effectLst/>
-                <a:latin typeface="Times New Roman" panose="02020603050405020304" pitchFamily="18" charset="0"/>
-                <a:ea typeface="Times New Roman" panose="02020603050405020304" pitchFamily="18" charset="0"/>
-              </a:rPr>
-              <a:t>исследовать характеристики разработанного метода.</a:t>
-            </a:r>
-          </a:p>
         </p:txBody>
       </p:sp>
     </p:spTree>
     <p:extLst>
       <p:ext uri="{BB962C8B-B14F-4D97-AF65-F5344CB8AC3E}">
-        <p14:creationId xmlns:p14="http://schemas.microsoft.com/office/powerpoint/2010/main" val="2732266898"/>
+        <p14:creationId xmlns:p14="http://schemas.microsoft.com/office/powerpoint/2010/main" val="1220759790"/>
       </p:ext>
     </p:extLst>
   </p:cSld>
@@ -5686,8 +6603,8 @@
         </p:nvSpPr>
         <p:spPr>
           <a:xfrm>
-            <a:off x="428017" y="-72232"/>
-            <a:ext cx="10515600" cy="1325563"/>
+            <a:off x="428017" y="0"/>
+            <a:ext cx="10515600" cy="863601"/>
           </a:xfrm>
         </p:spPr>
         <p:txBody>
@@ -5698,17 +6615,17 @@
           <a:p>
             <a:r>
               <a:rPr lang="ru-RU" sz="4000" b="1" dirty="0"/>
-              <a:t>Формализованная постановка задачи</a:t>
-            </a:r>
-          </a:p>
-        </p:txBody>
-      </p:sp>
-      <p:sp>
-        <p:nvSpPr>
-          <p:cNvPr id="4" name="Номер слайда 3">
-            <a:extLst>
-              <a:ext uri="{FF2B5EF4-FFF2-40B4-BE49-F238E27FC236}">
-                <a16:creationId xmlns:a16="http://schemas.microsoft.com/office/drawing/2014/main" id="{80FEEFAF-0D6B-464C-7360-370FF23083CC}"/>
+              <a:t>Цель и задачи</a:t>
+            </a:r>
+          </a:p>
+        </p:txBody>
+      </p:sp>
+      <p:sp>
+        <p:nvSpPr>
+          <p:cNvPr id="3" name="Номер слайда 2">
+            <a:extLst>
+              <a:ext uri="{FF2B5EF4-FFF2-40B4-BE49-F238E27FC236}">
+                <a16:creationId xmlns:a16="http://schemas.microsoft.com/office/drawing/2014/main" id="{EB930BD0-D85B-F112-101C-B409455C44FB}"/>
               </a:ext>
             </a:extLst>
           </p:cNvPr>
@@ -5732,62 +6649,26 @@
           </a:p>
         </p:txBody>
       </p:sp>
-      <p:pic>
-        <p:nvPicPr>
-          <p:cNvPr id="11" name="Рисунок 10">
-            <a:extLst>
-              <a:ext uri="{FF2B5EF4-FFF2-40B4-BE49-F238E27FC236}">
-                <a16:creationId xmlns:a16="http://schemas.microsoft.com/office/drawing/2014/main" id="{6B7F2072-E69E-44B3-887F-44B338B78A45}"/>
-              </a:ext>
-            </a:extLst>
-          </p:cNvPr>
-          <p:cNvPicPr>
-            <a:picLocks noChangeAspect="1"/>
-          </p:cNvPicPr>
-          <p:nvPr/>
-        </p:nvPicPr>
-        <p:blipFill>
-          <a:blip r:embed="rId2">
-            <a:extLst>
-              <a:ext uri="{28A0092B-C50C-407E-A947-70E740481C1C}">
-                <a14:useLocalDpi xmlns:a14="http://schemas.microsoft.com/office/drawing/2010/main" val="0"/>
-              </a:ext>
-            </a:extLst>
-          </a:blip>
-          <a:stretch>
-            <a:fillRect/>
-          </a:stretch>
-        </p:blipFill>
+      <p:sp>
+        <p:nvSpPr>
+          <p:cNvPr id="5" name="Объект 2">
+            <a:extLst>
+              <a:ext uri="{FF2B5EF4-FFF2-40B4-BE49-F238E27FC236}">
+                <a16:creationId xmlns:a16="http://schemas.microsoft.com/office/drawing/2014/main" id="{02C33000-B0B7-4509-AD8C-600B0EFAA229}"/>
+              </a:ext>
+            </a:extLst>
+          </p:cNvPr>
+          <p:cNvSpPr>
+            <a:spLocks noGrp="1"/>
+          </p:cNvSpPr>
+          <p:nvPr>
+            <p:ph idx="1"/>
+          </p:nvPr>
+        </p:nvSpPr>
         <p:spPr>
           <a:xfrm>
-            <a:off x="0" y="2187872"/>
-            <a:ext cx="12192000" cy="2482256"/>
-          </a:xfrm>
-          <a:prstGeom prst="rect">
-            <a:avLst/>
-          </a:prstGeom>
-        </p:spPr>
-      </p:pic>
-      <p:sp>
-        <p:nvSpPr>
-          <p:cNvPr id="14" name="Объект 2">
-            <a:extLst>
-              <a:ext uri="{FF2B5EF4-FFF2-40B4-BE49-F238E27FC236}">
-                <a16:creationId xmlns:a16="http://schemas.microsoft.com/office/drawing/2014/main" id="{EAC84F1B-0B39-483B-AEDA-2406117284B8}"/>
-              </a:ext>
-            </a:extLst>
-          </p:cNvPr>
-          <p:cNvSpPr>
-            <a:spLocks noGrp="1"/>
-          </p:cNvSpPr>
-          <p:nvPr>
-            <p:ph idx="1"/>
-          </p:nvPr>
-        </p:nvSpPr>
-        <p:spPr>
-          <a:xfrm>
-            <a:off x="428017" y="844553"/>
-            <a:ext cx="11182378" cy="5168894"/>
+            <a:off x="428017" y="863601"/>
+            <a:ext cx="11182378" cy="5994398"/>
           </a:xfrm>
         </p:spPr>
         <p:txBody>
@@ -5803,11 +6684,19 @@
               <a:buNone/>
             </a:pPr>
             <a:r>
+              <a:rPr lang="ru-RU" sz="2600" b="1" dirty="0">
+                <a:effectLst/>
+                <a:latin typeface="Times New Roman" panose="02020603050405020304" pitchFamily="18" charset="0"/>
+                <a:ea typeface="Times New Roman" panose="02020603050405020304" pitchFamily="18" charset="0"/>
+              </a:rPr>
+              <a:t>Цель: </a:t>
+            </a:r>
+            <a:r>
               <a:rPr lang="ru-RU" sz="2600" dirty="0">
                 <a:latin typeface="Times New Roman" panose="02020603050405020304" pitchFamily="18" charset="0"/>
                 <a:ea typeface="Times New Roman" panose="02020603050405020304" pitchFamily="18" charset="0"/>
               </a:rPr>
-              <a:t>Добавить текст?</a:t>
+              <a:t>разработать и программно реализовать метод анализа активности пользователей САПР с использованием поиска последовательных шаблонов.</a:t>
             </a:r>
             <a:endParaRPr lang="ru-RU" sz="2600" dirty="0">
               <a:effectLst/>
@@ -5815,12 +6704,116 @@
               <a:ea typeface="Times New Roman" panose="02020603050405020304" pitchFamily="18" charset="0"/>
             </a:endParaRPr>
           </a:p>
+          <a:p>
+            <a:pPr indent="0">
+              <a:lnSpc>
+                <a:spcPct val="100000"/>
+              </a:lnSpc>
+              <a:buNone/>
+            </a:pPr>
+            <a:r>
+              <a:rPr lang="ru-RU" sz="2600" b="1" dirty="0">
+                <a:latin typeface="Times New Roman" panose="02020603050405020304" pitchFamily="18" charset="0"/>
+                <a:ea typeface="Times New Roman" panose="02020603050405020304" pitchFamily="18" charset="0"/>
+              </a:rPr>
+              <a:t>Задачи</a:t>
+            </a:r>
+            <a:r>
+              <a:rPr lang="ru-RU" sz="2600" dirty="0">
+                <a:latin typeface="Times New Roman" panose="02020603050405020304" pitchFamily="18" charset="0"/>
+                <a:ea typeface="Times New Roman" panose="02020603050405020304" pitchFamily="18" charset="0"/>
+              </a:rPr>
+              <a:t>:</a:t>
+            </a:r>
+          </a:p>
+          <a:p>
+            <a:pPr marL="685800" indent="-457200">
+              <a:lnSpc>
+                <a:spcPct val="100000"/>
+              </a:lnSpc>
+              <a:buFont typeface="+mj-lt"/>
+              <a:buAutoNum type="arabicParenR"/>
+            </a:pPr>
+            <a:r>
+              <a:rPr lang="ru-RU" sz="2600" dirty="0">
+                <a:latin typeface="Times New Roman" panose="02020603050405020304" pitchFamily="18" charset="0"/>
+                <a:ea typeface="Times New Roman" panose="02020603050405020304" pitchFamily="18" charset="0"/>
+              </a:rPr>
+              <a:t> рассмотреть существующие решения в области анализа активности пользователей, выбрать для них критерии оценки и сравнить;</a:t>
+            </a:r>
+          </a:p>
+          <a:p>
+            <a:pPr marL="685800" indent="-457200">
+              <a:lnSpc>
+                <a:spcPct val="100000"/>
+              </a:lnSpc>
+              <a:buFont typeface="+mj-lt"/>
+              <a:buAutoNum type="arabicParenR"/>
+            </a:pPr>
+            <a:r>
+              <a:rPr lang="ru-RU" sz="2600" dirty="0">
+                <a:latin typeface="Times New Roman" panose="02020603050405020304" pitchFamily="18" charset="0"/>
+                <a:ea typeface="Times New Roman" panose="02020603050405020304" pitchFamily="18" charset="0"/>
+              </a:rPr>
+              <a:t>формализовать задачу в виде IDEF0-диаграммы;</a:t>
+            </a:r>
+          </a:p>
+          <a:p>
+            <a:pPr marL="685800" indent="-457200">
+              <a:lnSpc>
+                <a:spcPct val="100000"/>
+              </a:lnSpc>
+              <a:buFont typeface="+mj-lt"/>
+              <a:buAutoNum type="arabicParenR"/>
+            </a:pPr>
+            <a:r>
+              <a:rPr lang="ru-RU" sz="2600" dirty="0">
+                <a:latin typeface="Times New Roman" panose="02020603050405020304" pitchFamily="18" charset="0"/>
+                <a:ea typeface="Times New Roman" panose="02020603050405020304" pitchFamily="18" charset="0"/>
+              </a:rPr>
+              <a:t>разработать метод анализа активности пользователей САПР с использованием поиска последовательных шаблонов;</a:t>
+            </a:r>
+          </a:p>
+          <a:p>
+            <a:pPr marL="685800" indent="-457200">
+              <a:lnSpc>
+                <a:spcPct val="100000"/>
+              </a:lnSpc>
+              <a:buFont typeface="+mj-lt"/>
+              <a:buAutoNum type="arabicParenR"/>
+            </a:pPr>
+            <a:r>
+              <a:rPr lang="ru-RU" sz="2600" dirty="0">
+                <a:effectLst/>
+                <a:latin typeface="Times New Roman" panose="02020603050405020304" pitchFamily="18" charset="0"/>
+                <a:ea typeface="Times New Roman" panose="02020603050405020304" pitchFamily="18" charset="0"/>
+              </a:rPr>
+              <a:t>разработать программное обеспечение, реализующее описанный метод;</a:t>
+            </a:r>
+          </a:p>
+          <a:p>
+            <a:pPr marL="685800" indent="-457200">
+              <a:lnSpc>
+                <a:spcPct val="100000"/>
+              </a:lnSpc>
+              <a:buFont typeface="+mj-lt"/>
+              <a:buAutoNum type="arabicParenR"/>
+            </a:pPr>
+            <a:r>
+              <a:rPr lang="ru-RU" sz="2600" dirty="0">
+                <a:effectLst/>
+                <a:latin typeface="Times New Roman" panose="02020603050405020304" pitchFamily="18" charset="0"/>
+                <a:ea typeface="Times New Roman" panose="02020603050405020304" pitchFamily="18" charset="0"/>
+              </a:rPr>
+              <a:t>исследовать характеристики разработанного метода.</a:t>
+            </a:r>
+          </a:p>
         </p:txBody>
       </p:sp>
     </p:spTree>
     <p:extLst>
       <p:ext uri="{BB962C8B-B14F-4D97-AF65-F5344CB8AC3E}">
-        <p14:creationId xmlns:p14="http://schemas.microsoft.com/office/powerpoint/2010/main" val="324510479"/>
+        <p14:creationId xmlns:p14="http://schemas.microsoft.com/office/powerpoint/2010/main" val="2732266898"/>
       </p:ext>
     </p:extLst>
   </p:cSld>
@@ -5849,41 +6842,6 @@
       </p:grpSpPr>
       <p:sp>
         <p:nvSpPr>
-          <p:cNvPr id="2" name="Заголовок 1">
-            <a:extLst>
-              <a:ext uri="{FF2B5EF4-FFF2-40B4-BE49-F238E27FC236}">
-                <a16:creationId xmlns:a16="http://schemas.microsoft.com/office/drawing/2014/main" id="{1802D59D-6A83-151A-EEA2-678960399BE4}"/>
-              </a:ext>
-            </a:extLst>
-          </p:cNvPr>
-          <p:cNvSpPr>
-            <a:spLocks noGrp="1"/>
-          </p:cNvSpPr>
-          <p:nvPr>
-            <p:ph type="title"/>
-          </p:nvPr>
-        </p:nvSpPr>
-        <p:spPr>
-          <a:xfrm>
-            <a:off x="428017" y="-72232"/>
-            <a:ext cx="10515600" cy="1325563"/>
-          </a:xfrm>
-        </p:spPr>
-        <p:txBody>
-          <a:bodyPr>
-            <a:normAutofit/>
-          </a:bodyPr>
-          <a:lstStyle/>
-          <a:p>
-            <a:r>
-              <a:rPr lang="ru-RU" sz="4000" b="1" dirty="0"/>
-              <a:t>Сравнение рассмотренных методов</a:t>
-            </a:r>
-          </a:p>
-        </p:txBody>
-      </p:sp>
-      <p:sp>
-        <p:nvSpPr>
           <p:cNvPr id="4" name="Номер слайда 3">
             <a:extLst>
               <a:ext uri="{FF2B5EF4-FFF2-40B4-BE49-F238E27FC236}">
@@ -5941,6 +6899,60 @@
           </a:prstGeom>
         </p:spPr>
       </p:pic>
+      <p:sp>
+        <p:nvSpPr>
+          <p:cNvPr id="6" name="Заголовок 1">
+            <a:extLst>
+              <a:ext uri="{FF2B5EF4-FFF2-40B4-BE49-F238E27FC236}">
+                <a16:creationId xmlns:a16="http://schemas.microsoft.com/office/drawing/2014/main" id="{2C315CE8-EECC-451A-B620-01380E7FC50B}"/>
+              </a:ext>
+            </a:extLst>
+          </p:cNvPr>
+          <p:cNvSpPr txBox="1">
+            <a:spLocks/>
+          </p:cNvSpPr>
+          <p:nvPr/>
+        </p:nvSpPr>
+        <p:spPr>
+          <a:xfrm>
+            <a:off x="428017" y="0"/>
+            <a:ext cx="10515600" cy="863601"/>
+          </a:xfrm>
+          <a:prstGeom prst="rect">
+            <a:avLst/>
+          </a:prstGeom>
+        </p:spPr>
+        <p:txBody>
+          <a:bodyPr vert="horz" lIns="91440" tIns="45720" rIns="91440" bIns="45720" rtlCol="0" anchor="ctr">
+            <a:normAutofit/>
+          </a:bodyPr>
+          <a:lstStyle>
+            <a:lvl1pPr algn="l" defTabSz="914400" rtl="0" eaLnBrk="1" latinLnBrk="0" hangingPunct="1">
+              <a:lnSpc>
+                <a:spcPct val="90000"/>
+              </a:lnSpc>
+              <a:spcBef>
+                <a:spcPct val="0"/>
+              </a:spcBef>
+              <a:buNone/>
+              <a:defRPr sz="4400" kern="1200">
+                <a:solidFill>
+                  <a:schemeClr val="tx1"/>
+                </a:solidFill>
+                <a:latin typeface="+mj-lt"/>
+                <a:ea typeface="+mj-ea"/>
+                <a:cs typeface="+mj-cs"/>
+              </a:defRPr>
+            </a:lvl1pPr>
+          </a:lstStyle>
+          <a:p>
+            <a:r>
+              <a:rPr lang="ru-RU" sz="4000" b="1" dirty="0"/>
+              <a:t>Сравнение рассмотренных методов</a:t>
+            </a:r>
+          </a:p>
+        </p:txBody>
+      </p:sp>
     </p:spTree>
     <p:extLst>
       <p:ext uri="{BB962C8B-B14F-4D97-AF65-F5344CB8AC3E}">
@@ -5973,45 +6985,10 @@
       </p:grpSpPr>
       <p:sp>
         <p:nvSpPr>
-          <p:cNvPr id="2" name="Заголовок 1">
-            <a:extLst>
-              <a:ext uri="{FF2B5EF4-FFF2-40B4-BE49-F238E27FC236}">
-                <a16:creationId xmlns:a16="http://schemas.microsoft.com/office/drawing/2014/main" id="{1802D59D-6A83-151A-EEA2-678960399BE4}"/>
-              </a:ext>
-            </a:extLst>
-          </p:cNvPr>
-          <p:cNvSpPr>
-            <a:spLocks noGrp="1"/>
-          </p:cNvSpPr>
-          <p:nvPr>
-            <p:ph type="title"/>
-          </p:nvPr>
-        </p:nvSpPr>
-        <p:spPr>
-          <a:xfrm>
-            <a:off x="428017" y="0"/>
-            <a:ext cx="10515600" cy="863601"/>
-          </a:xfrm>
-        </p:spPr>
-        <p:txBody>
-          <a:bodyPr>
-            <a:normAutofit/>
-          </a:bodyPr>
-          <a:lstStyle/>
-          <a:p>
-            <a:r>
-              <a:rPr lang="ru-RU" sz="4000" b="1" dirty="0"/>
-              <a:t>Заголовок</a:t>
-            </a:r>
-          </a:p>
-        </p:txBody>
-      </p:sp>
-      <p:sp>
-        <p:nvSpPr>
-          <p:cNvPr id="3" name="Номер слайда 2">
-            <a:extLst>
-              <a:ext uri="{FF2B5EF4-FFF2-40B4-BE49-F238E27FC236}">
-                <a16:creationId xmlns:a16="http://schemas.microsoft.com/office/drawing/2014/main" id="{EB930BD0-D85B-F112-101C-B409455C44FB}"/>
+          <p:cNvPr id="4" name="Номер слайда 3">
+            <a:extLst>
+              <a:ext uri="{FF2B5EF4-FFF2-40B4-BE49-F238E27FC236}">
+                <a16:creationId xmlns:a16="http://schemas.microsoft.com/office/drawing/2014/main" id="{80FEEFAF-0D6B-464C-7360-370FF23083CC}"/>
               </a:ext>
             </a:extLst>
           </p:cNvPr>
@@ -6035,26 +7012,62 @@
           </a:p>
         </p:txBody>
       </p:sp>
-      <p:sp>
-        <p:nvSpPr>
-          <p:cNvPr id="5" name="Объект 2">
-            <a:extLst>
-              <a:ext uri="{FF2B5EF4-FFF2-40B4-BE49-F238E27FC236}">
-                <a16:creationId xmlns:a16="http://schemas.microsoft.com/office/drawing/2014/main" id="{02C33000-B0B7-4509-AD8C-600B0EFAA229}"/>
-              </a:ext>
-            </a:extLst>
-          </p:cNvPr>
-          <p:cNvSpPr>
-            <a:spLocks noGrp="1"/>
-          </p:cNvSpPr>
-          <p:nvPr>
-            <p:ph idx="1"/>
-          </p:nvPr>
-        </p:nvSpPr>
+      <p:pic>
+        <p:nvPicPr>
+          <p:cNvPr id="11" name="Рисунок 10">
+            <a:extLst>
+              <a:ext uri="{FF2B5EF4-FFF2-40B4-BE49-F238E27FC236}">
+                <a16:creationId xmlns:a16="http://schemas.microsoft.com/office/drawing/2014/main" id="{6B7F2072-E69E-44B3-887F-44B338B78A45}"/>
+              </a:ext>
+            </a:extLst>
+          </p:cNvPr>
+          <p:cNvPicPr>
+            <a:picLocks noChangeAspect="1"/>
+          </p:cNvPicPr>
+          <p:nvPr/>
+        </p:nvPicPr>
+        <p:blipFill>
+          <a:blip r:embed="rId2">
+            <a:extLst>
+              <a:ext uri="{28A0092B-C50C-407E-A947-70E740481C1C}">
+                <a14:useLocalDpi xmlns:a14="http://schemas.microsoft.com/office/drawing/2010/main" val="0"/>
+              </a:ext>
+            </a:extLst>
+          </a:blip>
+          <a:stretch>
+            <a:fillRect/>
+          </a:stretch>
+        </p:blipFill>
         <p:spPr>
           <a:xfrm>
-            <a:off x="428017" y="863601"/>
-            <a:ext cx="11182378" cy="5994398"/>
+            <a:off x="5685817" y="2808435"/>
+            <a:ext cx="6096000" cy="1241128"/>
+          </a:xfrm>
+          <a:prstGeom prst="rect">
+            <a:avLst/>
+          </a:prstGeom>
+        </p:spPr>
+      </p:pic>
+      <p:sp>
+        <p:nvSpPr>
+          <p:cNvPr id="14" name="Объект 2">
+            <a:extLst>
+              <a:ext uri="{FF2B5EF4-FFF2-40B4-BE49-F238E27FC236}">
+                <a16:creationId xmlns:a16="http://schemas.microsoft.com/office/drawing/2014/main" id="{EAC84F1B-0B39-483B-AEDA-2406117284B8}"/>
+              </a:ext>
+            </a:extLst>
+          </p:cNvPr>
+          <p:cNvSpPr>
+            <a:spLocks noGrp="1"/>
+          </p:cNvSpPr>
+          <p:nvPr>
+            <p:ph idx="1"/>
+          </p:nvPr>
+        </p:nvSpPr>
+        <p:spPr>
+          <a:xfrm>
+            <a:off x="428017" y="1650201"/>
+            <a:ext cx="5031750" cy="3557597"/>
           </a:xfrm>
         </p:spPr>
         <p:txBody>
@@ -6070,44 +7083,141 @@
               <a:buNone/>
             </a:pPr>
             <a:r>
-              <a:rPr lang="ru-RU" sz="2600" dirty="0">
+              <a:rPr lang="ru-RU" sz="2400" dirty="0">
+                <a:latin typeface="Times New Roman" panose="02020603050405020304" pitchFamily="18" charset="0"/>
+                <a:ea typeface="Times New Roman" panose="02020603050405020304" pitchFamily="18" charset="0"/>
+              </a:rPr>
+              <a:t>Ограничения на входные данные:</a:t>
+            </a:r>
+          </a:p>
+          <a:p>
+            <a:pPr marL="685800" indent="-457200">
+              <a:lnSpc>
+                <a:spcPct val="100000"/>
+              </a:lnSpc>
+            </a:pPr>
+            <a:r>
+              <a:rPr lang="ru-RU" sz="2400" dirty="0">
+                <a:solidFill>
+                  <a:schemeClr val="bg1">
+                    <a:lumMod val="50000"/>
+                  </a:schemeClr>
+                </a:solidFill>
                 <a:effectLst/>
                 <a:latin typeface="Times New Roman" panose="02020603050405020304" pitchFamily="18" charset="0"/>
                 <a:ea typeface="Times New Roman" panose="02020603050405020304" pitchFamily="18" charset="0"/>
               </a:rPr>
-              <a:t>Далее идет суть: Формализация (2-3 слайда)</a:t>
-            </a:r>
-          </a:p>
-          <a:p>
-            <a:pPr indent="0">
+              <a:t>У каждой команды, уникальное название</a:t>
+            </a:r>
+          </a:p>
+          <a:p>
+            <a:pPr marL="685800" indent="-457200">
               <a:lnSpc>
                 <a:spcPct val="100000"/>
               </a:lnSpc>
-              <a:buNone/>
             </a:pPr>
             <a:r>
-              <a:rPr lang="ru-RU" sz="2600" dirty="0">
+              <a:rPr lang="ru-RU" sz="2400" dirty="0">
+                <a:latin typeface="Times New Roman" panose="02020603050405020304" pitchFamily="18" charset="0"/>
+                <a:ea typeface="Times New Roman" panose="02020603050405020304" pitchFamily="18" charset="0"/>
+              </a:rPr>
+              <a:t>Пользовательские параметры:</a:t>
+            </a:r>
+          </a:p>
+          <a:p>
+            <a:pPr marL="1143000" lvl="1" indent="-457200">
+              <a:lnSpc>
+                <a:spcPct val="100000"/>
+              </a:lnSpc>
+            </a:pPr>
+            <a:r>
+              <a:rPr lang="ru-RU" sz="2000" dirty="0">
                 <a:effectLst/>
                 <a:latin typeface="Times New Roman" panose="02020603050405020304" pitchFamily="18" charset="0"/>
                 <a:ea typeface="Times New Roman" panose="02020603050405020304" pitchFamily="18" charset="0"/>
               </a:rPr>
-              <a:t>Каждый слайд должен иметь оригинальное название</a:t>
-            </a:r>
-          </a:p>
-          <a:p>
-            <a:pPr indent="0">
+              <a:t>Минимальный уровень поддержки от 0 до 1</a:t>
+            </a:r>
+          </a:p>
+          <a:p>
+            <a:pPr marL="1143000" lvl="1" indent="-457200">
               <a:lnSpc>
                 <a:spcPct val="100000"/>
               </a:lnSpc>
-              <a:buNone/>
             </a:pPr>
             <a:r>
-              <a:rPr lang="ru-RU" sz="2600" dirty="0">
+              <a:rPr lang="ru-RU" sz="2000" dirty="0">
                 <a:effectLst/>
                 <a:latin typeface="Times New Roman" panose="02020603050405020304" pitchFamily="18" charset="0"/>
                 <a:ea typeface="Times New Roman" panose="02020603050405020304" pitchFamily="18" charset="0"/>
               </a:rPr>
-              <a:t>Все формулы должны быть расшифрованы (только те которые понимаете)</a:t>
+              <a:t>Минимальный и максимальный разрыв между командами от 0 до </a:t>
+            </a:r>
+            <a:r>
+              <a:rPr lang="en-US" sz="2000" dirty="0">
+                <a:latin typeface="Times New Roman" panose="02020603050405020304" pitchFamily="18" charset="0"/>
+                <a:ea typeface="Times New Roman" panose="02020603050405020304" pitchFamily="18" charset="0"/>
+              </a:rPr>
+              <a:t>INT_MAX (2147483647)</a:t>
+            </a:r>
+            <a:endParaRPr lang="ru-RU" sz="2000" dirty="0">
+              <a:effectLst/>
+              <a:latin typeface="Times New Roman" panose="02020603050405020304" pitchFamily="18" charset="0"/>
+              <a:ea typeface="Times New Roman" panose="02020603050405020304" pitchFamily="18" charset="0"/>
+            </a:endParaRPr>
+          </a:p>
+        </p:txBody>
+      </p:sp>
+      <p:sp>
+        <p:nvSpPr>
+          <p:cNvPr id="6" name="Заголовок 1">
+            <a:extLst>
+              <a:ext uri="{FF2B5EF4-FFF2-40B4-BE49-F238E27FC236}">
+                <a16:creationId xmlns:a16="http://schemas.microsoft.com/office/drawing/2014/main" id="{90BAD8C0-238F-4A37-ABC8-E6E254934419}"/>
+              </a:ext>
+            </a:extLst>
+          </p:cNvPr>
+          <p:cNvSpPr txBox="1">
+            <a:spLocks/>
+          </p:cNvSpPr>
+          <p:nvPr/>
+        </p:nvSpPr>
+        <p:spPr>
+          <a:xfrm>
+            <a:off x="428017" y="0"/>
+            <a:ext cx="10515600" cy="863601"/>
+          </a:xfrm>
+          <a:prstGeom prst="rect">
+            <a:avLst/>
+          </a:prstGeom>
+        </p:spPr>
+        <p:txBody>
+          <a:bodyPr vert="horz" lIns="91440" tIns="45720" rIns="91440" bIns="45720" rtlCol="0" anchor="ctr">
+            <a:normAutofit/>
+          </a:bodyPr>
+          <a:lstStyle>
+            <a:lvl1pPr algn="l" defTabSz="914400" rtl="0" eaLnBrk="1" latinLnBrk="0" hangingPunct="1">
+              <a:lnSpc>
+                <a:spcPct val="90000"/>
+              </a:lnSpc>
+              <a:spcBef>
+                <a:spcPct val="0"/>
+              </a:spcBef>
+              <a:buNone/>
+              <a:defRPr sz="4400" kern="1200">
+                <a:solidFill>
+                  <a:schemeClr val="tx1"/>
+                </a:solidFill>
+                <a:latin typeface="+mj-lt"/>
+                <a:ea typeface="+mj-ea"/>
+                <a:cs typeface="+mj-cs"/>
+              </a:defRPr>
+            </a:lvl1pPr>
+          </a:lstStyle>
+          <a:p>
+            <a:r>
+              <a:rPr lang="ru-RU" sz="4000" b="1" dirty="0"/>
+              <a:t>Формализованная постановка задачи</a:t>
             </a:r>
           </a:p>
         </p:txBody>
@@ -6115,7 +7225,7 @@
     </p:spTree>
     <p:extLst>
       <p:ext uri="{BB962C8B-B14F-4D97-AF65-F5344CB8AC3E}">
-        <p14:creationId xmlns:p14="http://schemas.microsoft.com/office/powerpoint/2010/main" val="892185403"/>
+        <p14:creationId xmlns:p14="http://schemas.microsoft.com/office/powerpoint/2010/main" val="324510479"/>
       </p:ext>
     </p:extLst>
   </p:cSld>
@@ -6246,7 +7356,7 @@
                 <a:latin typeface="Times New Roman" panose="02020603050405020304" pitchFamily="18" charset="0"/>
                 <a:ea typeface="Times New Roman" panose="02020603050405020304" pitchFamily="18" charset="0"/>
               </a:rPr>
-              <a:t>Потом схема алгоритма по ГОСТУ (1-2 слайда не больше)</a:t>
+              <a:t>Далее идет суть: Формализация (2-3 слайда)</a:t>
             </a:r>
           </a:p>
           <a:p>
@@ -6262,7 +7372,23 @@
                 <a:latin typeface="Times New Roman" panose="02020603050405020304" pitchFamily="18" charset="0"/>
                 <a:ea typeface="Times New Roman" panose="02020603050405020304" pitchFamily="18" charset="0"/>
               </a:rPr>
-              <a:t>Говорим только особенности алгоритма (не надо говорить о банальном)</a:t>
+              <a:t>Каждый слайд должен иметь оригинальное название</a:t>
+            </a:r>
+          </a:p>
+          <a:p>
+            <a:pPr indent="0">
+              <a:lnSpc>
+                <a:spcPct val="100000"/>
+              </a:lnSpc>
+              <a:buNone/>
+            </a:pPr>
+            <a:r>
+              <a:rPr lang="ru-RU" sz="2600" dirty="0">
+                <a:effectLst/>
+                <a:latin typeface="Times New Roman" panose="02020603050405020304" pitchFamily="18" charset="0"/>
+                <a:ea typeface="Times New Roman" panose="02020603050405020304" pitchFamily="18" charset="0"/>
+              </a:rPr>
+              <a:t>Все формулы должны быть расшифрованы (только те которые понимаете)</a:t>
             </a:r>
           </a:p>
         </p:txBody>
@@ -6270,7 +7396,7 @@
     </p:spTree>
     <p:extLst>
       <p:ext uri="{BB962C8B-B14F-4D97-AF65-F5344CB8AC3E}">
-        <p14:creationId xmlns:p14="http://schemas.microsoft.com/office/powerpoint/2010/main" val="3773342640"/>
+        <p14:creationId xmlns:p14="http://schemas.microsoft.com/office/powerpoint/2010/main" val="892185403"/>
       </p:ext>
     </p:extLst>
   </p:cSld>
@@ -6326,9 +7452,13 @@
           <a:lstStyle/>
           <a:p>
             <a:r>
-              <a:rPr lang="ru-RU" sz="4000" b="1" dirty="0"/>
-              <a:t>Генерация кандидатов</a:t>
-            </a:r>
+              <a:rPr lang="ru-RU" sz="4000" b="1" dirty="0">
+                <a:effectLst/>
+                <a:ea typeface="Times New Roman" panose="02020603050405020304" pitchFamily="18" charset="0"/>
+              </a:rPr>
+              <a:t>Характеристики последовательностей</a:t>
+            </a:r>
+            <a:endParaRPr lang="ru-RU" sz="4000" b="1" dirty="0"/>
           </a:p>
         </p:txBody>
       </p:sp>
@@ -6361,46 +7491,120 @@
           </a:p>
         </p:txBody>
       </p:sp>
-      <p:pic>
-        <p:nvPicPr>
-          <p:cNvPr id="6" name="Рисунок 5">
-            <a:extLst>
-              <a:ext uri="{FF2B5EF4-FFF2-40B4-BE49-F238E27FC236}">
-                <a16:creationId xmlns:a16="http://schemas.microsoft.com/office/drawing/2014/main" id="{65497B93-57AA-4E83-9D74-6ABA2BC5ABE7}"/>
-              </a:ext>
-            </a:extLst>
-          </p:cNvPr>
-          <p:cNvPicPr>
-            <a:picLocks noChangeAspect="1"/>
-          </p:cNvPicPr>
-          <p:nvPr/>
-        </p:nvPicPr>
-        <p:blipFill>
-          <a:blip r:embed="rId3">
-            <a:extLst>
-              <a:ext uri="{28A0092B-C50C-407E-A947-70E740481C1C}">
-                <a14:useLocalDpi xmlns:a14="http://schemas.microsoft.com/office/drawing/2010/main" val="0"/>
-              </a:ext>
-            </a:extLst>
-          </a:blip>
-          <a:stretch>
-            <a:fillRect/>
-          </a:stretch>
-        </p:blipFill>
+      <p:sp>
+        <p:nvSpPr>
+          <p:cNvPr id="5" name="Объект 2">
+            <a:extLst>
+              <a:ext uri="{FF2B5EF4-FFF2-40B4-BE49-F238E27FC236}">
+                <a16:creationId xmlns:a16="http://schemas.microsoft.com/office/drawing/2014/main" id="{02C33000-B0B7-4509-AD8C-600B0EFAA229}"/>
+              </a:ext>
+            </a:extLst>
+          </p:cNvPr>
+          <p:cNvSpPr>
+            <a:spLocks noGrp="1"/>
+          </p:cNvSpPr>
+          <p:nvPr>
+            <p:ph idx="1"/>
+          </p:nvPr>
+        </p:nvSpPr>
         <p:spPr>
           <a:xfrm>
-            <a:off x="4049898" y="797266"/>
-            <a:ext cx="3271837" cy="5625420"/>
+            <a:off x="428017" y="863601"/>
+            <a:ext cx="11182378" cy="5994398"/>
           </a:xfrm>
-          <a:prstGeom prst="rect">
-            <a:avLst/>
-          </a:prstGeom>
         </p:spPr>
-      </p:pic>
+        <p:txBody>
+          <a:bodyPr>
+            <a:noAutofit/>
+          </a:bodyPr>
+          <a:lstStyle/>
+          <a:p>
+            <a:pPr indent="0">
+              <a:lnSpc>
+                <a:spcPct val="100000"/>
+              </a:lnSpc>
+              <a:buNone/>
+            </a:pPr>
+            <a:r>
+              <a:rPr lang="ru-RU" sz="2600" b="1" dirty="0">
+                <a:latin typeface="Times New Roman" panose="02020603050405020304" pitchFamily="18" charset="0"/>
+                <a:ea typeface="Times New Roman" panose="02020603050405020304" pitchFamily="18" charset="0"/>
+              </a:rPr>
+              <a:t>Значение</a:t>
+            </a:r>
+            <a:r>
+              <a:rPr lang="ru-RU" sz="2600" dirty="0">
+                <a:latin typeface="Times New Roman" panose="02020603050405020304" pitchFamily="18" charset="0"/>
+                <a:ea typeface="Times New Roman" panose="02020603050405020304" pitchFamily="18" charset="0"/>
+              </a:rPr>
+              <a:t> </a:t>
+            </a:r>
+            <a:r>
+              <a:rPr lang="ru-RU" sz="2600" b="1" dirty="0">
+                <a:latin typeface="Times New Roman" panose="02020603050405020304" pitchFamily="18" charset="0"/>
+                <a:ea typeface="Times New Roman" panose="02020603050405020304" pitchFamily="18" charset="0"/>
+              </a:rPr>
+              <a:t>поддержки</a:t>
+            </a:r>
+            <a:r>
+              <a:rPr lang="ru-RU" sz="2600" dirty="0">
+                <a:latin typeface="Times New Roman" panose="02020603050405020304" pitchFamily="18" charset="0"/>
+                <a:ea typeface="Times New Roman" panose="02020603050405020304" pitchFamily="18" charset="0"/>
+              </a:rPr>
+              <a:t> последовательности равно проценту сессий, которые ее поддерживают. </a:t>
+            </a:r>
+          </a:p>
+          <a:p>
+            <a:pPr indent="0">
+              <a:lnSpc>
+                <a:spcPct val="100000"/>
+              </a:lnSpc>
+              <a:buNone/>
+            </a:pPr>
+            <a:r>
+              <a:rPr lang="ru-RU" sz="2600" dirty="0">
+                <a:effectLst/>
+                <a:latin typeface="Times New Roman" panose="02020603050405020304" pitchFamily="18" charset="0"/>
+                <a:ea typeface="Times New Roman" panose="02020603050405020304" pitchFamily="18" charset="0"/>
+              </a:rPr>
+              <a:t>Сессия поддерживает</a:t>
+            </a:r>
+            <a:r>
+              <a:rPr lang="ru-RU" sz="2600" dirty="0">
+                <a:latin typeface="Times New Roman" panose="02020603050405020304" pitchFamily="18" charset="0"/>
+                <a:ea typeface="Times New Roman" panose="02020603050405020304" pitchFamily="18" charset="0"/>
+              </a:rPr>
+              <a:t> последовательность, если содержит все ее элементы в том же порядке и временной промежуток между каждыми двумя соседними командами удовлетворяет параметрам заданным пользователем.</a:t>
+            </a:r>
+          </a:p>
+          <a:p>
+            <a:pPr indent="0">
+              <a:lnSpc>
+                <a:spcPct val="100000"/>
+              </a:lnSpc>
+              <a:buNone/>
+            </a:pPr>
+            <a:r>
+              <a:rPr lang="ru-RU" sz="2600" b="1" dirty="0">
+                <a:latin typeface="Times New Roman" panose="02020603050405020304" pitchFamily="18" charset="0"/>
+                <a:ea typeface="Times New Roman" panose="02020603050405020304" pitchFamily="18" charset="0"/>
+              </a:rPr>
+              <a:t>Коэффициент зависимости</a:t>
+            </a:r>
+            <a:r>
+              <a:rPr lang="ru-RU" sz="2600" dirty="0">
+                <a:latin typeface="Times New Roman" panose="02020603050405020304" pitchFamily="18" charset="0"/>
+                <a:ea typeface="Times New Roman" panose="02020603050405020304" pitchFamily="18" charset="0"/>
+              </a:rPr>
+              <a:t> показывает, насколько команды в последовательности зависят друг от друга и считается как отношение поддержки последовательности к произведению поддержек всех подпоследовательностей, состоящих из 1 команды. Если значение коэффициента &lt;= 1, значит зависимости нету. Если же &gt; 1, то зависимость есть. Чем больше единицы, тем вероятней то, что эти команды использовались вместе.</a:t>
+            </a:r>
+          </a:p>
+        </p:txBody>
+      </p:sp>
     </p:spTree>
     <p:extLst>
       <p:ext uri="{BB962C8B-B14F-4D97-AF65-F5344CB8AC3E}">
-        <p14:creationId xmlns:p14="http://schemas.microsoft.com/office/powerpoint/2010/main" val="2884998727"/>
+        <p14:creationId xmlns:p14="http://schemas.microsoft.com/office/powerpoint/2010/main" val="2850813546"/>
       </p:ext>
     </p:extLst>
   </p:cSld>
@@ -6457,7 +7661,7 @@
           <a:p>
             <a:r>
               <a:rPr lang="ru-RU" sz="4000" b="1" dirty="0"/>
-              <a:t>Проверка поддержки кандидата сессией</a:t>
+              <a:t>Заголовок</a:t>
             </a:r>
           </a:p>
         </p:txBody>
@@ -6491,46 +7695,71 @@
           </a:p>
         </p:txBody>
       </p:sp>
-      <p:pic>
-        <p:nvPicPr>
-          <p:cNvPr id="8" name="Рисунок 7">
-            <a:extLst>
-              <a:ext uri="{FF2B5EF4-FFF2-40B4-BE49-F238E27FC236}">
-                <a16:creationId xmlns:a16="http://schemas.microsoft.com/office/drawing/2014/main" id="{702B9E8A-5309-4B7C-9121-53B8E5A236C3}"/>
-              </a:ext>
-            </a:extLst>
-          </p:cNvPr>
-          <p:cNvPicPr>
-            <a:picLocks noChangeAspect="1"/>
-          </p:cNvPicPr>
-          <p:nvPr/>
-        </p:nvPicPr>
-        <p:blipFill>
-          <a:blip r:embed="rId3">
-            <a:extLst>
-              <a:ext uri="{28A0092B-C50C-407E-A947-70E740481C1C}">
-                <a14:useLocalDpi xmlns:a14="http://schemas.microsoft.com/office/drawing/2010/main" val="0"/>
-              </a:ext>
-            </a:extLst>
-          </a:blip>
-          <a:stretch>
-            <a:fillRect/>
-          </a:stretch>
-        </p:blipFill>
+      <p:sp>
+        <p:nvSpPr>
+          <p:cNvPr id="5" name="Объект 2">
+            <a:extLst>
+              <a:ext uri="{FF2B5EF4-FFF2-40B4-BE49-F238E27FC236}">
+                <a16:creationId xmlns:a16="http://schemas.microsoft.com/office/drawing/2014/main" id="{02C33000-B0B7-4509-AD8C-600B0EFAA229}"/>
+              </a:ext>
+            </a:extLst>
+          </p:cNvPr>
+          <p:cNvSpPr>
+            <a:spLocks noGrp="1"/>
+          </p:cNvSpPr>
+          <p:nvPr>
+            <p:ph idx="1"/>
+          </p:nvPr>
+        </p:nvSpPr>
         <p:spPr>
           <a:xfrm>
-            <a:off x="4567408" y="767244"/>
-            <a:ext cx="3057183" cy="5323512"/>
+            <a:off x="428017" y="863601"/>
+            <a:ext cx="11182378" cy="5994398"/>
           </a:xfrm>
-          <a:prstGeom prst="rect">
-            <a:avLst/>
-          </a:prstGeom>
         </p:spPr>
-      </p:pic>
+        <p:txBody>
+          <a:bodyPr>
+            <a:noAutofit/>
+          </a:bodyPr>
+          <a:lstStyle/>
+          <a:p>
+            <a:pPr indent="0">
+              <a:lnSpc>
+                <a:spcPct val="100000"/>
+              </a:lnSpc>
+              <a:buNone/>
+            </a:pPr>
+            <a:r>
+              <a:rPr lang="ru-RU" sz="2600" dirty="0">
+                <a:effectLst/>
+                <a:latin typeface="Times New Roman" panose="02020603050405020304" pitchFamily="18" charset="0"/>
+                <a:ea typeface="Times New Roman" panose="02020603050405020304" pitchFamily="18" charset="0"/>
+              </a:rPr>
+              <a:t>Потом схема алгоритма по ГОСТУ (1-2 слайда не больше)</a:t>
+            </a:r>
+          </a:p>
+          <a:p>
+            <a:pPr indent="0">
+              <a:lnSpc>
+                <a:spcPct val="100000"/>
+              </a:lnSpc>
+              <a:buNone/>
+            </a:pPr>
+            <a:r>
+              <a:rPr lang="ru-RU" sz="2600" dirty="0">
+                <a:effectLst/>
+                <a:latin typeface="Times New Roman" panose="02020603050405020304" pitchFamily="18" charset="0"/>
+                <a:ea typeface="Times New Roman" panose="02020603050405020304" pitchFamily="18" charset="0"/>
+              </a:rPr>
+              <a:t>Говорим только особенности алгоритма (не надо говорить о банальном)</a:t>
+            </a:r>
+          </a:p>
+        </p:txBody>
+      </p:sp>
     </p:spTree>
     <p:extLst>
       <p:ext uri="{BB962C8B-B14F-4D97-AF65-F5344CB8AC3E}">
-        <p14:creationId xmlns:p14="http://schemas.microsoft.com/office/powerpoint/2010/main" val="1246671588"/>
+        <p14:creationId xmlns:p14="http://schemas.microsoft.com/office/powerpoint/2010/main" val="3773342640"/>
       </p:ext>
     </p:extLst>
   </p:cSld>
@@ -6586,8 +7815,14 @@
           <a:lstStyle/>
           <a:p>
             <a:r>
-              <a:rPr lang="ru-RU" sz="4000" b="1" dirty="0"/>
-              <a:t>Заголовок</a:t>
+              <a:rPr lang="ru-RU" sz="4000" b="1" dirty="0">
+                <a:solidFill>
+                  <a:schemeClr val="bg1">
+                    <a:lumMod val="50000"/>
+                  </a:schemeClr>
+                </a:solidFill>
+              </a:rPr>
+              <a:t>Особенности предлагаемого метода</a:t>
             </a:r>
           </a:p>
         </p:txBody>
@@ -6657,11 +7892,16 @@
             </a:pPr>
             <a:r>
               <a:rPr lang="ru-RU" sz="2600" dirty="0">
+                <a:solidFill>
+                  <a:schemeClr val="bg1">
+                    <a:lumMod val="50000"/>
+                  </a:schemeClr>
+                </a:solidFill>
                 <a:effectLst/>
                 <a:latin typeface="Times New Roman" panose="02020603050405020304" pitchFamily="18" charset="0"/>
                 <a:ea typeface="Times New Roman" panose="02020603050405020304" pitchFamily="18" charset="0"/>
               </a:rPr>
-              <a:t>Структура ПО</a:t>
+              <a:t>Перед обработкой данных алгоритмом, они преобразовываются в таблицу базы данных.</a:t>
             </a:r>
           </a:p>
           <a:p>
@@ -6677,15 +7917,16 @@
                 <a:latin typeface="Times New Roman" panose="02020603050405020304" pitchFamily="18" charset="0"/>
                 <a:ea typeface="Times New Roman" panose="02020603050405020304" pitchFamily="18" charset="0"/>
               </a:rPr>
-              <a:t>(Не надо показывать диаграмму классов)</a:t>
-            </a:r>
-          </a:p>
-          <a:p>
-            <a:pPr indent="0">
+              <a:t>Разработанный метод состоит из двух основных этапов:</a:t>
+            </a:r>
+          </a:p>
+          <a:p>
+            <a:pPr marL="742950" indent="-514350">
               <a:lnSpc>
                 <a:spcPct val="100000"/>
               </a:lnSpc>
-              <a:buNone/>
+              <a:buFont typeface="+mj-lt"/>
+              <a:buAutoNum type="arabicPeriod"/>
             </a:pPr>
             <a:r>
               <a:rPr lang="ru-RU" sz="2600" dirty="0">
@@ -6693,7 +7934,24 @@
                 <a:latin typeface="Times New Roman" panose="02020603050405020304" pitchFamily="18" charset="0"/>
                 <a:ea typeface="Times New Roman" panose="02020603050405020304" pitchFamily="18" charset="0"/>
               </a:rPr>
-              <a:t>Говорим какую технологию использовали</a:t>
+              <a:t>Генерация кандидатов.</a:t>
+            </a:r>
+          </a:p>
+          <a:p>
+            <a:pPr marL="742950" indent="-514350">
+              <a:lnSpc>
+                <a:spcPct val="100000"/>
+              </a:lnSpc>
+              <a:buFont typeface="+mj-lt"/>
+              <a:buAutoNum type="arabicPeriod"/>
+            </a:pPr>
+            <a:r>
+              <a:rPr lang="ru-RU" sz="2600" dirty="0">
+                <a:effectLst/>
+                <a:latin typeface="Times New Roman" panose="02020603050405020304" pitchFamily="18" charset="0"/>
+                <a:ea typeface="Times New Roman" panose="02020603050405020304" pitchFamily="18" charset="0"/>
+              </a:rPr>
+              <a:t>Подсчет поддержки кандидатов.</a:t>
             </a:r>
           </a:p>
         </p:txBody>
@@ -6701,7 +7959,7 @@
     </p:spTree>
     <p:extLst>
       <p:ext uri="{BB962C8B-B14F-4D97-AF65-F5344CB8AC3E}">
-        <p14:creationId xmlns:p14="http://schemas.microsoft.com/office/powerpoint/2010/main" val="3650738075"/>
+        <p14:creationId xmlns:p14="http://schemas.microsoft.com/office/powerpoint/2010/main" val="1533887340"/>
       </p:ext>
     </p:extLst>
   </p:cSld>

</xml_diff>

<commit_message>
updated pres and speach
</commit_message>
<xml_diff>
--- a/ВКР/Презентация/ПронинАС_ВКР_презентация.pptx
+++ b/ВКР/Презентация/ПронинАС_ВКР_презентация.pptx
@@ -5,7 +5,7 @@
     <p:sldMasterId id="2147483648" r:id="rId1"/>
   </p:sldMasterIdLst>
   <p:notesMasterIdLst>
-    <p:notesMasterId r:id="rId18"/>
+    <p:notesMasterId r:id="rId16"/>
   </p:notesMasterIdLst>
   <p:sldIdLst>
     <p:sldId id="256" r:id="rId2"/>
@@ -13,17 +13,15 @@
     <p:sldId id="296" r:id="rId4"/>
     <p:sldId id="282" r:id="rId5"/>
     <p:sldId id="293" r:id="rId6"/>
-    <p:sldId id="297" r:id="rId7"/>
-    <p:sldId id="307" r:id="rId8"/>
-    <p:sldId id="298" r:id="rId9"/>
-    <p:sldId id="309" r:id="rId10"/>
-    <p:sldId id="302" r:id="rId11"/>
-    <p:sldId id="303" r:id="rId12"/>
-    <p:sldId id="308" r:id="rId13"/>
-    <p:sldId id="306" r:id="rId14"/>
-    <p:sldId id="305" r:id="rId15"/>
-    <p:sldId id="266" r:id="rId16"/>
-    <p:sldId id="301" r:id="rId17"/>
+    <p:sldId id="307" r:id="rId7"/>
+    <p:sldId id="309" r:id="rId8"/>
+    <p:sldId id="302" r:id="rId9"/>
+    <p:sldId id="303" r:id="rId10"/>
+    <p:sldId id="308" r:id="rId11"/>
+    <p:sldId id="306" r:id="rId12"/>
+    <p:sldId id="305" r:id="rId13"/>
+    <p:sldId id="266" r:id="rId14"/>
+    <p:sldId id="301" r:id="rId15"/>
   </p:sldIdLst>
   <p:sldSz cx="12192000" cy="6858000"/>
   <p:notesSz cx="6858000" cy="9144000"/>
@@ -637,7 +635,7 @@
     </p:spTree>
     <p:extLst>
       <p:ext uri="{BB962C8B-B14F-4D97-AF65-F5344CB8AC3E}">
-        <p14:creationId xmlns:p14="http://schemas.microsoft.com/office/powerpoint/2010/main" val="869867913"/>
+        <p14:creationId xmlns:p14="http://schemas.microsoft.com/office/powerpoint/2010/main" val="1687902653"/>
       </p:ext>
     </p:extLst>
   </p:cSld>
@@ -713,174 +711,6 @@
             <a:fld id="{E3BF92F7-6176-4844-94CE-FF1FD83770F1}" type="slidenum">
               <a:rPr lang="ru-RU" smtClean="0"/>
               <a:t>14</a:t>
-            </a:fld>
-            <a:endParaRPr lang="ru-RU"/>
-          </a:p>
-        </p:txBody>
-      </p:sp>
-    </p:spTree>
-    <p:extLst>
-      <p:ext uri="{BB962C8B-B14F-4D97-AF65-F5344CB8AC3E}">
-        <p14:creationId xmlns:p14="http://schemas.microsoft.com/office/powerpoint/2010/main" val="593661695"/>
-      </p:ext>
-    </p:extLst>
-  </p:cSld>
-  <p:clrMapOvr>
-    <a:masterClrMapping/>
-  </p:clrMapOvr>
-</p:notes>
-</file>
-
-<file path=ppt/notesSlides/notesSlide12.xml><?xml version="1.0" encoding="utf-8"?>
-<p:notes xmlns:a="http://schemas.openxmlformats.org/drawingml/2006/main" xmlns:r="http://schemas.openxmlformats.org/officeDocument/2006/relationships" xmlns:p="http://schemas.openxmlformats.org/presentationml/2006/main">
-  <p:cSld>
-    <p:spTree>
-      <p:nvGrpSpPr>
-        <p:cNvPr id="1" name=""/>
-        <p:cNvGrpSpPr/>
-        <p:nvPr/>
-      </p:nvGrpSpPr>
-      <p:grpSpPr>
-        <a:xfrm>
-          <a:off x="0" y="0"/>
-          <a:ext cx="0" cy="0"/>
-          <a:chOff x="0" y="0"/>
-          <a:chExt cx="0" cy="0"/>
-        </a:xfrm>
-      </p:grpSpPr>
-      <p:sp>
-        <p:nvSpPr>
-          <p:cNvPr id="2" name="Образ слайда 1"/>
-          <p:cNvSpPr>
-            <a:spLocks noGrp="1" noRot="1" noChangeAspect="1"/>
-          </p:cNvSpPr>
-          <p:nvPr>
-            <p:ph type="sldImg"/>
-          </p:nvPr>
-        </p:nvSpPr>
-        <p:spPr/>
-      </p:sp>
-      <p:sp>
-        <p:nvSpPr>
-          <p:cNvPr id="3" name="Заметки 2"/>
-          <p:cNvSpPr>
-            <a:spLocks noGrp="1"/>
-          </p:cNvSpPr>
-          <p:nvPr>
-            <p:ph type="body" idx="1"/>
-          </p:nvPr>
-        </p:nvSpPr>
-        <p:spPr/>
-        <p:txBody>
-          <a:bodyPr/>
-          <a:lstStyle/>
-          <a:p>
-            <a:endParaRPr lang="ru-RU" dirty="0"/>
-          </a:p>
-        </p:txBody>
-      </p:sp>
-      <p:sp>
-        <p:nvSpPr>
-          <p:cNvPr id="4" name="Номер слайда 3"/>
-          <p:cNvSpPr>
-            <a:spLocks noGrp="1"/>
-          </p:cNvSpPr>
-          <p:nvPr>
-            <p:ph type="sldNum" sz="quarter" idx="5"/>
-          </p:nvPr>
-        </p:nvSpPr>
-        <p:spPr/>
-        <p:txBody>
-          <a:bodyPr/>
-          <a:lstStyle/>
-          <a:p>
-            <a:fld id="{E3BF92F7-6176-4844-94CE-FF1FD83770F1}" type="slidenum">
-              <a:rPr lang="ru-RU" smtClean="0"/>
-              <a:t>15</a:t>
-            </a:fld>
-            <a:endParaRPr lang="ru-RU"/>
-          </a:p>
-        </p:txBody>
-      </p:sp>
-    </p:spTree>
-    <p:extLst>
-      <p:ext uri="{BB962C8B-B14F-4D97-AF65-F5344CB8AC3E}">
-        <p14:creationId xmlns:p14="http://schemas.microsoft.com/office/powerpoint/2010/main" val="1687902653"/>
-      </p:ext>
-    </p:extLst>
-  </p:cSld>
-  <p:clrMapOvr>
-    <a:masterClrMapping/>
-  </p:clrMapOvr>
-</p:notes>
-</file>
-
-<file path=ppt/notesSlides/notesSlide13.xml><?xml version="1.0" encoding="utf-8"?>
-<p:notes xmlns:a="http://schemas.openxmlformats.org/drawingml/2006/main" xmlns:r="http://schemas.openxmlformats.org/officeDocument/2006/relationships" xmlns:p="http://schemas.openxmlformats.org/presentationml/2006/main">
-  <p:cSld>
-    <p:spTree>
-      <p:nvGrpSpPr>
-        <p:cNvPr id="1" name=""/>
-        <p:cNvGrpSpPr/>
-        <p:nvPr/>
-      </p:nvGrpSpPr>
-      <p:grpSpPr>
-        <a:xfrm>
-          <a:off x="0" y="0"/>
-          <a:ext cx="0" cy="0"/>
-          <a:chOff x="0" y="0"/>
-          <a:chExt cx="0" cy="0"/>
-        </a:xfrm>
-      </p:grpSpPr>
-      <p:sp>
-        <p:nvSpPr>
-          <p:cNvPr id="2" name="Образ слайда 1"/>
-          <p:cNvSpPr>
-            <a:spLocks noGrp="1" noRot="1" noChangeAspect="1"/>
-          </p:cNvSpPr>
-          <p:nvPr>
-            <p:ph type="sldImg"/>
-          </p:nvPr>
-        </p:nvSpPr>
-        <p:spPr/>
-      </p:sp>
-      <p:sp>
-        <p:nvSpPr>
-          <p:cNvPr id="3" name="Заметки 2"/>
-          <p:cNvSpPr>
-            <a:spLocks noGrp="1"/>
-          </p:cNvSpPr>
-          <p:nvPr>
-            <p:ph type="body" idx="1"/>
-          </p:nvPr>
-        </p:nvSpPr>
-        <p:spPr/>
-        <p:txBody>
-          <a:bodyPr/>
-          <a:lstStyle/>
-          <a:p>
-            <a:endParaRPr lang="ru-RU" dirty="0"/>
-          </a:p>
-        </p:txBody>
-      </p:sp>
-      <p:sp>
-        <p:nvSpPr>
-          <p:cNvPr id="4" name="Номер слайда 3"/>
-          <p:cNvSpPr>
-            <a:spLocks noGrp="1"/>
-          </p:cNvSpPr>
-          <p:nvPr>
-            <p:ph type="sldNum" sz="quarter" idx="5"/>
-          </p:nvPr>
-        </p:nvSpPr>
-        <p:spPr/>
-        <p:txBody>
-          <a:bodyPr/>
-          <a:lstStyle/>
-          <a:p>
-            <a:fld id="{E3BF92F7-6176-4844-94CE-FF1FD83770F1}" type="slidenum">
-              <a:rPr lang="ru-RU" smtClean="0"/>
-              <a:t>16</a:t>
             </a:fld>
             <a:endParaRPr lang="ru-RU"/>
           </a:p>
@@ -1057,7 +887,7 @@
     </p:spTree>
     <p:extLst>
       <p:ext uri="{BB962C8B-B14F-4D97-AF65-F5344CB8AC3E}">
-        <p14:creationId xmlns:p14="http://schemas.microsoft.com/office/powerpoint/2010/main" val="4293579522"/>
+        <p14:creationId xmlns:p14="http://schemas.microsoft.com/office/powerpoint/2010/main" val="1171195830"/>
       </p:ext>
     </p:extLst>
   </p:cSld>
@@ -1141,7 +971,7 @@
     </p:spTree>
     <p:extLst>
       <p:ext uri="{BB962C8B-B14F-4D97-AF65-F5344CB8AC3E}">
-        <p14:creationId xmlns:p14="http://schemas.microsoft.com/office/powerpoint/2010/main" val="1171195830"/>
+        <p14:creationId xmlns:p14="http://schemas.microsoft.com/office/powerpoint/2010/main" val="1031094145"/>
       </p:ext>
     </p:extLst>
   </p:cSld>
@@ -1225,7 +1055,7 @@
     </p:spTree>
     <p:extLst>
       <p:ext uri="{BB962C8B-B14F-4D97-AF65-F5344CB8AC3E}">
-        <p14:creationId xmlns:p14="http://schemas.microsoft.com/office/powerpoint/2010/main" val="1917486223"/>
+        <p14:creationId xmlns:p14="http://schemas.microsoft.com/office/powerpoint/2010/main" val="2640042963"/>
       </p:ext>
     </p:extLst>
   </p:cSld>
@@ -1309,7 +1139,7 @@
     </p:spTree>
     <p:extLst>
       <p:ext uri="{BB962C8B-B14F-4D97-AF65-F5344CB8AC3E}">
-        <p14:creationId xmlns:p14="http://schemas.microsoft.com/office/powerpoint/2010/main" val="1031094145"/>
+        <p14:creationId xmlns:p14="http://schemas.microsoft.com/office/powerpoint/2010/main" val="3348031459"/>
       </p:ext>
     </p:extLst>
   </p:cSld>
@@ -1393,7 +1223,7 @@
     </p:spTree>
     <p:extLst>
       <p:ext uri="{BB962C8B-B14F-4D97-AF65-F5344CB8AC3E}">
-        <p14:creationId xmlns:p14="http://schemas.microsoft.com/office/powerpoint/2010/main" val="2640042963"/>
+        <p14:creationId xmlns:p14="http://schemas.microsoft.com/office/powerpoint/2010/main" val="463232708"/>
       </p:ext>
     </p:extLst>
   </p:cSld>
@@ -1477,7 +1307,7 @@
     </p:spTree>
     <p:extLst>
       <p:ext uri="{BB962C8B-B14F-4D97-AF65-F5344CB8AC3E}">
-        <p14:creationId xmlns:p14="http://schemas.microsoft.com/office/powerpoint/2010/main" val="3348031459"/>
+        <p14:creationId xmlns:p14="http://schemas.microsoft.com/office/powerpoint/2010/main" val="869867913"/>
       </p:ext>
     </p:extLst>
   </p:cSld>
@@ -1561,7 +1391,7 @@
     </p:spTree>
     <p:extLst>
       <p:ext uri="{BB962C8B-B14F-4D97-AF65-F5344CB8AC3E}">
-        <p14:creationId xmlns:p14="http://schemas.microsoft.com/office/powerpoint/2010/main" val="463232708"/>
+        <p14:creationId xmlns:p14="http://schemas.microsoft.com/office/powerpoint/2010/main" val="593661695"/>
       </p:ext>
     </p:extLst>
   </p:cSld>
@@ -5175,41 +5005,6 @@
       </p:grpSpPr>
       <p:sp>
         <p:nvSpPr>
-          <p:cNvPr id="2" name="Заголовок 1">
-            <a:extLst>
-              <a:ext uri="{FF2B5EF4-FFF2-40B4-BE49-F238E27FC236}">
-                <a16:creationId xmlns:a16="http://schemas.microsoft.com/office/drawing/2014/main" id="{1802D59D-6A83-151A-EEA2-678960399BE4}"/>
-              </a:ext>
-            </a:extLst>
-          </p:cNvPr>
-          <p:cNvSpPr>
-            <a:spLocks noGrp="1"/>
-          </p:cNvSpPr>
-          <p:nvPr>
-            <p:ph type="title"/>
-          </p:nvPr>
-        </p:nvSpPr>
-        <p:spPr>
-          <a:xfrm>
-            <a:off x="428017" y="0"/>
-            <a:ext cx="10515600" cy="863601"/>
-          </a:xfrm>
-        </p:spPr>
-        <p:txBody>
-          <a:bodyPr>
-            <a:normAutofit/>
-          </a:bodyPr>
-          <a:lstStyle/>
-          <a:p>
-            <a:r>
-              <a:rPr lang="ru-RU" sz="4000" b="1" dirty="0"/>
-              <a:t>Генерация кандидатов</a:t>
-            </a:r>
-          </a:p>
-        </p:txBody>
-      </p:sp>
-      <p:sp>
-        <p:nvSpPr>
           <p:cNvPr id="3" name="Номер слайда 2">
             <a:extLst>
               <a:ext uri="{FF2B5EF4-FFF2-40B4-BE49-F238E27FC236}">
@@ -5232,231 +5027,6 @@
             <a:fld id="{E83D2FD5-BBDA-43D0-B172-791327EA2B6A}" type="slidenum">
               <a:rPr lang="ru-RU" smtClean="0"/>
               <a:t>10</a:t>
-            </a:fld>
-            <a:endParaRPr lang="ru-RU" dirty="0"/>
-          </a:p>
-        </p:txBody>
-      </p:sp>
-      <p:pic>
-        <p:nvPicPr>
-          <p:cNvPr id="8" name="Рисунок 7">
-            <a:extLst>
-              <a:ext uri="{FF2B5EF4-FFF2-40B4-BE49-F238E27FC236}">
-                <a16:creationId xmlns:a16="http://schemas.microsoft.com/office/drawing/2014/main" id="{6AF78E23-D493-4862-A255-AD1BF5665867}"/>
-              </a:ext>
-            </a:extLst>
-          </p:cNvPr>
-          <p:cNvPicPr>
-            <a:picLocks noChangeAspect="1"/>
-          </p:cNvPicPr>
-          <p:nvPr/>
-        </p:nvPicPr>
-        <p:blipFill>
-          <a:blip r:embed="rId3">
-            <a:extLst>
-              <a:ext uri="{28A0092B-C50C-407E-A947-70E740481C1C}">
-                <a14:useLocalDpi xmlns:a14="http://schemas.microsoft.com/office/drawing/2010/main" val="0"/>
-              </a:ext>
-            </a:extLst>
-          </a:blip>
-          <a:stretch>
-            <a:fillRect/>
-          </a:stretch>
-        </p:blipFill>
-        <p:spPr>
-          <a:xfrm>
-            <a:off x="212659" y="954733"/>
-            <a:ext cx="11766681" cy="5401617"/>
-          </a:xfrm>
-          <a:prstGeom prst="rect">
-            <a:avLst/>
-          </a:prstGeom>
-        </p:spPr>
-      </p:pic>
-    </p:spTree>
-    <p:extLst>
-      <p:ext uri="{BB962C8B-B14F-4D97-AF65-F5344CB8AC3E}">
-        <p14:creationId xmlns:p14="http://schemas.microsoft.com/office/powerpoint/2010/main" val="2884998727"/>
-      </p:ext>
-    </p:extLst>
-  </p:cSld>
-  <p:clrMapOvr>
-    <a:masterClrMapping/>
-  </p:clrMapOvr>
-</p:sld>
-</file>
-
-<file path=ppt/slides/slide11.xml><?xml version="1.0" encoding="utf-8"?>
-<p:sld xmlns:a="http://schemas.openxmlformats.org/drawingml/2006/main" xmlns:r="http://schemas.openxmlformats.org/officeDocument/2006/relationships" xmlns:p="http://schemas.openxmlformats.org/presentationml/2006/main">
-  <p:cSld>
-    <p:spTree>
-      <p:nvGrpSpPr>
-        <p:cNvPr id="1" name=""/>
-        <p:cNvGrpSpPr/>
-        <p:nvPr/>
-      </p:nvGrpSpPr>
-      <p:grpSpPr>
-        <a:xfrm>
-          <a:off x="0" y="0"/>
-          <a:ext cx="0" cy="0"/>
-          <a:chOff x="0" y="0"/>
-          <a:chExt cx="0" cy="0"/>
-        </a:xfrm>
-      </p:grpSpPr>
-      <p:sp>
-        <p:nvSpPr>
-          <p:cNvPr id="2" name="Заголовок 1">
-            <a:extLst>
-              <a:ext uri="{FF2B5EF4-FFF2-40B4-BE49-F238E27FC236}">
-                <a16:creationId xmlns:a16="http://schemas.microsoft.com/office/drawing/2014/main" id="{1802D59D-6A83-151A-EEA2-678960399BE4}"/>
-              </a:ext>
-            </a:extLst>
-          </p:cNvPr>
-          <p:cNvSpPr>
-            <a:spLocks noGrp="1"/>
-          </p:cNvSpPr>
-          <p:nvPr>
-            <p:ph type="title"/>
-          </p:nvPr>
-        </p:nvSpPr>
-        <p:spPr>
-          <a:xfrm>
-            <a:off x="428017" y="0"/>
-            <a:ext cx="10515600" cy="863601"/>
-          </a:xfrm>
-        </p:spPr>
-        <p:txBody>
-          <a:bodyPr>
-            <a:normAutofit/>
-          </a:bodyPr>
-          <a:lstStyle/>
-          <a:p>
-            <a:r>
-              <a:rPr lang="ru-RU" sz="4000" b="1" dirty="0"/>
-              <a:t>Проверка поддержки кандидата сессией</a:t>
-            </a:r>
-          </a:p>
-        </p:txBody>
-      </p:sp>
-      <p:sp>
-        <p:nvSpPr>
-          <p:cNvPr id="3" name="Номер слайда 2">
-            <a:extLst>
-              <a:ext uri="{FF2B5EF4-FFF2-40B4-BE49-F238E27FC236}">
-                <a16:creationId xmlns:a16="http://schemas.microsoft.com/office/drawing/2014/main" id="{EB930BD0-D85B-F112-101C-B409455C44FB}"/>
-              </a:ext>
-            </a:extLst>
-          </p:cNvPr>
-          <p:cNvSpPr>
-            <a:spLocks noGrp="1"/>
-          </p:cNvSpPr>
-          <p:nvPr>
-            <p:ph type="sldNum" sz="quarter" idx="12"/>
-          </p:nvPr>
-        </p:nvSpPr>
-        <p:spPr/>
-        <p:txBody>
-          <a:bodyPr/>
-          <a:lstStyle/>
-          <a:p>
-            <a:fld id="{E83D2FD5-BBDA-43D0-B172-791327EA2B6A}" type="slidenum">
-              <a:rPr lang="ru-RU" smtClean="0"/>
-              <a:t>11</a:t>
-            </a:fld>
-            <a:endParaRPr lang="ru-RU" dirty="0"/>
-          </a:p>
-        </p:txBody>
-      </p:sp>
-      <p:pic>
-        <p:nvPicPr>
-          <p:cNvPr id="10" name="Рисунок 9">
-            <a:extLst>
-              <a:ext uri="{FF2B5EF4-FFF2-40B4-BE49-F238E27FC236}">
-                <a16:creationId xmlns:a16="http://schemas.microsoft.com/office/drawing/2014/main" id="{581815B5-8490-4C22-A79B-494F79BC9F15}"/>
-              </a:ext>
-            </a:extLst>
-          </p:cNvPr>
-          <p:cNvPicPr>
-            <a:picLocks noChangeAspect="1"/>
-          </p:cNvPicPr>
-          <p:nvPr/>
-        </p:nvPicPr>
-        <p:blipFill>
-          <a:blip r:embed="rId3">
-            <a:extLst>
-              <a:ext uri="{28A0092B-C50C-407E-A947-70E740481C1C}">
-                <a14:useLocalDpi xmlns:a14="http://schemas.microsoft.com/office/drawing/2010/main" val="0"/>
-              </a:ext>
-            </a:extLst>
-          </a:blip>
-          <a:stretch>
-            <a:fillRect/>
-          </a:stretch>
-        </p:blipFill>
-        <p:spPr>
-          <a:xfrm>
-            <a:off x="1431260" y="863601"/>
-            <a:ext cx="8509114" cy="5860444"/>
-          </a:xfrm>
-          <a:prstGeom prst="rect">
-            <a:avLst/>
-          </a:prstGeom>
-        </p:spPr>
-      </p:pic>
-    </p:spTree>
-    <p:extLst>
-      <p:ext uri="{BB962C8B-B14F-4D97-AF65-F5344CB8AC3E}">
-        <p14:creationId xmlns:p14="http://schemas.microsoft.com/office/powerpoint/2010/main" val="1246671588"/>
-      </p:ext>
-    </p:extLst>
-  </p:cSld>
-  <p:clrMapOvr>
-    <a:masterClrMapping/>
-  </p:clrMapOvr>
-</p:sld>
-</file>
-
-<file path=ppt/slides/slide12.xml><?xml version="1.0" encoding="utf-8"?>
-<p:sld xmlns:a="http://schemas.openxmlformats.org/drawingml/2006/main" xmlns:r="http://schemas.openxmlformats.org/officeDocument/2006/relationships" xmlns:p="http://schemas.openxmlformats.org/presentationml/2006/main">
-  <p:cSld>
-    <p:spTree>
-      <p:nvGrpSpPr>
-        <p:cNvPr id="1" name=""/>
-        <p:cNvGrpSpPr/>
-        <p:nvPr/>
-      </p:nvGrpSpPr>
-      <p:grpSpPr>
-        <a:xfrm>
-          <a:off x="0" y="0"/>
-          <a:ext cx="0" cy="0"/>
-          <a:chOff x="0" y="0"/>
-          <a:chExt cx="0" cy="0"/>
-        </a:xfrm>
-      </p:grpSpPr>
-      <p:sp>
-        <p:nvSpPr>
-          <p:cNvPr id="3" name="Номер слайда 2">
-            <a:extLst>
-              <a:ext uri="{FF2B5EF4-FFF2-40B4-BE49-F238E27FC236}">
-                <a16:creationId xmlns:a16="http://schemas.microsoft.com/office/drawing/2014/main" id="{EB930BD0-D85B-F112-101C-B409455C44FB}"/>
-              </a:ext>
-            </a:extLst>
-          </p:cNvPr>
-          <p:cNvSpPr>
-            <a:spLocks noGrp="1"/>
-          </p:cNvSpPr>
-          <p:nvPr>
-            <p:ph type="sldNum" sz="quarter" idx="12"/>
-          </p:nvPr>
-        </p:nvSpPr>
-        <p:spPr/>
-        <p:txBody>
-          <a:bodyPr/>
-          <a:lstStyle/>
-          <a:p>
-            <a:fld id="{E83D2FD5-BBDA-43D0-B172-791327EA2B6A}" type="slidenum">
-              <a:rPr lang="ru-RU" smtClean="0"/>
-              <a:t>12</a:t>
             </a:fld>
             <a:endParaRPr lang="ru-RU" dirty="0"/>
           </a:p>
@@ -5546,7 +5116,7 @@
 </p:sld>
 </file>
 
-<file path=ppt/slides/slide13.xml><?xml version="1.0" encoding="utf-8"?>
+<file path=ppt/slides/slide11.xml><?xml version="1.0" encoding="utf-8"?>
 <p:sld xmlns:a="http://schemas.openxmlformats.org/drawingml/2006/main" xmlns:r="http://schemas.openxmlformats.org/officeDocument/2006/relationships" xmlns:p="http://schemas.openxmlformats.org/presentationml/2006/main">
   <p:cSld>
     <p:spTree>
@@ -5586,7 +5156,7 @@
           <a:p>
             <a:fld id="{E83D2FD5-BBDA-43D0-B172-791327EA2B6A}" type="slidenum">
               <a:rPr lang="ru-RU" smtClean="0"/>
-              <a:t>13</a:t>
+              <a:t>11</a:t>
             </a:fld>
             <a:endParaRPr lang="ru-RU" dirty="0"/>
           </a:p>
@@ -5747,6 +5317,426 @@
     <p:extLst>
       <p:ext uri="{BB962C8B-B14F-4D97-AF65-F5344CB8AC3E}">
         <p14:creationId xmlns:p14="http://schemas.microsoft.com/office/powerpoint/2010/main" val="3140211488"/>
+      </p:ext>
+    </p:extLst>
+  </p:cSld>
+  <p:clrMapOvr>
+    <a:masterClrMapping/>
+  </p:clrMapOvr>
+</p:sld>
+</file>
+
+<file path=ppt/slides/slide12.xml><?xml version="1.0" encoding="utf-8"?>
+<p:sld xmlns:a="http://schemas.openxmlformats.org/drawingml/2006/main" xmlns:r="http://schemas.openxmlformats.org/officeDocument/2006/relationships" xmlns:p="http://schemas.openxmlformats.org/presentationml/2006/main">
+  <p:cSld>
+    <p:spTree>
+      <p:nvGrpSpPr>
+        <p:cNvPr id="1" name=""/>
+        <p:cNvGrpSpPr/>
+        <p:nvPr/>
+      </p:nvGrpSpPr>
+      <p:grpSpPr>
+        <a:xfrm>
+          <a:off x="0" y="0"/>
+          <a:ext cx="0" cy="0"/>
+          <a:chOff x="0" y="0"/>
+          <a:chExt cx="0" cy="0"/>
+        </a:xfrm>
+      </p:grpSpPr>
+      <p:sp>
+        <p:nvSpPr>
+          <p:cNvPr id="3" name="Номер слайда 2">
+            <a:extLst>
+              <a:ext uri="{FF2B5EF4-FFF2-40B4-BE49-F238E27FC236}">
+                <a16:creationId xmlns:a16="http://schemas.microsoft.com/office/drawing/2014/main" id="{EB930BD0-D85B-F112-101C-B409455C44FB}"/>
+              </a:ext>
+            </a:extLst>
+          </p:cNvPr>
+          <p:cNvSpPr>
+            <a:spLocks noGrp="1"/>
+          </p:cNvSpPr>
+          <p:nvPr>
+            <p:ph type="sldNum" sz="quarter" idx="12"/>
+          </p:nvPr>
+        </p:nvSpPr>
+        <p:spPr/>
+        <p:txBody>
+          <a:bodyPr/>
+          <a:lstStyle/>
+          <a:p>
+            <a:fld id="{E83D2FD5-BBDA-43D0-B172-791327EA2B6A}" type="slidenum">
+              <a:rPr lang="ru-RU" smtClean="0"/>
+              <a:t>12</a:t>
+            </a:fld>
+            <a:endParaRPr lang="ru-RU" dirty="0"/>
+          </a:p>
+        </p:txBody>
+      </p:sp>
+      <p:pic>
+        <p:nvPicPr>
+          <p:cNvPr id="6" name="Рисунок 5">
+            <a:extLst>
+              <a:ext uri="{FF2B5EF4-FFF2-40B4-BE49-F238E27FC236}">
+                <a16:creationId xmlns:a16="http://schemas.microsoft.com/office/drawing/2014/main" id="{E4AF167E-B902-4DA5-9117-6696044BFD8B}"/>
+              </a:ext>
+            </a:extLst>
+          </p:cNvPr>
+          <p:cNvPicPr>
+            <a:picLocks noChangeAspect="1"/>
+          </p:cNvPicPr>
+          <p:nvPr/>
+        </p:nvPicPr>
+        <p:blipFill>
+          <a:blip r:embed="rId3"/>
+          <a:stretch>
+            <a:fillRect/>
+          </a:stretch>
+        </p:blipFill>
+        <p:spPr>
+          <a:xfrm>
+            <a:off x="2532802" y="1201751"/>
+            <a:ext cx="6077798" cy="5039428"/>
+          </a:xfrm>
+          <a:prstGeom prst="rect">
+            <a:avLst/>
+          </a:prstGeom>
+        </p:spPr>
+      </p:pic>
+      <p:sp>
+        <p:nvSpPr>
+          <p:cNvPr id="16" name="Заголовок 1">
+            <a:extLst>
+              <a:ext uri="{FF2B5EF4-FFF2-40B4-BE49-F238E27FC236}">
+                <a16:creationId xmlns:a16="http://schemas.microsoft.com/office/drawing/2014/main" id="{63212DA7-C870-40ED-9C9F-C1361A03DD47}"/>
+              </a:ext>
+            </a:extLst>
+          </p:cNvPr>
+          <p:cNvSpPr txBox="1">
+            <a:spLocks/>
+          </p:cNvSpPr>
+          <p:nvPr/>
+        </p:nvSpPr>
+        <p:spPr>
+          <a:xfrm>
+            <a:off x="436894" y="1"/>
+            <a:ext cx="11755105" cy="1384916"/>
+          </a:xfrm>
+          <a:prstGeom prst="rect">
+            <a:avLst/>
+          </a:prstGeom>
+        </p:spPr>
+        <p:txBody>
+          <a:bodyPr vert="horz" lIns="91440" tIns="45720" rIns="91440" bIns="45720" rtlCol="0" anchor="ctr">
+            <a:noAutofit/>
+          </a:bodyPr>
+          <a:lstStyle>
+            <a:lvl1pPr algn="l" defTabSz="914400" rtl="0" eaLnBrk="1" latinLnBrk="0" hangingPunct="1">
+              <a:lnSpc>
+                <a:spcPct val="90000"/>
+              </a:lnSpc>
+              <a:spcBef>
+                <a:spcPct val="0"/>
+              </a:spcBef>
+              <a:buNone/>
+              <a:defRPr sz="4400" kern="1200">
+                <a:solidFill>
+                  <a:schemeClr val="tx1"/>
+                </a:solidFill>
+                <a:latin typeface="+mj-lt"/>
+                <a:ea typeface="+mj-ea"/>
+                <a:cs typeface="+mj-cs"/>
+              </a:defRPr>
+            </a:lvl1pPr>
+          </a:lstStyle>
+          <a:p>
+            <a:r>
+              <a:rPr lang="ru-RU" sz="4000" b="1" i="0" u="none" strike="noStrike" baseline="0" dirty="0"/>
+              <a:t>Сравнительный анализ времени выполнения этапов метода</a:t>
+            </a:r>
+            <a:endParaRPr lang="ru-RU" sz="4000" b="1" dirty="0"/>
+          </a:p>
+        </p:txBody>
+      </p:sp>
+    </p:spTree>
+    <p:extLst>
+      <p:ext uri="{BB962C8B-B14F-4D97-AF65-F5344CB8AC3E}">
+        <p14:creationId xmlns:p14="http://schemas.microsoft.com/office/powerpoint/2010/main" val="4098407753"/>
+      </p:ext>
+    </p:extLst>
+  </p:cSld>
+  <p:clrMapOvr>
+    <a:masterClrMapping/>
+  </p:clrMapOvr>
+</p:sld>
+</file>
+
+<file path=ppt/slides/slide13.xml><?xml version="1.0" encoding="utf-8"?>
+<p:sld xmlns:a="http://schemas.openxmlformats.org/drawingml/2006/main" xmlns:r="http://schemas.openxmlformats.org/officeDocument/2006/relationships" xmlns:p="http://schemas.openxmlformats.org/presentationml/2006/main">
+  <p:cSld>
+    <p:spTree>
+      <p:nvGrpSpPr>
+        <p:cNvPr id="1" name=""/>
+        <p:cNvGrpSpPr/>
+        <p:nvPr/>
+      </p:nvGrpSpPr>
+      <p:grpSpPr>
+        <a:xfrm>
+          <a:off x="0" y="0"/>
+          <a:ext cx="0" cy="0"/>
+          <a:chOff x="0" y="0"/>
+          <a:chExt cx="0" cy="0"/>
+        </a:xfrm>
+      </p:grpSpPr>
+      <p:sp>
+        <p:nvSpPr>
+          <p:cNvPr id="2" name="Заголовок 1">
+            <a:extLst>
+              <a:ext uri="{FF2B5EF4-FFF2-40B4-BE49-F238E27FC236}">
+                <a16:creationId xmlns:a16="http://schemas.microsoft.com/office/drawing/2014/main" id="{1802D59D-6A83-151A-EEA2-678960399BE4}"/>
+              </a:ext>
+            </a:extLst>
+          </p:cNvPr>
+          <p:cNvSpPr>
+            <a:spLocks noGrp="1"/>
+          </p:cNvSpPr>
+          <p:nvPr>
+            <p:ph type="title"/>
+          </p:nvPr>
+        </p:nvSpPr>
+        <p:spPr>
+          <a:xfrm>
+            <a:off x="428017" y="0"/>
+            <a:ext cx="10515600" cy="863601"/>
+          </a:xfrm>
+        </p:spPr>
+        <p:txBody>
+          <a:bodyPr>
+            <a:normAutofit/>
+          </a:bodyPr>
+          <a:lstStyle/>
+          <a:p>
+            <a:r>
+              <a:rPr lang="ru-RU" sz="4000" b="1" dirty="0"/>
+              <a:t>Заключение</a:t>
+            </a:r>
+          </a:p>
+        </p:txBody>
+      </p:sp>
+      <p:sp>
+        <p:nvSpPr>
+          <p:cNvPr id="3" name="Номер слайда 2">
+            <a:extLst>
+              <a:ext uri="{FF2B5EF4-FFF2-40B4-BE49-F238E27FC236}">
+                <a16:creationId xmlns:a16="http://schemas.microsoft.com/office/drawing/2014/main" id="{EB930BD0-D85B-F112-101C-B409455C44FB}"/>
+              </a:ext>
+            </a:extLst>
+          </p:cNvPr>
+          <p:cNvSpPr>
+            <a:spLocks noGrp="1"/>
+          </p:cNvSpPr>
+          <p:nvPr>
+            <p:ph type="sldNum" sz="quarter" idx="12"/>
+          </p:nvPr>
+        </p:nvSpPr>
+        <p:spPr/>
+        <p:txBody>
+          <a:bodyPr/>
+          <a:lstStyle/>
+          <a:p>
+            <a:fld id="{E83D2FD5-BBDA-43D0-B172-791327EA2B6A}" type="slidenum">
+              <a:rPr lang="ru-RU" smtClean="0"/>
+              <a:t>13</a:t>
+            </a:fld>
+            <a:endParaRPr lang="ru-RU" dirty="0"/>
+          </a:p>
+        </p:txBody>
+      </p:sp>
+      <p:sp>
+        <p:nvSpPr>
+          <p:cNvPr id="5" name="Объект 2">
+            <a:extLst>
+              <a:ext uri="{FF2B5EF4-FFF2-40B4-BE49-F238E27FC236}">
+                <a16:creationId xmlns:a16="http://schemas.microsoft.com/office/drawing/2014/main" id="{02C33000-B0B7-4509-AD8C-600B0EFAA229}"/>
+              </a:ext>
+            </a:extLst>
+          </p:cNvPr>
+          <p:cNvSpPr>
+            <a:spLocks noGrp="1"/>
+          </p:cNvSpPr>
+          <p:nvPr>
+            <p:ph idx="1"/>
+          </p:nvPr>
+        </p:nvSpPr>
+        <p:spPr>
+          <a:xfrm>
+            <a:off x="428017" y="863601"/>
+            <a:ext cx="11182378" cy="5994398"/>
+          </a:xfrm>
+        </p:spPr>
+        <p:txBody>
+          <a:bodyPr>
+            <a:noAutofit/>
+          </a:bodyPr>
+          <a:lstStyle/>
+          <a:p>
+            <a:pPr indent="0">
+              <a:lnSpc>
+                <a:spcPct val="100000"/>
+              </a:lnSpc>
+              <a:buNone/>
+            </a:pPr>
+            <a:r>
+              <a:rPr lang="ru-RU" sz="2600" dirty="0">
+                <a:effectLst/>
+                <a:latin typeface="Times New Roman" panose="02020603050405020304" pitchFamily="18" charset="0"/>
+                <a:ea typeface="Times New Roman" panose="02020603050405020304" pitchFamily="18" charset="0"/>
+              </a:rPr>
+              <a:t>По итогу проделанной работы была достигнута </a:t>
+            </a:r>
+            <a:r>
+              <a:rPr lang="ru-RU" sz="2600" b="1" dirty="0">
+                <a:effectLst/>
+                <a:latin typeface="Times New Roman" panose="02020603050405020304" pitchFamily="18" charset="0"/>
+                <a:ea typeface="Times New Roman" panose="02020603050405020304" pitchFamily="18" charset="0"/>
+              </a:rPr>
+              <a:t>цель</a:t>
+            </a:r>
+            <a:r>
+              <a:rPr lang="ru-RU" sz="2600" dirty="0">
+                <a:effectLst/>
+                <a:latin typeface="Times New Roman" panose="02020603050405020304" pitchFamily="18" charset="0"/>
+                <a:ea typeface="Times New Roman" panose="02020603050405020304" pitchFamily="18" charset="0"/>
+              </a:rPr>
+              <a:t> - разработан и программно реализован метод анализа активности пользователей САПР с использованием поиска последовательных шаблонов.</a:t>
+            </a:r>
+          </a:p>
+          <a:p>
+            <a:pPr indent="0">
+              <a:lnSpc>
+                <a:spcPct val="100000"/>
+              </a:lnSpc>
+              <a:buNone/>
+            </a:pPr>
+            <a:r>
+              <a:rPr lang="ru-RU" sz="2600" dirty="0">
+                <a:effectLst/>
+                <a:latin typeface="Times New Roman" panose="02020603050405020304" pitchFamily="18" charset="0"/>
+                <a:ea typeface="Times New Roman" panose="02020603050405020304" pitchFamily="18" charset="0"/>
+              </a:rPr>
+              <a:t>Также были решены все поставленные </a:t>
+            </a:r>
+            <a:r>
+              <a:rPr lang="ru-RU" sz="2600" b="1" dirty="0">
+                <a:effectLst/>
+                <a:latin typeface="Times New Roman" panose="02020603050405020304" pitchFamily="18" charset="0"/>
+                <a:ea typeface="Times New Roman" panose="02020603050405020304" pitchFamily="18" charset="0"/>
+              </a:rPr>
+              <a:t>задачи</a:t>
+            </a:r>
+            <a:r>
+              <a:rPr lang="ru-RU" sz="2600" dirty="0">
+                <a:effectLst/>
+                <a:latin typeface="Times New Roman" panose="02020603050405020304" pitchFamily="18" charset="0"/>
+                <a:ea typeface="Times New Roman" panose="02020603050405020304" pitchFamily="18" charset="0"/>
+              </a:rPr>
+              <a:t>, а именно:</a:t>
+            </a:r>
+          </a:p>
+          <a:p>
+            <a:pPr marL="742950" indent="-514350">
+              <a:lnSpc>
+                <a:spcPct val="100000"/>
+              </a:lnSpc>
+              <a:buFont typeface="+mj-lt"/>
+              <a:buAutoNum type="arabicParenR"/>
+            </a:pPr>
+            <a:r>
+              <a:rPr lang="ru-RU" sz="2600" dirty="0">
+                <a:effectLst/>
+                <a:latin typeface="Times New Roman" panose="02020603050405020304" pitchFamily="18" charset="0"/>
+                <a:ea typeface="Times New Roman" panose="02020603050405020304" pitchFamily="18" charset="0"/>
+              </a:rPr>
+              <a:t>рассмотрены существующие решения в области анализа активности пользователей, выбраны для них критерии оценки и проведено сравнение;</a:t>
+            </a:r>
+          </a:p>
+          <a:p>
+            <a:pPr marL="742950" indent="-514350">
+              <a:lnSpc>
+                <a:spcPct val="100000"/>
+              </a:lnSpc>
+              <a:buFont typeface="+mj-lt"/>
+              <a:buAutoNum type="arabicParenR"/>
+            </a:pPr>
+            <a:r>
+              <a:rPr lang="ru-RU" sz="2600" dirty="0">
+                <a:effectLst/>
+                <a:latin typeface="Times New Roman" panose="02020603050405020304" pitchFamily="18" charset="0"/>
+                <a:ea typeface="Times New Roman" panose="02020603050405020304" pitchFamily="18" charset="0"/>
+              </a:rPr>
+              <a:t>формализована задача в виде IDEF0-диаграммы;</a:t>
+            </a:r>
+          </a:p>
+          <a:p>
+            <a:pPr marL="742950" indent="-514350">
+              <a:lnSpc>
+                <a:spcPct val="100000"/>
+              </a:lnSpc>
+              <a:buFont typeface="+mj-lt"/>
+              <a:buAutoNum type="arabicParenR"/>
+            </a:pPr>
+            <a:r>
+              <a:rPr lang="ru-RU" sz="2600" dirty="0">
+                <a:effectLst/>
+                <a:latin typeface="Times New Roman" panose="02020603050405020304" pitchFamily="18" charset="0"/>
+                <a:ea typeface="Times New Roman" panose="02020603050405020304" pitchFamily="18" charset="0"/>
+              </a:rPr>
+              <a:t>разработан метод анализа активности пользователей САПР с использованием поиска последовательных шаблонов;</a:t>
+            </a:r>
+          </a:p>
+          <a:p>
+            <a:pPr marL="742950" indent="-514350">
+              <a:lnSpc>
+                <a:spcPct val="100000"/>
+              </a:lnSpc>
+              <a:buFont typeface="+mj-lt"/>
+              <a:buAutoNum type="arabicParenR"/>
+            </a:pPr>
+            <a:r>
+              <a:rPr lang="ru-RU" sz="2600" dirty="0">
+                <a:effectLst/>
+                <a:latin typeface="Times New Roman" panose="02020603050405020304" pitchFamily="18" charset="0"/>
+                <a:ea typeface="Times New Roman" panose="02020603050405020304" pitchFamily="18" charset="0"/>
+              </a:rPr>
+              <a:t>разработано программное обеспечение, реализующее описанный метод;</a:t>
+            </a:r>
+            <a:endParaRPr lang="ru-RU" sz="2600" dirty="0">
+              <a:latin typeface="Times New Roman" panose="02020603050405020304" pitchFamily="18" charset="0"/>
+              <a:ea typeface="Times New Roman" panose="02020603050405020304" pitchFamily="18" charset="0"/>
+            </a:endParaRPr>
+          </a:p>
+          <a:p>
+            <a:pPr marL="742950" indent="-514350">
+              <a:lnSpc>
+                <a:spcPct val="100000"/>
+              </a:lnSpc>
+              <a:buFont typeface="+mj-lt"/>
+              <a:buAutoNum type="arabicParenR"/>
+            </a:pPr>
+            <a:r>
+              <a:rPr lang="ru-RU" sz="2600" dirty="0">
+                <a:effectLst/>
+                <a:latin typeface="Times New Roman" panose="02020603050405020304" pitchFamily="18" charset="0"/>
+                <a:ea typeface="Times New Roman" panose="02020603050405020304" pitchFamily="18" charset="0"/>
+              </a:rPr>
+              <a:t>исследованы характеристики разработанного метода.</a:t>
+            </a:r>
+          </a:p>
+        </p:txBody>
+      </p:sp>
+    </p:spTree>
+    <p:extLst>
+      <p:ext uri="{BB962C8B-B14F-4D97-AF65-F5344CB8AC3E}">
+        <p14:creationId xmlns:p14="http://schemas.microsoft.com/office/powerpoint/2010/main" val="1045649332"/>
       </p:ext>
     </p:extLst>
   </p:cSld>
@@ -5775,150 +5765,6 @@
       </p:grpSpPr>
       <p:sp>
         <p:nvSpPr>
-          <p:cNvPr id="3" name="Номер слайда 2">
-            <a:extLst>
-              <a:ext uri="{FF2B5EF4-FFF2-40B4-BE49-F238E27FC236}">
-                <a16:creationId xmlns:a16="http://schemas.microsoft.com/office/drawing/2014/main" id="{EB930BD0-D85B-F112-101C-B409455C44FB}"/>
-              </a:ext>
-            </a:extLst>
-          </p:cNvPr>
-          <p:cNvSpPr>
-            <a:spLocks noGrp="1"/>
-          </p:cNvSpPr>
-          <p:nvPr>
-            <p:ph type="sldNum" sz="quarter" idx="12"/>
-          </p:nvPr>
-        </p:nvSpPr>
-        <p:spPr/>
-        <p:txBody>
-          <a:bodyPr/>
-          <a:lstStyle/>
-          <a:p>
-            <a:fld id="{E83D2FD5-BBDA-43D0-B172-791327EA2B6A}" type="slidenum">
-              <a:rPr lang="ru-RU" smtClean="0"/>
-              <a:t>14</a:t>
-            </a:fld>
-            <a:endParaRPr lang="ru-RU" dirty="0"/>
-          </a:p>
-        </p:txBody>
-      </p:sp>
-      <p:pic>
-        <p:nvPicPr>
-          <p:cNvPr id="6" name="Рисунок 5">
-            <a:extLst>
-              <a:ext uri="{FF2B5EF4-FFF2-40B4-BE49-F238E27FC236}">
-                <a16:creationId xmlns:a16="http://schemas.microsoft.com/office/drawing/2014/main" id="{E4AF167E-B902-4DA5-9117-6696044BFD8B}"/>
-              </a:ext>
-            </a:extLst>
-          </p:cNvPr>
-          <p:cNvPicPr>
-            <a:picLocks noChangeAspect="1"/>
-          </p:cNvPicPr>
-          <p:nvPr/>
-        </p:nvPicPr>
-        <p:blipFill>
-          <a:blip r:embed="rId3"/>
-          <a:stretch>
-            <a:fillRect/>
-          </a:stretch>
-        </p:blipFill>
-        <p:spPr>
-          <a:xfrm>
-            <a:off x="2532802" y="1201751"/>
-            <a:ext cx="6077798" cy="5039428"/>
-          </a:xfrm>
-          <a:prstGeom prst="rect">
-            <a:avLst/>
-          </a:prstGeom>
-        </p:spPr>
-      </p:pic>
-      <p:sp>
-        <p:nvSpPr>
-          <p:cNvPr id="16" name="Заголовок 1">
-            <a:extLst>
-              <a:ext uri="{FF2B5EF4-FFF2-40B4-BE49-F238E27FC236}">
-                <a16:creationId xmlns:a16="http://schemas.microsoft.com/office/drawing/2014/main" id="{63212DA7-C870-40ED-9C9F-C1361A03DD47}"/>
-              </a:ext>
-            </a:extLst>
-          </p:cNvPr>
-          <p:cNvSpPr txBox="1">
-            <a:spLocks/>
-          </p:cNvSpPr>
-          <p:nvPr/>
-        </p:nvSpPr>
-        <p:spPr>
-          <a:xfrm>
-            <a:off x="436894" y="1"/>
-            <a:ext cx="11755105" cy="1384916"/>
-          </a:xfrm>
-          <a:prstGeom prst="rect">
-            <a:avLst/>
-          </a:prstGeom>
-        </p:spPr>
-        <p:txBody>
-          <a:bodyPr vert="horz" lIns="91440" tIns="45720" rIns="91440" bIns="45720" rtlCol="0" anchor="ctr">
-            <a:noAutofit/>
-          </a:bodyPr>
-          <a:lstStyle>
-            <a:lvl1pPr algn="l" defTabSz="914400" rtl="0" eaLnBrk="1" latinLnBrk="0" hangingPunct="1">
-              <a:lnSpc>
-                <a:spcPct val="90000"/>
-              </a:lnSpc>
-              <a:spcBef>
-                <a:spcPct val="0"/>
-              </a:spcBef>
-              <a:buNone/>
-              <a:defRPr sz="4400" kern="1200">
-                <a:solidFill>
-                  <a:schemeClr val="tx1"/>
-                </a:solidFill>
-                <a:latin typeface="+mj-lt"/>
-                <a:ea typeface="+mj-ea"/>
-                <a:cs typeface="+mj-cs"/>
-              </a:defRPr>
-            </a:lvl1pPr>
-          </a:lstStyle>
-          <a:p>
-            <a:r>
-              <a:rPr lang="ru-RU" sz="4000" b="1" i="0" u="none" strike="noStrike" baseline="0" dirty="0"/>
-              <a:t>Сравнительный анализ времени выполнения этапов метода</a:t>
-            </a:r>
-            <a:endParaRPr lang="ru-RU" sz="4000" b="1" dirty="0"/>
-          </a:p>
-        </p:txBody>
-      </p:sp>
-    </p:spTree>
-    <p:extLst>
-      <p:ext uri="{BB962C8B-B14F-4D97-AF65-F5344CB8AC3E}">
-        <p14:creationId xmlns:p14="http://schemas.microsoft.com/office/powerpoint/2010/main" val="4098407753"/>
-      </p:ext>
-    </p:extLst>
-  </p:cSld>
-  <p:clrMapOvr>
-    <a:masterClrMapping/>
-  </p:clrMapOvr>
-</p:sld>
-</file>
-
-<file path=ppt/slides/slide15.xml><?xml version="1.0" encoding="utf-8"?>
-<p:sld xmlns:a="http://schemas.openxmlformats.org/drawingml/2006/main" xmlns:r="http://schemas.openxmlformats.org/officeDocument/2006/relationships" xmlns:p="http://schemas.openxmlformats.org/presentationml/2006/main">
-  <p:cSld>
-    <p:spTree>
-      <p:nvGrpSpPr>
-        <p:cNvPr id="1" name=""/>
-        <p:cNvGrpSpPr/>
-        <p:nvPr/>
-      </p:nvGrpSpPr>
-      <p:grpSpPr>
-        <a:xfrm>
-          <a:off x="0" y="0"/>
-          <a:ext cx="0" cy="0"/>
-          <a:chOff x="0" y="0"/>
-          <a:chExt cx="0" cy="0"/>
-        </a:xfrm>
-      </p:grpSpPr>
-      <p:sp>
-        <p:nvSpPr>
           <p:cNvPr id="2" name="Заголовок 1">
             <a:extLst>
               <a:ext uri="{FF2B5EF4-FFF2-40B4-BE49-F238E27FC236}">
@@ -5946,282 +5792,6 @@
           <a:lstStyle/>
           <a:p>
             <a:r>
-              <a:rPr lang="ru-RU" sz="4000" b="1" dirty="0"/>
-              <a:t>Заключение</a:t>
-            </a:r>
-          </a:p>
-        </p:txBody>
-      </p:sp>
-      <p:sp>
-        <p:nvSpPr>
-          <p:cNvPr id="3" name="Номер слайда 2">
-            <a:extLst>
-              <a:ext uri="{FF2B5EF4-FFF2-40B4-BE49-F238E27FC236}">
-                <a16:creationId xmlns:a16="http://schemas.microsoft.com/office/drawing/2014/main" id="{EB930BD0-D85B-F112-101C-B409455C44FB}"/>
-              </a:ext>
-            </a:extLst>
-          </p:cNvPr>
-          <p:cNvSpPr>
-            <a:spLocks noGrp="1"/>
-          </p:cNvSpPr>
-          <p:nvPr>
-            <p:ph type="sldNum" sz="quarter" idx="12"/>
-          </p:nvPr>
-        </p:nvSpPr>
-        <p:spPr/>
-        <p:txBody>
-          <a:bodyPr/>
-          <a:lstStyle/>
-          <a:p>
-            <a:fld id="{E83D2FD5-BBDA-43D0-B172-791327EA2B6A}" type="slidenum">
-              <a:rPr lang="ru-RU" smtClean="0"/>
-              <a:t>15</a:t>
-            </a:fld>
-            <a:endParaRPr lang="ru-RU" dirty="0"/>
-          </a:p>
-        </p:txBody>
-      </p:sp>
-      <p:sp>
-        <p:nvSpPr>
-          <p:cNvPr id="5" name="Объект 2">
-            <a:extLst>
-              <a:ext uri="{FF2B5EF4-FFF2-40B4-BE49-F238E27FC236}">
-                <a16:creationId xmlns:a16="http://schemas.microsoft.com/office/drawing/2014/main" id="{02C33000-B0B7-4509-AD8C-600B0EFAA229}"/>
-              </a:ext>
-            </a:extLst>
-          </p:cNvPr>
-          <p:cNvSpPr>
-            <a:spLocks noGrp="1"/>
-          </p:cNvSpPr>
-          <p:nvPr>
-            <p:ph idx="1"/>
-          </p:nvPr>
-        </p:nvSpPr>
-        <p:spPr>
-          <a:xfrm>
-            <a:off x="428017" y="863601"/>
-            <a:ext cx="11182378" cy="5994398"/>
-          </a:xfrm>
-        </p:spPr>
-        <p:txBody>
-          <a:bodyPr>
-            <a:noAutofit/>
-          </a:bodyPr>
-          <a:lstStyle/>
-          <a:p>
-            <a:pPr indent="0">
-              <a:lnSpc>
-                <a:spcPct val="100000"/>
-              </a:lnSpc>
-              <a:buNone/>
-            </a:pPr>
-            <a:r>
-              <a:rPr lang="ru-RU" sz="2600" dirty="0">
-                <a:effectLst/>
-                <a:latin typeface="Times New Roman" panose="02020603050405020304" pitchFamily="18" charset="0"/>
-                <a:ea typeface="Times New Roman" panose="02020603050405020304" pitchFamily="18" charset="0"/>
-              </a:rPr>
-              <a:t>По итогу проделанной работы была достигнута </a:t>
-            </a:r>
-            <a:r>
-              <a:rPr lang="ru-RU" sz="2600" b="1" dirty="0">
-                <a:effectLst/>
-                <a:latin typeface="Times New Roman" panose="02020603050405020304" pitchFamily="18" charset="0"/>
-                <a:ea typeface="Times New Roman" panose="02020603050405020304" pitchFamily="18" charset="0"/>
-              </a:rPr>
-              <a:t>цель</a:t>
-            </a:r>
-            <a:r>
-              <a:rPr lang="ru-RU" sz="2600" dirty="0">
-                <a:effectLst/>
-                <a:latin typeface="Times New Roman" panose="02020603050405020304" pitchFamily="18" charset="0"/>
-                <a:ea typeface="Times New Roman" panose="02020603050405020304" pitchFamily="18" charset="0"/>
-              </a:rPr>
-              <a:t> - разработан и программно реализован метод анализа активности пользователей САПР с использованием поиска последовательных шаблонов.</a:t>
-            </a:r>
-          </a:p>
-          <a:p>
-            <a:pPr indent="0">
-              <a:lnSpc>
-                <a:spcPct val="100000"/>
-              </a:lnSpc>
-              <a:buNone/>
-            </a:pPr>
-            <a:r>
-              <a:rPr lang="ru-RU" sz="2600" dirty="0">
-                <a:effectLst/>
-                <a:latin typeface="Times New Roman" panose="02020603050405020304" pitchFamily="18" charset="0"/>
-                <a:ea typeface="Times New Roman" panose="02020603050405020304" pitchFamily="18" charset="0"/>
-              </a:rPr>
-              <a:t>Также были решены все поставленные </a:t>
-            </a:r>
-            <a:r>
-              <a:rPr lang="ru-RU" sz="2600" b="1" dirty="0">
-                <a:effectLst/>
-                <a:latin typeface="Times New Roman" panose="02020603050405020304" pitchFamily="18" charset="0"/>
-                <a:ea typeface="Times New Roman" panose="02020603050405020304" pitchFamily="18" charset="0"/>
-              </a:rPr>
-              <a:t>задачи</a:t>
-            </a:r>
-            <a:r>
-              <a:rPr lang="ru-RU" sz="2600" dirty="0">
-                <a:effectLst/>
-                <a:latin typeface="Times New Roman" panose="02020603050405020304" pitchFamily="18" charset="0"/>
-                <a:ea typeface="Times New Roman" panose="02020603050405020304" pitchFamily="18" charset="0"/>
-              </a:rPr>
-              <a:t>, а именно:</a:t>
-            </a:r>
-          </a:p>
-          <a:p>
-            <a:pPr marL="742950" indent="-514350">
-              <a:lnSpc>
-                <a:spcPct val="100000"/>
-              </a:lnSpc>
-              <a:buFont typeface="+mj-lt"/>
-              <a:buAutoNum type="arabicParenR"/>
-            </a:pPr>
-            <a:r>
-              <a:rPr lang="ru-RU" sz="2600" dirty="0">
-                <a:effectLst/>
-                <a:latin typeface="Times New Roman" panose="02020603050405020304" pitchFamily="18" charset="0"/>
-                <a:ea typeface="Times New Roman" panose="02020603050405020304" pitchFamily="18" charset="0"/>
-              </a:rPr>
-              <a:t>рассмотрены существующие решения в области анализа активности пользователей, выбраны для них критерии оценки и проведено сравнение;</a:t>
-            </a:r>
-          </a:p>
-          <a:p>
-            <a:pPr marL="742950" indent="-514350">
-              <a:lnSpc>
-                <a:spcPct val="100000"/>
-              </a:lnSpc>
-              <a:buFont typeface="+mj-lt"/>
-              <a:buAutoNum type="arabicParenR"/>
-            </a:pPr>
-            <a:r>
-              <a:rPr lang="ru-RU" sz="2600" dirty="0">
-                <a:effectLst/>
-                <a:latin typeface="Times New Roman" panose="02020603050405020304" pitchFamily="18" charset="0"/>
-                <a:ea typeface="Times New Roman" panose="02020603050405020304" pitchFamily="18" charset="0"/>
-              </a:rPr>
-              <a:t>формализована задача в виде IDEF0-диаграммы;</a:t>
-            </a:r>
-          </a:p>
-          <a:p>
-            <a:pPr marL="742950" indent="-514350">
-              <a:lnSpc>
-                <a:spcPct val="100000"/>
-              </a:lnSpc>
-              <a:buFont typeface="+mj-lt"/>
-              <a:buAutoNum type="arabicParenR"/>
-            </a:pPr>
-            <a:r>
-              <a:rPr lang="ru-RU" sz="2600" dirty="0">
-                <a:effectLst/>
-                <a:latin typeface="Times New Roman" panose="02020603050405020304" pitchFamily="18" charset="0"/>
-                <a:ea typeface="Times New Roman" panose="02020603050405020304" pitchFamily="18" charset="0"/>
-              </a:rPr>
-              <a:t>разработан метод анализа активности пользователей САПР с использованием поиска последовательных шаблонов;</a:t>
-            </a:r>
-          </a:p>
-          <a:p>
-            <a:pPr marL="742950" indent="-514350">
-              <a:lnSpc>
-                <a:spcPct val="100000"/>
-              </a:lnSpc>
-              <a:buFont typeface="+mj-lt"/>
-              <a:buAutoNum type="arabicParenR"/>
-            </a:pPr>
-            <a:r>
-              <a:rPr lang="ru-RU" sz="2600" dirty="0">
-                <a:effectLst/>
-                <a:latin typeface="Times New Roman" panose="02020603050405020304" pitchFamily="18" charset="0"/>
-                <a:ea typeface="Times New Roman" panose="02020603050405020304" pitchFamily="18" charset="0"/>
-              </a:rPr>
-              <a:t>разработано программное обеспечение, реализующее описанный метод;</a:t>
-            </a:r>
-            <a:endParaRPr lang="ru-RU" sz="2600" dirty="0">
-              <a:latin typeface="Times New Roman" panose="02020603050405020304" pitchFamily="18" charset="0"/>
-              <a:ea typeface="Times New Roman" panose="02020603050405020304" pitchFamily="18" charset="0"/>
-            </a:endParaRPr>
-          </a:p>
-          <a:p>
-            <a:pPr marL="742950" indent="-514350">
-              <a:lnSpc>
-                <a:spcPct val="100000"/>
-              </a:lnSpc>
-              <a:buFont typeface="+mj-lt"/>
-              <a:buAutoNum type="arabicParenR"/>
-            </a:pPr>
-            <a:r>
-              <a:rPr lang="ru-RU" sz="2600" dirty="0">
-                <a:effectLst/>
-                <a:latin typeface="Times New Roman" panose="02020603050405020304" pitchFamily="18" charset="0"/>
-                <a:ea typeface="Times New Roman" panose="02020603050405020304" pitchFamily="18" charset="0"/>
-              </a:rPr>
-              <a:t>исследованы характеристики разработанного метода.</a:t>
-            </a:r>
-          </a:p>
-        </p:txBody>
-      </p:sp>
-    </p:spTree>
-    <p:extLst>
-      <p:ext uri="{BB962C8B-B14F-4D97-AF65-F5344CB8AC3E}">
-        <p14:creationId xmlns:p14="http://schemas.microsoft.com/office/powerpoint/2010/main" val="1045649332"/>
-      </p:ext>
-    </p:extLst>
-  </p:cSld>
-  <p:clrMapOvr>
-    <a:masterClrMapping/>
-  </p:clrMapOvr>
-</p:sld>
-</file>
-
-<file path=ppt/slides/slide16.xml><?xml version="1.0" encoding="utf-8"?>
-<p:sld xmlns:a="http://schemas.openxmlformats.org/drawingml/2006/main" xmlns:r="http://schemas.openxmlformats.org/officeDocument/2006/relationships" xmlns:p="http://schemas.openxmlformats.org/presentationml/2006/main">
-  <p:cSld>
-    <p:spTree>
-      <p:nvGrpSpPr>
-        <p:cNvPr id="1" name=""/>
-        <p:cNvGrpSpPr/>
-        <p:nvPr/>
-      </p:nvGrpSpPr>
-      <p:grpSpPr>
-        <a:xfrm>
-          <a:off x="0" y="0"/>
-          <a:ext cx="0" cy="0"/>
-          <a:chOff x="0" y="0"/>
-          <a:chExt cx="0" cy="0"/>
-        </a:xfrm>
-      </p:grpSpPr>
-      <p:sp>
-        <p:nvSpPr>
-          <p:cNvPr id="2" name="Заголовок 1">
-            <a:extLst>
-              <a:ext uri="{FF2B5EF4-FFF2-40B4-BE49-F238E27FC236}">
-                <a16:creationId xmlns:a16="http://schemas.microsoft.com/office/drawing/2014/main" id="{1802D59D-6A83-151A-EEA2-678960399BE4}"/>
-              </a:ext>
-            </a:extLst>
-          </p:cNvPr>
-          <p:cNvSpPr>
-            <a:spLocks noGrp="1"/>
-          </p:cNvSpPr>
-          <p:nvPr>
-            <p:ph type="title"/>
-          </p:nvPr>
-        </p:nvSpPr>
-        <p:spPr>
-          <a:xfrm>
-            <a:off x="428017" y="0"/>
-            <a:ext cx="10515600" cy="863601"/>
-          </a:xfrm>
-        </p:spPr>
-        <p:txBody>
-          <a:bodyPr>
-            <a:normAutofit/>
-          </a:bodyPr>
-          <a:lstStyle/>
-          <a:p>
-            <a:r>
               <a:rPr lang="ru-RU" sz="4000" b="1" dirty="0">
                 <a:effectLst/>
                 <a:ea typeface="Times New Roman" panose="02020603050405020304" pitchFamily="18" charset="0"/>
@@ -6255,7 +5825,7 @@
           <a:p>
             <a:fld id="{E83D2FD5-BBDA-43D0-B172-791327EA2B6A}" type="slidenum">
               <a:rPr lang="ru-RU" smtClean="0"/>
-              <a:t>16</a:t>
+              <a:t>14</a:t>
             </a:fld>
             <a:endParaRPr lang="ru-RU" dirty="0"/>
           </a:p>
@@ -7040,7 +6610,7 @@
         </p:blipFill>
         <p:spPr>
           <a:xfrm>
-            <a:off x="5685817" y="2808435"/>
+            <a:off x="5903495" y="2808436"/>
             <a:ext cx="6096000" cy="1241128"/>
           </a:xfrm>
           <a:prstGeom prst="rect">
@@ -7066,8 +6636,8 @@
         </p:nvSpPr>
         <p:spPr>
           <a:xfrm>
-            <a:off x="428017" y="1650201"/>
-            <a:ext cx="5031750" cy="3557597"/>
+            <a:off x="410183" y="1260640"/>
+            <a:ext cx="5493312" cy="4530560"/>
           </a:xfrm>
         </p:spPr>
         <p:txBody>
@@ -7098,16 +6668,11 @@
             </a:pPr>
             <a:r>
               <a:rPr lang="ru-RU" sz="2400" dirty="0">
-                <a:solidFill>
-                  <a:schemeClr val="bg1">
-                    <a:lumMod val="50000"/>
-                  </a:schemeClr>
-                </a:solidFill>
                 <a:effectLst/>
                 <a:latin typeface="Times New Roman" panose="02020603050405020304" pitchFamily="18" charset="0"/>
                 <a:ea typeface="Times New Roman" panose="02020603050405020304" pitchFamily="18" charset="0"/>
               </a:rPr>
-              <a:t>У каждой команды, уникальное название</a:t>
+              <a:t>Данные о выполненных командах должны содержать информацию об их последовательности.</a:t>
             </a:r>
           </a:p>
           <a:p>
@@ -7131,7 +6696,7 @@
               </a:lnSpc>
             </a:pPr>
             <a:r>
-              <a:rPr lang="ru-RU" sz="2000" dirty="0">
+              <a:rPr lang="ru-RU" dirty="0">
                 <a:effectLst/>
                 <a:latin typeface="Times New Roman" panose="02020603050405020304" pitchFamily="18" charset="0"/>
                 <a:ea typeface="Times New Roman" panose="02020603050405020304" pitchFamily="18" charset="0"/>
@@ -7146,7 +6711,7 @@
               </a:lnSpc>
             </a:pPr>
             <a:r>
-              <a:rPr lang="ru-RU" sz="2000" dirty="0">
+              <a:rPr lang="ru-RU" dirty="0">
                 <a:effectLst/>
                 <a:latin typeface="Times New Roman" panose="02020603050405020304" pitchFamily="18" charset="0"/>
                 <a:ea typeface="Times New Roman" panose="02020603050405020304" pitchFamily="18" charset="0"/>
@@ -7154,13 +6719,13 @@
               <a:t>Минимальный и максимальный разрыв между командами от 0 до </a:t>
             </a:r>
             <a:r>
-              <a:rPr lang="en-US" sz="2000" dirty="0">
+              <a:rPr lang="en-US" dirty="0">
                 <a:latin typeface="Times New Roman" panose="02020603050405020304" pitchFamily="18" charset="0"/>
                 <a:ea typeface="Times New Roman" panose="02020603050405020304" pitchFamily="18" charset="0"/>
               </a:rPr>
               <a:t>INT_MAX (2147483647)</a:t>
             </a:r>
-            <a:endParaRPr lang="ru-RU" sz="2000" dirty="0">
+            <a:endParaRPr lang="ru-RU" dirty="0">
               <a:effectLst/>
               <a:latin typeface="Times New Roman" panose="02020603050405020304" pitchFamily="18" charset="0"/>
               <a:ea typeface="Times New Roman" panose="02020603050405020304" pitchFamily="18" charset="0"/>
@@ -7281,9 +6846,13 @@
           <a:lstStyle/>
           <a:p>
             <a:r>
-              <a:rPr lang="ru-RU" sz="4000" b="1" dirty="0"/>
-              <a:t>Заголовок</a:t>
-            </a:r>
+              <a:rPr lang="ru-RU" sz="4000" b="1" dirty="0">
+                <a:effectLst/>
+                <a:ea typeface="Times New Roman" panose="02020603050405020304" pitchFamily="18" charset="0"/>
+              </a:rPr>
+              <a:t>Характеристики последовательностей</a:t>
+            </a:r>
+            <a:endParaRPr lang="ru-RU" sz="4000" b="1" dirty="0"/>
           </a:p>
         </p:txBody>
       </p:sp>
@@ -7351,12 +6920,32 @@
               <a:buNone/>
             </a:pPr>
             <a:r>
-              <a:rPr lang="ru-RU" sz="2600" dirty="0">
-                <a:effectLst/>
+              <a:rPr lang="ru-RU" sz="2600" b="1" dirty="0">
                 <a:latin typeface="Times New Roman" panose="02020603050405020304" pitchFamily="18" charset="0"/>
                 <a:ea typeface="Times New Roman" panose="02020603050405020304" pitchFamily="18" charset="0"/>
               </a:rPr>
-              <a:t>Далее идет суть: Формализация (2-3 слайда)</a:t>
+              <a:t>Значение</a:t>
+            </a:r>
+            <a:r>
+              <a:rPr lang="ru-RU" sz="2600" dirty="0">
+                <a:latin typeface="Times New Roman" panose="02020603050405020304" pitchFamily="18" charset="0"/>
+                <a:ea typeface="Times New Roman" panose="02020603050405020304" pitchFamily="18" charset="0"/>
+              </a:rPr>
+              <a:t> </a:t>
+            </a:r>
+            <a:r>
+              <a:rPr lang="ru-RU" sz="2600" b="1" dirty="0">
+                <a:latin typeface="Times New Roman" panose="02020603050405020304" pitchFamily="18" charset="0"/>
+                <a:ea typeface="Times New Roman" panose="02020603050405020304" pitchFamily="18" charset="0"/>
+              </a:rPr>
+              <a:t>поддержки</a:t>
+            </a:r>
+            <a:r>
+              <a:rPr lang="ru-RU" sz="2600" dirty="0">
+                <a:latin typeface="Times New Roman" panose="02020603050405020304" pitchFamily="18" charset="0"/>
+                <a:ea typeface="Times New Roman" panose="02020603050405020304" pitchFamily="18" charset="0"/>
+              </a:rPr>
+              <a:t> последовательности равно проценту сессий, которые ее поддерживают. </a:t>
             </a:r>
           </a:p>
           <a:p>
@@ -7372,7 +6961,14 @@
                 <a:latin typeface="Times New Roman" panose="02020603050405020304" pitchFamily="18" charset="0"/>
                 <a:ea typeface="Times New Roman" panose="02020603050405020304" pitchFamily="18" charset="0"/>
               </a:rPr>
-              <a:t>Каждый слайд должен иметь оригинальное название</a:t>
+              <a:t>Сессия поддерживает</a:t>
+            </a:r>
+            <a:r>
+              <a:rPr lang="ru-RU" sz="2600" dirty="0">
+                <a:latin typeface="Times New Roman" panose="02020603050405020304" pitchFamily="18" charset="0"/>
+                <a:ea typeface="Times New Roman" panose="02020603050405020304" pitchFamily="18" charset="0"/>
+              </a:rPr>
+              <a:t> последовательность, если содержит все ее элементы в том же порядке и временной промежуток между каждыми двумя соседними командами удовлетворяет параметрам заданным пользователем.</a:t>
             </a:r>
           </a:p>
           <a:p>
@@ -7383,12 +6979,18 @@
               <a:buNone/>
             </a:pPr>
             <a:r>
-              <a:rPr lang="ru-RU" sz="2600" dirty="0">
-                <a:effectLst/>
+              <a:rPr lang="ru-RU" sz="2600" b="1" dirty="0">
                 <a:latin typeface="Times New Roman" panose="02020603050405020304" pitchFamily="18" charset="0"/>
                 <a:ea typeface="Times New Roman" panose="02020603050405020304" pitchFamily="18" charset="0"/>
               </a:rPr>
-              <a:t>Все формулы должны быть расшифрованы (только те которые понимаете)</a:t>
+              <a:t>Коэффициент зависимости</a:t>
+            </a:r>
+            <a:r>
+              <a:rPr lang="ru-RU" sz="2600" dirty="0">
+                <a:latin typeface="Times New Roman" panose="02020603050405020304" pitchFamily="18" charset="0"/>
+                <a:ea typeface="Times New Roman" panose="02020603050405020304" pitchFamily="18" charset="0"/>
+              </a:rPr>
+              <a:t> показывает, насколько команды в последовательности зависят друг от друга и считается как отношение поддержки последовательности к произведению поддержек всех подпоследовательностей, состоящих из 1 команды. Если значение коэффициента &lt;= 1, значит зависимости нету. Если же &gt; 1, то зависимость есть. Чем больше единицы, тем вероятней то, что эти команды использовались вместе.</a:t>
             </a:r>
           </a:p>
         </p:txBody>
@@ -7396,7 +6998,7 @@
     </p:spTree>
     <p:extLst>
       <p:ext uri="{BB962C8B-B14F-4D97-AF65-F5344CB8AC3E}">
-        <p14:creationId xmlns:p14="http://schemas.microsoft.com/office/powerpoint/2010/main" val="892185403"/>
+        <p14:creationId xmlns:p14="http://schemas.microsoft.com/office/powerpoint/2010/main" val="2850813546"/>
       </p:ext>
     </p:extLst>
   </p:cSld>
@@ -7453,12 +7055,14 @@
           <a:p>
             <a:r>
               <a:rPr lang="ru-RU" sz="4000" b="1" dirty="0">
-                <a:effectLst/>
-                <a:ea typeface="Times New Roman" panose="02020603050405020304" pitchFamily="18" charset="0"/>
+                <a:solidFill>
+                  <a:schemeClr val="bg1">
+                    <a:lumMod val="50000"/>
+                  </a:schemeClr>
+                </a:solidFill>
               </a:rPr>
-              <a:t>Характеристики последовательностей</a:t>
-            </a:r>
-            <a:endParaRPr lang="ru-RU" sz="4000" b="1" dirty="0"/>
+              <a:t>Ключевые этапы алгоритма</a:t>
+            </a:r>
           </a:p>
         </p:txBody>
       </p:sp>
@@ -7526,77 +7130,61 @@
               <a:buNone/>
             </a:pPr>
             <a:r>
-              <a:rPr lang="ru-RU" sz="2600" b="1" dirty="0">
-                <a:latin typeface="Times New Roman" panose="02020603050405020304" pitchFamily="18" charset="0"/>
-                <a:ea typeface="Times New Roman" panose="02020603050405020304" pitchFamily="18" charset="0"/>
-              </a:rPr>
-              <a:t>Значение</a:t>
-            </a:r>
-            <a:r>
               <a:rPr lang="ru-RU" sz="2600" dirty="0">
-                <a:latin typeface="Times New Roman" panose="02020603050405020304" pitchFamily="18" charset="0"/>
-                <a:ea typeface="Times New Roman" panose="02020603050405020304" pitchFamily="18" charset="0"/>
-              </a:rPr>
-              <a:t> </a:t>
-            </a:r>
-            <a:r>
-              <a:rPr lang="ru-RU" sz="2600" b="1" dirty="0">
-                <a:latin typeface="Times New Roman" panose="02020603050405020304" pitchFamily="18" charset="0"/>
-                <a:ea typeface="Times New Roman" panose="02020603050405020304" pitchFamily="18" charset="0"/>
-              </a:rPr>
-              <a:t>поддержки</a:t>
-            </a:r>
-            <a:r>
-              <a:rPr lang="ru-RU" sz="2600" dirty="0">
-                <a:latin typeface="Times New Roman" panose="02020603050405020304" pitchFamily="18" charset="0"/>
-                <a:ea typeface="Times New Roman" panose="02020603050405020304" pitchFamily="18" charset="0"/>
-              </a:rPr>
-              <a:t> последовательности равно проценту сессий, которые ее поддерживают. </a:t>
-            </a:r>
-          </a:p>
-          <a:p>
-            <a:pPr indent="0">
-              <a:lnSpc>
-                <a:spcPct val="100000"/>
-              </a:lnSpc>
-              <a:buNone/>
-            </a:pPr>
-            <a:r>
-              <a:rPr lang="ru-RU" sz="2600" dirty="0">
+                <a:solidFill>
+                  <a:schemeClr val="bg1">
+                    <a:lumMod val="50000"/>
+                  </a:schemeClr>
+                </a:solidFill>
                 <a:effectLst/>
                 <a:latin typeface="Times New Roman" panose="02020603050405020304" pitchFamily="18" charset="0"/>
                 <a:ea typeface="Times New Roman" panose="02020603050405020304" pitchFamily="18" charset="0"/>
               </a:rPr>
-              <a:t>Сессия поддерживает</a:t>
-            </a:r>
+              <a:t>Разработанный метод состоит из двух основных этапов:</a:t>
+            </a:r>
+          </a:p>
+          <a:p>
+            <a:pPr marL="742950" indent="-514350">
+              <a:lnSpc>
+                <a:spcPct val="100000"/>
+              </a:lnSpc>
+              <a:buFont typeface="+mj-lt"/>
+              <a:buAutoNum type="arabicPeriod"/>
+            </a:pPr>
             <a:r>
               <a:rPr lang="ru-RU" sz="2600" dirty="0">
+                <a:solidFill>
+                  <a:schemeClr val="bg1">
+                    <a:lumMod val="50000"/>
+                  </a:schemeClr>
+                </a:solidFill>
+                <a:effectLst/>
                 <a:latin typeface="Times New Roman" panose="02020603050405020304" pitchFamily="18" charset="0"/>
                 <a:ea typeface="Times New Roman" panose="02020603050405020304" pitchFamily="18" charset="0"/>
               </a:rPr>
-              <a:t> последовательность, если содержит все ее элементы в том же порядке и временной промежуток между каждыми двумя соседними командами удовлетворяет параметрам заданным пользователем.</a:t>
-            </a:r>
-          </a:p>
-          <a:p>
-            <a:pPr indent="0">
+              <a:t>Генерация кандидатов.</a:t>
+            </a:r>
+          </a:p>
+          <a:p>
+            <a:pPr marL="742950" indent="-514350">
               <a:lnSpc>
                 <a:spcPct val="100000"/>
               </a:lnSpc>
-              <a:buNone/>
+              <a:buFont typeface="+mj-lt"/>
+              <a:buAutoNum type="arabicPeriod"/>
             </a:pPr>
             <a:r>
-              <a:rPr lang="ru-RU" sz="2600" b="1" dirty="0">
+              <a:rPr lang="ru-RU" sz="2600" dirty="0">
+                <a:solidFill>
+                  <a:schemeClr val="bg1">
+                    <a:lumMod val="50000"/>
+                  </a:schemeClr>
+                </a:solidFill>
+                <a:effectLst/>
                 <a:latin typeface="Times New Roman" panose="02020603050405020304" pitchFamily="18" charset="0"/>
                 <a:ea typeface="Times New Roman" panose="02020603050405020304" pitchFamily="18" charset="0"/>
               </a:rPr>
-              <a:t>Коэффициент зависимости</a:t>
-            </a:r>
-            <a:r>
-              <a:rPr lang="ru-RU" sz="2600" dirty="0">
-                <a:latin typeface="Times New Roman" panose="02020603050405020304" pitchFamily="18" charset="0"/>
-                <a:ea typeface="Times New Roman" panose="02020603050405020304" pitchFamily="18" charset="0"/>
-              </a:rPr>
-              <a:t> показывает, насколько команды в последовательности зависят друг от друга и считается как отношение поддержки последовательности к произведению поддержек всех подпоследовательностей, состоящих из 1 команды. Если значение коэффициента &lt;= 1, значит зависимости нету. Если же &gt; 1, то зависимость есть. Чем больше единицы, тем вероятней то, что эти команды использовались вместе.</a:t>
+              <a:t>Подсчет поддержки кандидатов.</a:t>
             </a:r>
           </a:p>
         </p:txBody>
@@ -7604,7 +7192,7 @@
     </p:spTree>
     <p:extLst>
       <p:ext uri="{BB962C8B-B14F-4D97-AF65-F5344CB8AC3E}">
-        <p14:creationId xmlns:p14="http://schemas.microsoft.com/office/powerpoint/2010/main" val="2850813546"/>
+        <p14:creationId xmlns:p14="http://schemas.microsoft.com/office/powerpoint/2010/main" val="1533887340"/>
       </p:ext>
     </p:extLst>
   </p:cSld>
@@ -7661,7 +7249,7 @@
           <a:p>
             <a:r>
               <a:rPr lang="ru-RU" sz="4000" b="1" dirty="0"/>
-              <a:t>Заголовок</a:t>
+              <a:t>Генерация кандидатов</a:t>
             </a:r>
           </a:p>
         </p:txBody>
@@ -7695,71 +7283,46 @@
           </a:p>
         </p:txBody>
       </p:sp>
-      <p:sp>
-        <p:nvSpPr>
-          <p:cNvPr id="5" name="Объект 2">
-            <a:extLst>
-              <a:ext uri="{FF2B5EF4-FFF2-40B4-BE49-F238E27FC236}">
-                <a16:creationId xmlns:a16="http://schemas.microsoft.com/office/drawing/2014/main" id="{02C33000-B0B7-4509-AD8C-600B0EFAA229}"/>
-              </a:ext>
-            </a:extLst>
-          </p:cNvPr>
-          <p:cNvSpPr>
-            <a:spLocks noGrp="1"/>
-          </p:cNvSpPr>
-          <p:nvPr>
-            <p:ph idx="1"/>
-          </p:nvPr>
-        </p:nvSpPr>
+      <p:pic>
+        <p:nvPicPr>
+          <p:cNvPr id="8" name="Рисунок 7">
+            <a:extLst>
+              <a:ext uri="{FF2B5EF4-FFF2-40B4-BE49-F238E27FC236}">
+                <a16:creationId xmlns:a16="http://schemas.microsoft.com/office/drawing/2014/main" id="{6AF78E23-D493-4862-A255-AD1BF5665867}"/>
+              </a:ext>
+            </a:extLst>
+          </p:cNvPr>
+          <p:cNvPicPr>
+            <a:picLocks noChangeAspect="1"/>
+          </p:cNvPicPr>
+          <p:nvPr/>
+        </p:nvPicPr>
+        <p:blipFill>
+          <a:blip r:embed="rId3">
+            <a:extLst>
+              <a:ext uri="{28A0092B-C50C-407E-A947-70E740481C1C}">
+                <a14:useLocalDpi xmlns:a14="http://schemas.microsoft.com/office/drawing/2010/main" val="0"/>
+              </a:ext>
+            </a:extLst>
+          </a:blip>
+          <a:stretch>
+            <a:fillRect/>
+          </a:stretch>
+        </p:blipFill>
         <p:spPr>
           <a:xfrm>
-            <a:off x="428017" y="863601"/>
-            <a:ext cx="11182378" cy="5994398"/>
+            <a:off x="212659" y="954733"/>
+            <a:ext cx="11766681" cy="5401617"/>
           </a:xfrm>
+          <a:prstGeom prst="rect">
+            <a:avLst/>
+          </a:prstGeom>
         </p:spPr>
-        <p:txBody>
-          <a:bodyPr>
-            <a:noAutofit/>
-          </a:bodyPr>
-          <a:lstStyle/>
-          <a:p>
-            <a:pPr indent="0">
-              <a:lnSpc>
-                <a:spcPct val="100000"/>
-              </a:lnSpc>
-              <a:buNone/>
-            </a:pPr>
-            <a:r>
-              <a:rPr lang="ru-RU" sz="2600" dirty="0">
-                <a:effectLst/>
-                <a:latin typeface="Times New Roman" panose="02020603050405020304" pitchFamily="18" charset="0"/>
-                <a:ea typeface="Times New Roman" panose="02020603050405020304" pitchFamily="18" charset="0"/>
-              </a:rPr>
-              <a:t>Потом схема алгоритма по ГОСТУ (1-2 слайда не больше)</a:t>
-            </a:r>
-          </a:p>
-          <a:p>
-            <a:pPr indent="0">
-              <a:lnSpc>
-                <a:spcPct val="100000"/>
-              </a:lnSpc>
-              <a:buNone/>
-            </a:pPr>
-            <a:r>
-              <a:rPr lang="ru-RU" sz="2600" dirty="0">
-                <a:effectLst/>
-                <a:latin typeface="Times New Roman" panose="02020603050405020304" pitchFamily="18" charset="0"/>
-                <a:ea typeface="Times New Roman" panose="02020603050405020304" pitchFamily="18" charset="0"/>
-              </a:rPr>
-              <a:t>Говорим только особенности алгоритма (не надо говорить о банальном)</a:t>
-            </a:r>
-          </a:p>
-        </p:txBody>
-      </p:sp>
+      </p:pic>
     </p:spTree>
     <p:extLst>
       <p:ext uri="{BB962C8B-B14F-4D97-AF65-F5344CB8AC3E}">
-        <p14:creationId xmlns:p14="http://schemas.microsoft.com/office/powerpoint/2010/main" val="3773342640"/>
+        <p14:creationId xmlns:p14="http://schemas.microsoft.com/office/powerpoint/2010/main" val="2884998727"/>
       </p:ext>
     </p:extLst>
   </p:cSld>
@@ -7815,14 +7378,8 @@
           <a:lstStyle/>
           <a:p>
             <a:r>
-              <a:rPr lang="ru-RU" sz="4000" b="1" dirty="0">
-                <a:solidFill>
-                  <a:schemeClr val="bg1">
-                    <a:lumMod val="50000"/>
-                  </a:schemeClr>
-                </a:solidFill>
-              </a:rPr>
-              <a:t>Особенности предлагаемого метода</a:t>
+              <a:rPr lang="ru-RU" sz="4000" b="1" dirty="0"/>
+              <a:t>Проверка поддержки кандидата сессией</a:t>
             </a:r>
           </a:p>
         </p:txBody>
@@ -7856,110 +7413,46 @@
           </a:p>
         </p:txBody>
       </p:sp>
-      <p:sp>
-        <p:nvSpPr>
-          <p:cNvPr id="5" name="Объект 2">
-            <a:extLst>
-              <a:ext uri="{FF2B5EF4-FFF2-40B4-BE49-F238E27FC236}">
-                <a16:creationId xmlns:a16="http://schemas.microsoft.com/office/drawing/2014/main" id="{02C33000-B0B7-4509-AD8C-600B0EFAA229}"/>
-              </a:ext>
-            </a:extLst>
-          </p:cNvPr>
-          <p:cNvSpPr>
-            <a:spLocks noGrp="1"/>
-          </p:cNvSpPr>
-          <p:nvPr>
-            <p:ph idx="1"/>
-          </p:nvPr>
-        </p:nvSpPr>
+      <p:pic>
+        <p:nvPicPr>
+          <p:cNvPr id="10" name="Рисунок 9">
+            <a:extLst>
+              <a:ext uri="{FF2B5EF4-FFF2-40B4-BE49-F238E27FC236}">
+                <a16:creationId xmlns:a16="http://schemas.microsoft.com/office/drawing/2014/main" id="{581815B5-8490-4C22-A79B-494F79BC9F15}"/>
+              </a:ext>
+            </a:extLst>
+          </p:cNvPr>
+          <p:cNvPicPr>
+            <a:picLocks noChangeAspect="1"/>
+          </p:cNvPicPr>
+          <p:nvPr/>
+        </p:nvPicPr>
+        <p:blipFill>
+          <a:blip r:embed="rId3">
+            <a:extLst>
+              <a:ext uri="{28A0092B-C50C-407E-A947-70E740481C1C}">
+                <a14:useLocalDpi xmlns:a14="http://schemas.microsoft.com/office/drawing/2010/main" val="0"/>
+              </a:ext>
+            </a:extLst>
+          </a:blip>
+          <a:stretch>
+            <a:fillRect/>
+          </a:stretch>
+        </p:blipFill>
         <p:spPr>
           <a:xfrm>
-            <a:off x="428017" y="863601"/>
-            <a:ext cx="11182378" cy="5994398"/>
+            <a:off x="1431260" y="863601"/>
+            <a:ext cx="8509114" cy="5860444"/>
           </a:xfrm>
+          <a:prstGeom prst="rect">
+            <a:avLst/>
+          </a:prstGeom>
         </p:spPr>
-        <p:txBody>
-          <a:bodyPr>
-            <a:noAutofit/>
-          </a:bodyPr>
-          <a:lstStyle/>
-          <a:p>
-            <a:pPr indent="0">
-              <a:lnSpc>
-                <a:spcPct val="100000"/>
-              </a:lnSpc>
-              <a:buNone/>
-            </a:pPr>
-            <a:r>
-              <a:rPr lang="ru-RU" sz="2600" dirty="0">
-                <a:solidFill>
-                  <a:schemeClr val="bg1">
-                    <a:lumMod val="50000"/>
-                  </a:schemeClr>
-                </a:solidFill>
-                <a:effectLst/>
-                <a:latin typeface="Times New Roman" panose="02020603050405020304" pitchFamily="18" charset="0"/>
-                <a:ea typeface="Times New Roman" panose="02020603050405020304" pitchFamily="18" charset="0"/>
-              </a:rPr>
-              <a:t>Перед обработкой данных алгоритмом, они преобразовываются в таблицу базы данных.</a:t>
-            </a:r>
-          </a:p>
-          <a:p>
-            <a:pPr indent="0">
-              <a:lnSpc>
-                <a:spcPct val="100000"/>
-              </a:lnSpc>
-              <a:buNone/>
-            </a:pPr>
-            <a:r>
-              <a:rPr lang="ru-RU" sz="2600" dirty="0">
-                <a:effectLst/>
-                <a:latin typeface="Times New Roman" panose="02020603050405020304" pitchFamily="18" charset="0"/>
-                <a:ea typeface="Times New Roman" panose="02020603050405020304" pitchFamily="18" charset="0"/>
-              </a:rPr>
-              <a:t>Разработанный метод состоит из двух основных этапов:</a:t>
-            </a:r>
-          </a:p>
-          <a:p>
-            <a:pPr marL="742950" indent="-514350">
-              <a:lnSpc>
-                <a:spcPct val="100000"/>
-              </a:lnSpc>
-              <a:buFont typeface="+mj-lt"/>
-              <a:buAutoNum type="arabicPeriod"/>
-            </a:pPr>
-            <a:r>
-              <a:rPr lang="ru-RU" sz="2600" dirty="0">
-                <a:effectLst/>
-                <a:latin typeface="Times New Roman" panose="02020603050405020304" pitchFamily="18" charset="0"/>
-                <a:ea typeface="Times New Roman" panose="02020603050405020304" pitchFamily="18" charset="0"/>
-              </a:rPr>
-              <a:t>Генерация кандидатов.</a:t>
-            </a:r>
-          </a:p>
-          <a:p>
-            <a:pPr marL="742950" indent="-514350">
-              <a:lnSpc>
-                <a:spcPct val="100000"/>
-              </a:lnSpc>
-              <a:buFont typeface="+mj-lt"/>
-              <a:buAutoNum type="arabicPeriod"/>
-            </a:pPr>
-            <a:r>
-              <a:rPr lang="ru-RU" sz="2600" dirty="0">
-                <a:effectLst/>
-                <a:latin typeface="Times New Roman" panose="02020603050405020304" pitchFamily="18" charset="0"/>
-                <a:ea typeface="Times New Roman" panose="02020603050405020304" pitchFamily="18" charset="0"/>
-              </a:rPr>
-              <a:t>Подсчет поддержки кандидатов.</a:t>
-            </a:r>
-          </a:p>
-        </p:txBody>
-      </p:sp>
+      </p:pic>
     </p:spTree>
     <p:extLst>
       <p:ext uri="{BB962C8B-B14F-4D97-AF65-F5344CB8AC3E}">
-        <p14:creationId xmlns:p14="http://schemas.microsoft.com/office/powerpoint/2010/main" val="1533887340"/>
+        <p14:creationId xmlns:p14="http://schemas.microsoft.com/office/powerpoint/2010/main" val="1246671588"/>
       </p:ext>
     </p:extLst>
   </p:cSld>

</xml_diff>

<commit_message>
rdy to pre def
</commit_message>
<xml_diff>
--- a/ВКР/Презентация/ПронинАС_ВКР_презентация.pptx
+++ b/ВКР/Презентация/ПронинАС_ВКР_презентация.pptx
@@ -5,7 +5,7 @@
     <p:sldMasterId id="2147483648" r:id="rId1"/>
   </p:sldMasterIdLst>
   <p:notesMasterIdLst>
-    <p:notesMasterId r:id="rId16"/>
+    <p:notesMasterId r:id="rId18"/>
   </p:notesMasterIdLst>
   <p:sldIdLst>
     <p:sldId id="256" r:id="rId2"/>
@@ -14,14 +14,16 @@
     <p:sldId id="282" r:id="rId5"/>
     <p:sldId id="293" r:id="rId6"/>
     <p:sldId id="307" r:id="rId7"/>
-    <p:sldId id="309" r:id="rId8"/>
-    <p:sldId id="302" r:id="rId9"/>
-    <p:sldId id="303" r:id="rId10"/>
-    <p:sldId id="308" r:id="rId11"/>
-    <p:sldId id="306" r:id="rId12"/>
-    <p:sldId id="305" r:id="rId13"/>
-    <p:sldId id="266" r:id="rId14"/>
-    <p:sldId id="301" r:id="rId15"/>
+    <p:sldId id="310" r:id="rId8"/>
+    <p:sldId id="311" r:id="rId9"/>
+    <p:sldId id="309" r:id="rId10"/>
+    <p:sldId id="302" r:id="rId11"/>
+    <p:sldId id="303" r:id="rId12"/>
+    <p:sldId id="308" r:id="rId13"/>
+    <p:sldId id="306" r:id="rId14"/>
+    <p:sldId id="305" r:id="rId15"/>
+    <p:sldId id="266" r:id="rId16"/>
+    <p:sldId id="301" r:id="rId17"/>
   </p:sldIdLst>
   <p:sldSz cx="12192000" cy="6858000"/>
   <p:notesSz cx="6858000" cy="9144000"/>
@@ -635,7 +637,7 @@
     </p:spTree>
     <p:extLst>
       <p:ext uri="{BB962C8B-B14F-4D97-AF65-F5344CB8AC3E}">
-        <p14:creationId xmlns:p14="http://schemas.microsoft.com/office/powerpoint/2010/main" val="1687902653"/>
+        <p14:creationId xmlns:p14="http://schemas.microsoft.com/office/powerpoint/2010/main" val="869867913"/>
       </p:ext>
     </p:extLst>
   </p:cSld>
@@ -711,6 +713,174 @@
             <a:fld id="{E3BF92F7-6176-4844-94CE-FF1FD83770F1}" type="slidenum">
               <a:rPr lang="ru-RU" smtClean="0"/>
               <a:t>14</a:t>
+            </a:fld>
+            <a:endParaRPr lang="ru-RU"/>
+          </a:p>
+        </p:txBody>
+      </p:sp>
+    </p:spTree>
+    <p:extLst>
+      <p:ext uri="{BB962C8B-B14F-4D97-AF65-F5344CB8AC3E}">
+        <p14:creationId xmlns:p14="http://schemas.microsoft.com/office/powerpoint/2010/main" val="593661695"/>
+      </p:ext>
+    </p:extLst>
+  </p:cSld>
+  <p:clrMapOvr>
+    <a:masterClrMapping/>
+  </p:clrMapOvr>
+</p:notes>
+</file>
+
+<file path=ppt/notesSlides/notesSlide12.xml><?xml version="1.0" encoding="utf-8"?>
+<p:notes xmlns:a="http://schemas.openxmlformats.org/drawingml/2006/main" xmlns:r="http://schemas.openxmlformats.org/officeDocument/2006/relationships" xmlns:p="http://schemas.openxmlformats.org/presentationml/2006/main">
+  <p:cSld>
+    <p:spTree>
+      <p:nvGrpSpPr>
+        <p:cNvPr id="1" name=""/>
+        <p:cNvGrpSpPr/>
+        <p:nvPr/>
+      </p:nvGrpSpPr>
+      <p:grpSpPr>
+        <a:xfrm>
+          <a:off x="0" y="0"/>
+          <a:ext cx="0" cy="0"/>
+          <a:chOff x="0" y="0"/>
+          <a:chExt cx="0" cy="0"/>
+        </a:xfrm>
+      </p:grpSpPr>
+      <p:sp>
+        <p:nvSpPr>
+          <p:cNvPr id="2" name="Образ слайда 1"/>
+          <p:cNvSpPr>
+            <a:spLocks noGrp="1" noRot="1" noChangeAspect="1"/>
+          </p:cNvSpPr>
+          <p:nvPr>
+            <p:ph type="sldImg"/>
+          </p:nvPr>
+        </p:nvSpPr>
+        <p:spPr/>
+      </p:sp>
+      <p:sp>
+        <p:nvSpPr>
+          <p:cNvPr id="3" name="Заметки 2"/>
+          <p:cNvSpPr>
+            <a:spLocks noGrp="1"/>
+          </p:cNvSpPr>
+          <p:nvPr>
+            <p:ph type="body" idx="1"/>
+          </p:nvPr>
+        </p:nvSpPr>
+        <p:spPr/>
+        <p:txBody>
+          <a:bodyPr/>
+          <a:lstStyle/>
+          <a:p>
+            <a:endParaRPr lang="ru-RU" dirty="0"/>
+          </a:p>
+        </p:txBody>
+      </p:sp>
+      <p:sp>
+        <p:nvSpPr>
+          <p:cNvPr id="4" name="Номер слайда 3"/>
+          <p:cNvSpPr>
+            <a:spLocks noGrp="1"/>
+          </p:cNvSpPr>
+          <p:nvPr>
+            <p:ph type="sldNum" sz="quarter" idx="5"/>
+          </p:nvPr>
+        </p:nvSpPr>
+        <p:spPr/>
+        <p:txBody>
+          <a:bodyPr/>
+          <a:lstStyle/>
+          <a:p>
+            <a:fld id="{E3BF92F7-6176-4844-94CE-FF1FD83770F1}" type="slidenum">
+              <a:rPr lang="ru-RU" smtClean="0"/>
+              <a:t>15</a:t>
+            </a:fld>
+            <a:endParaRPr lang="ru-RU"/>
+          </a:p>
+        </p:txBody>
+      </p:sp>
+    </p:spTree>
+    <p:extLst>
+      <p:ext uri="{BB962C8B-B14F-4D97-AF65-F5344CB8AC3E}">
+        <p14:creationId xmlns:p14="http://schemas.microsoft.com/office/powerpoint/2010/main" val="1687902653"/>
+      </p:ext>
+    </p:extLst>
+  </p:cSld>
+  <p:clrMapOvr>
+    <a:masterClrMapping/>
+  </p:clrMapOvr>
+</p:notes>
+</file>
+
+<file path=ppt/notesSlides/notesSlide13.xml><?xml version="1.0" encoding="utf-8"?>
+<p:notes xmlns:a="http://schemas.openxmlformats.org/drawingml/2006/main" xmlns:r="http://schemas.openxmlformats.org/officeDocument/2006/relationships" xmlns:p="http://schemas.openxmlformats.org/presentationml/2006/main">
+  <p:cSld>
+    <p:spTree>
+      <p:nvGrpSpPr>
+        <p:cNvPr id="1" name=""/>
+        <p:cNvGrpSpPr/>
+        <p:nvPr/>
+      </p:nvGrpSpPr>
+      <p:grpSpPr>
+        <a:xfrm>
+          <a:off x="0" y="0"/>
+          <a:ext cx="0" cy="0"/>
+          <a:chOff x="0" y="0"/>
+          <a:chExt cx="0" cy="0"/>
+        </a:xfrm>
+      </p:grpSpPr>
+      <p:sp>
+        <p:nvSpPr>
+          <p:cNvPr id="2" name="Образ слайда 1"/>
+          <p:cNvSpPr>
+            <a:spLocks noGrp="1" noRot="1" noChangeAspect="1"/>
+          </p:cNvSpPr>
+          <p:nvPr>
+            <p:ph type="sldImg"/>
+          </p:nvPr>
+        </p:nvSpPr>
+        <p:spPr/>
+      </p:sp>
+      <p:sp>
+        <p:nvSpPr>
+          <p:cNvPr id="3" name="Заметки 2"/>
+          <p:cNvSpPr>
+            <a:spLocks noGrp="1"/>
+          </p:cNvSpPr>
+          <p:nvPr>
+            <p:ph type="body" idx="1"/>
+          </p:nvPr>
+        </p:nvSpPr>
+        <p:spPr/>
+        <p:txBody>
+          <a:bodyPr/>
+          <a:lstStyle/>
+          <a:p>
+            <a:endParaRPr lang="ru-RU" dirty="0"/>
+          </a:p>
+        </p:txBody>
+      </p:sp>
+      <p:sp>
+        <p:nvSpPr>
+          <p:cNvPr id="4" name="Номер слайда 3"/>
+          <p:cNvSpPr>
+            <a:spLocks noGrp="1"/>
+          </p:cNvSpPr>
+          <p:nvPr>
+            <p:ph type="sldNum" sz="quarter" idx="5"/>
+          </p:nvPr>
+        </p:nvSpPr>
+        <p:spPr/>
+        <p:txBody>
+          <a:bodyPr/>
+          <a:lstStyle/>
+          <a:p>
+            <a:fld id="{E3BF92F7-6176-4844-94CE-FF1FD83770F1}" type="slidenum">
+              <a:rPr lang="ru-RU" smtClean="0"/>
+              <a:t>16</a:t>
             </a:fld>
             <a:endParaRPr lang="ru-RU"/>
           </a:p>
@@ -971,7 +1141,7 @@
     </p:spTree>
     <p:extLst>
       <p:ext uri="{BB962C8B-B14F-4D97-AF65-F5344CB8AC3E}">
-        <p14:creationId xmlns:p14="http://schemas.microsoft.com/office/powerpoint/2010/main" val="1031094145"/>
+        <p14:creationId xmlns:p14="http://schemas.microsoft.com/office/powerpoint/2010/main" val="2880229506"/>
       </p:ext>
     </p:extLst>
   </p:cSld>
@@ -1055,7 +1225,7 @@
     </p:spTree>
     <p:extLst>
       <p:ext uri="{BB962C8B-B14F-4D97-AF65-F5344CB8AC3E}">
-        <p14:creationId xmlns:p14="http://schemas.microsoft.com/office/powerpoint/2010/main" val="2640042963"/>
+        <p14:creationId xmlns:p14="http://schemas.microsoft.com/office/powerpoint/2010/main" val="719460714"/>
       </p:ext>
     </p:extLst>
   </p:cSld>
@@ -1139,7 +1309,7 @@
     </p:spTree>
     <p:extLst>
       <p:ext uri="{BB962C8B-B14F-4D97-AF65-F5344CB8AC3E}">
-        <p14:creationId xmlns:p14="http://schemas.microsoft.com/office/powerpoint/2010/main" val="3348031459"/>
+        <p14:creationId xmlns:p14="http://schemas.microsoft.com/office/powerpoint/2010/main" val="1031094145"/>
       </p:ext>
     </p:extLst>
   </p:cSld>
@@ -1223,7 +1393,7 @@
     </p:spTree>
     <p:extLst>
       <p:ext uri="{BB962C8B-B14F-4D97-AF65-F5344CB8AC3E}">
-        <p14:creationId xmlns:p14="http://schemas.microsoft.com/office/powerpoint/2010/main" val="463232708"/>
+        <p14:creationId xmlns:p14="http://schemas.microsoft.com/office/powerpoint/2010/main" val="2640042963"/>
       </p:ext>
     </p:extLst>
   </p:cSld>
@@ -1307,7 +1477,7 @@
     </p:spTree>
     <p:extLst>
       <p:ext uri="{BB962C8B-B14F-4D97-AF65-F5344CB8AC3E}">
-        <p14:creationId xmlns:p14="http://schemas.microsoft.com/office/powerpoint/2010/main" val="869867913"/>
+        <p14:creationId xmlns:p14="http://schemas.microsoft.com/office/powerpoint/2010/main" val="3348031459"/>
       </p:ext>
     </p:extLst>
   </p:cSld>
@@ -1391,7 +1561,7 @@
     </p:spTree>
     <p:extLst>
       <p:ext uri="{BB962C8B-B14F-4D97-AF65-F5344CB8AC3E}">
-        <p14:creationId xmlns:p14="http://schemas.microsoft.com/office/powerpoint/2010/main" val="593661695"/>
+        <p14:creationId xmlns:p14="http://schemas.microsoft.com/office/powerpoint/2010/main" val="463232708"/>
       </p:ext>
     </p:extLst>
   </p:cSld>
@@ -5005,6 +5175,41 @@
       </p:grpSpPr>
       <p:sp>
         <p:nvSpPr>
+          <p:cNvPr id="2" name="Заголовок 1">
+            <a:extLst>
+              <a:ext uri="{FF2B5EF4-FFF2-40B4-BE49-F238E27FC236}">
+                <a16:creationId xmlns:a16="http://schemas.microsoft.com/office/drawing/2014/main" id="{1802D59D-6A83-151A-EEA2-678960399BE4}"/>
+              </a:ext>
+            </a:extLst>
+          </p:cNvPr>
+          <p:cNvSpPr>
+            <a:spLocks noGrp="1"/>
+          </p:cNvSpPr>
+          <p:nvPr>
+            <p:ph type="title"/>
+          </p:nvPr>
+        </p:nvSpPr>
+        <p:spPr>
+          <a:xfrm>
+            <a:off x="428017" y="0"/>
+            <a:ext cx="10515600" cy="863601"/>
+          </a:xfrm>
+        </p:spPr>
+        <p:txBody>
+          <a:bodyPr>
+            <a:normAutofit/>
+          </a:bodyPr>
+          <a:lstStyle/>
+          <a:p>
+            <a:r>
+              <a:rPr lang="ru-RU" sz="4000" b="1" dirty="0"/>
+              <a:t>Генерация кандидатов</a:t>
+            </a:r>
+          </a:p>
+        </p:txBody>
+      </p:sp>
+      <p:sp>
+        <p:nvSpPr>
           <p:cNvPr id="3" name="Номер слайда 2">
             <a:extLst>
               <a:ext uri="{FF2B5EF4-FFF2-40B4-BE49-F238E27FC236}">
@@ -5027,6 +5232,231 @@
             <a:fld id="{E83D2FD5-BBDA-43D0-B172-791327EA2B6A}" type="slidenum">
               <a:rPr lang="ru-RU" smtClean="0"/>
               <a:t>10</a:t>
+            </a:fld>
+            <a:endParaRPr lang="ru-RU" dirty="0"/>
+          </a:p>
+        </p:txBody>
+      </p:sp>
+      <p:pic>
+        <p:nvPicPr>
+          <p:cNvPr id="8" name="Рисунок 7">
+            <a:extLst>
+              <a:ext uri="{FF2B5EF4-FFF2-40B4-BE49-F238E27FC236}">
+                <a16:creationId xmlns:a16="http://schemas.microsoft.com/office/drawing/2014/main" id="{6AF78E23-D493-4862-A255-AD1BF5665867}"/>
+              </a:ext>
+            </a:extLst>
+          </p:cNvPr>
+          <p:cNvPicPr>
+            <a:picLocks noChangeAspect="1"/>
+          </p:cNvPicPr>
+          <p:nvPr/>
+        </p:nvPicPr>
+        <p:blipFill>
+          <a:blip r:embed="rId3">
+            <a:extLst>
+              <a:ext uri="{28A0092B-C50C-407E-A947-70E740481C1C}">
+                <a14:useLocalDpi xmlns:a14="http://schemas.microsoft.com/office/drawing/2010/main" val="0"/>
+              </a:ext>
+            </a:extLst>
+          </a:blip>
+          <a:stretch>
+            <a:fillRect/>
+          </a:stretch>
+        </p:blipFill>
+        <p:spPr>
+          <a:xfrm>
+            <a:off x="212659" y="954733"/>
+            <a:ext cx="11766681" cy="5401617"/>
+          </a:xfrm>
+          <a:prstGeom prst="rect">
+            <a:avLst/>
+          </a:prstGeom>
+        </p:spPr>
+      </p:pic>
+    </p:spTree>
+    <p:extLst>
+      <p:ext uri="{BB962C8B-B14F-4D97-AF65-F5344CB8AC3E}">
+        <p14:creationId xmlns:p14="http://schemas.microsoft.com/office/powerpoint/2010/main" val="2884998727"/>
+      </p:ext>
+    </p:extLst>
+  </p:cSld>
+  <p:clrMapOvr>
+    <a:masterClrMapping/>
+  </p:clrMapOvr>
+</p:sld>
+</file>
+
+<file path=ppt/slides/slide11.xml><?xml version="1.0" encoding="utf-8"?>
+<p:sld xmlns:a="http://schemas.openxmlformats.org/drawingml/2006/main" xmlns:r="http://schemas.openxmlformats.org/officeDocument/2006/relationships" xmlns:p="http://schemas.openxmlformats.org/presentationml/2006/main">
+  <p:cSld>
+    <p:spTree>
+      <p:nvGrpSpPr>
+        <p:cNvPr id="1" name=""/>
+        <p:cNvGrpSpPr/>
+        <p:nvPr/>
+      </p:nvGrpSpPr>
+      <p:grpSpPr>
+        <a:xfrm>
+          <a:off x="0" y="0"/>
+          <a:ext cx="0" cy="0"/>
+          <a:chOff x="0" y="0"/>
+          <a:chExt cx="0" cy="0"/>
+        </a:xfrm>
+      </p:grpSpPr>
+      <p:sp>
+        <p:nvSpPr>
+          <p:cNvPr id="2" name="Заголовок 1">
+            <a:extLst>
+              <a:ext uri="{FF2B5EF4-FFF2-40B4-BE49-F238E27FC236}">
+                <a16:creationId xmlns:a16="http://schemas.microsoft.com/office/drawing/2014/main" id="{1802D59D-6A83-151A-EEA2-678960399BE4}"/>
+              </a:ext>
+            </a:extLst>
+          </p:cNvPr>
+          <p:cNvSpPr>
+            <a:spLocks noGrp="1"/>
+          </p:cNvSpPr>
+          <p:nvPr>
+            <p:ph type="title"/>
+          </p:nvPr>
+        </p:nvSpPr>
+        <p:spPr>
+          <a:xfrm>
+            <a:off x="428017" y="0"/>
+            <a:ext cx="10515600" cy="863601"/>
+          </a:xfrm>
+        </p:spPr>
+        <p:txBody>
+          <a:bodyPr>
+            <a:normAutofit/>
+          </a:bodyPr>
+          <a:lstStyle/>
+          <a:p>
+            <a:r>
+              <a:rPr lang="ru-RU" sz="4000" b="1" dirty="0"/>
+              <a:t>Проверка поддержки кандидата сессией</a:t>
+            </a:r>
+          </a:p>
+        </p:txBody>
+      </p:sp>
+      <p:sp>
+        <p:nvSpPr>
+          <p:cNvPr id="3" name="Номер слайда 2">
+            <a:extLst>
+              <a:ext uri="{FF2B5EF4-FFF2-40B4-BE49-F238E27FC236}">
+                <a16:creationId xmlns:a16="http://schemas.microsoft.com/office/drawing/2014/main" id="{EB930BD0-D85B-F112-101C-B409455C44FB}"/>
+              </a:ext>
+            </a:extLst>
+          </p:cNvPr>
+          <p:cNvSpPr>
+            <a:spLocks noGrp="1"/>
+          </p:cNvSpPr>
+          <p:nvPr>
+            <p:ph type="sldNum" sz="quarter" idx="12"/>
+          </p:nvPr>
+        </p:nvSpPr>
+        <p:spPr/>
+        <p:txBody>
+          <a:bodyPr/>
+          <a:lstStyle/>
+          <a:p>
+            <a:fld id="{E83D2FD5-BBDA-43D0-B172-791327EA2B6A}" type="slidenum">
+              <a:rPr lang="ru-RU" smtClean="0"/>
+              <a:t>11</a:t>
+            </a:fld>
+            <a:endParaRPr lang="ru-RU" dirty="0"/>
+          </a:p>
+        </p:txBody>
+      </p:sp>
+      <p:pic>
+        <p:nvPicPr>
+          <p:cNvPr id="10" name="Рисунок 9">
+            <a:extLst>
+              <a:ext uri="{FF2B5EF4-FFF2-40B4-BE49-F238E27FC236}">
+                <a16:creationId xmlns:a16="http://schemas.microsoft.com/office/drawing/2014/main" id="{581815B5-8490-4C22-A79B-494F79BC9F15}"/>
+              </a:ext>
+            </a:extLst>
+          </p:cNvPr>
+          <p:cNvPicPr>
+            <a:picLocks noChangeAspect="1"/>
+          </p:cNvPicPr>
+          <p:nvPr/>
+        </p:nvPicPr>
+        <p:blipFill>
+          <a:blip r:embed="rId3">
+            <a:extLst>
+              <a:ext uri="{28A0092B-C50C-407E-A947-70E740481C1C}">
+                <a14:useLocalDpi xmlns:a14="http://schemas.microsoft.com/office/drawing/2010/main" val="0"/>
+              </a:ext>
+            </a:extLst>
+          </a:blip>
+          <a:stretch>
+            <a:fillRect/>
+          </a:stretch>
+        </p:blipFill>
+        <p:spPr>
+          <a:xfrm>
+            <a:off x="1431260" y="863601"/>
+            <a:ext cx="8509114" cy="5860444"/>
+          </a:xfrm>
+          <a:prstGeom prst="rect">
+            <a:avLst/>
+          </a:prstGeom>
+        </p:spPr>
+      </p:pic>
+    </p:spTree>
+    <p:extLst>
+      <p:ext uri="{BB962C8B-B14F-4D97-AF65-F5344CB8AC3E}">
+        <p14:creationId xmlns:p14="http://schemas.microsoft.com/office/powerpoint/2010/main" val="1246671588"/>
+      </p:ext>
+    </p:extLst>
+  </p:cSld>
+  <p:clrMapOvr>
+    <a:masterClrMapping/>
+  </p:clrMapOvr>
+</p:sld>
+</file>
+
+<file path=ppt/slides/slide12.xml><?xml version="1.0" encoding="utf-8"?>
+<p:sld xmlns:a="http://schemas.openxmlformats.org/drawingml/2006/main" xmlns:r="http://schemas.openxmlformats.org/officeDocument/2006/relationships" xmlns:p="http://schemas.openxmlformats.org/presentationml/2006/main">
+  <p:cSld>
+    <p:spTree>
+      <p:nvGrpSpPr>
+        <p:cNvPr id="1" name=""/>
+        <p:cNvGrpSpPr/>
+        <p:nvPr/>
+      </p:nvGrpSpPr>
+      <p:grpSpPr>
+        <a:xfrm>
+          <a:off x="0" y="0"/>
+          <a:ext cx="0" cy="0"/>
+          <a:chOff x="0" y="0"/>
+          <a:chExt cx="0" cy="0"/>
+        </a:xfrm>
+      </p:grpSpPr>
+      <p:sp>
+        <p:nvSpPr>
+          <p:cNvPr id="3" name="Номер слайда 2">
+            <a:extLst>
+              <a:ext uri="{FF2B5EF4-FFF2-40B4-BE49-F238E27FC236}">
+                <a16:creationId xmlns:a16="http://schemas.microsoft.com/office/drawing/2014/main" id="{EB930BD0-D85B-F112-101C-B409455C44FB}"/>
+              </a:ext>
+            </a:extLst>
+          </p:cNvPr>
+          <p:cNvSpPr>
+            <a:spLocks noGrp="1"/>
+          </p:cNvSpPr>
+          <p:nvPr>
+            <p:ph type="sldNum" sz="quarter" idx="12"/>
+          </p:nvPr>
+        </p:nvSpPr>
+        <p:spPr/>
+        <p:txBody>
+          <a:bodyPr/>
+          <a:lstStyle/>
+          <a:p>
+            <a:fld id="{E83D2FD5-BBDA-43D0-B172-791327EA2B6A}" type="slidenum">
+              <a:rPr lang="ru-RU" smtClean="0"/>
+              <a:t>12</a:t>
             </a:fld>
             <a:endParaRPr lang="ru-RU" dirty="0"/>
           </a:p>
@@ -5116,7 +5546,7 @@
 </p:sld>
 </file>
 
-<file path=ppt/slides/slide11.xml><?xml version="1.0" encoding="utf-8"?>
+<file path=ppt/slides/slide13.xml><?xml version="1.0" encoding="utf-8"?>
 <p:sld xmlns:a="http://schemas.openxmlformats.org/drawingml/2006/main" xmlns:r="http://schemas.openxmlformats.org/officeDocument/2006/relationships" xmlns:p="http://schemas.openxmlformats.org/presentationml/2006/main">
   <p:cSld>
     <p:spTree>
@@ -5156,7 +5586,7 @@
           <a:p>
             <a:fld id="{E83D2FD5-BBDA-43D0-B172-791327EA2B6A}" type="slidenum">
               <a:rPr lang="ru-RU" smtClean="0"/>
-              <a:t>11</a:t>
+              <a:t>13</a:t>
             </a:fld>
             <a:endParaRPr lang="ru-RU" dirty="0"/>
           </a:p>
@@ -5317,426 +5747,6 @@
     <p:extLst>
       <p:ext uri="{BB962C8B-B14F-4D97-AF65-F5344CB8AC3E}">
         <p14:creationId xmlns:p14="http://schemas.microsoft.com/office/powerpoint/2010/main" val="3140211488"/>
-      </p:ext>
-    </p:extLst>
-  </p:cSld>
-  <p:clrMapOvr>
-    <a:masterClrMapping/>
-  </p:clrMapOvr>
-</p:sld>
-</file>
-
-<file path=ppt/slides/slide12.xml><?xml version="1.0" encoding="utf-8"?>
-<p:sld xmlns:a="http://schemas.openxmlformats.org/drawingml/2006/main" xmlns:r="http://schemas.openxmlformats.org/officeDocument/2006/relationships" xmlns:p="http://schemas.openxmlformats.org/presentationml/2006/main">
-  <p:cSld>
-    <p:spTree>
-      <p:nvGrpSpPr>
-        <p:cNvPr id="1" name=""/>
-        <p:cNvGrpSpPr/>
-        <p:nvPr/>
-      </p:nvGrpSpPr>
-      <p:grpSpPr>
-        <a:xfrm>
-          <a:off x="0" y="0"/>
-          <a:ext cx="0" cy="0"/>
-          <a:chOff x="0" y="0"/>
-          <a:chExt cx="0" cy="0"/>
-        </a:xfrm>
-      </p:grpSpPr>
-      <p:sp>
-        <p:nvSpPr>
-          <p:cNvPr id="3" name="Номер слайда 2">
-            <a:extLst>
-              <a:ext uri="{FF2B5EF4-FFF2-40B4-BE49-F238E27FC236}">
-                <a16:creationId xmlns:a16="http://schemas.microsoft.com/office/drawing/2014/main" id="{EB930BD0-D85B-F112-101C-B409455C44FB}"/>
-              </a:ext>
-            </a:extLst>
-          </p:cNvPr>
-          <p:cNvSpPr>
-            <a:spLocks noGrp="1"/>
-          </p:cNvSpPr>
-          <p:nvPr>
-            <p:ph type="sldNum" sz="quarter" idx="12"/>
-          </p:nvPr>
-        </p:nvSpPr>
-        <p:spPr/>
-        <p:txBody>
-          <a:bodyPr/>
-          <a:lstStyle/>
-          <a:p>
-            <a:fld id="{E83D2FD5-BBDA-43D0-B172-791327EA2B6A}" type="slidenum">
-              <a:rPr lang="ru-RU" smtClean="0"/>
-              <a:t>12</a:t>
-            </a:fld>
-            <a:endParaRPr lang="ru-RU" dirty="0"/>
-          </a:p>
-        </p:txBody>
-      </p:sp>
-      <p:pic>
-        <p:nvPicPr>
-          <p:cNvPr id="6" name="Рисунок 5">
-            <a:extLst>
-              <a:ext uri="{FF2B5EF4-FFF2-40B4-BE49-F238E27FC236}">
-                <a16:creationId xmlns:a16="http://schemas.microsoft.com/office/drawing/2014/main" id="{E4AF167E-B902-4DA5-9117-6696044BFD8B}"/>
-              </a:ext>
-            </a:extLst>
-          </p:cNvPr>
-          <p:cNvPicPr>
-            <a:picLocks noChangeAspect="1"/>
-          </p:cNvPicPr>
-          <p:nvPr/>
-        </p:nvPicPr>
-        <p:blipFill>
-          <a:blip r:embed="rId3"/>
-          <a:stretch>
-            <a:fillRect/>
-          </a:stretch>
-        </p:blipFill>
-        <p:spPr>
-          <a:xfrm>
-            <a:off x="2532802" y="1201751"/>
-            <a:ext cx="6077798" cy="5039428"/>
-          </a:xfrm>
-          <a:prstGeom prst="rect">
-            <a:avLst/>
-          </a:prstGeom>
-        </p:spPr>
-      </p:pic>
-      <p:sp>
-        <p:nvSpPr>
-          <p:cNvPr id="16" name="Заголовок 1">
-            <a:extLst>
-              <a:ext uri="{FF2B5EF4-FFF2-40B4-BE49-F238E27FC236}">
-                <a16:creationId xmlns:a16="http://schemas.microsoft.com/office/drawing/2014/main" id="{63212DA7-C870-40ED-9C9F-C1361A03DD47}"/>
-              </a:ext>
-            </a:extLst>
-          </p:cNvPr>
-          <p:cNvSpPr txBox="1">
-            <a:spLocks/>
-          </p:cNvSpPr>
-          <p:nvPr/>
-        </p:nvSpPr>
-        <p:spPr>
-          <a:xfrm>
-            <a:off x="436894" y="1"/>
-            <a:ext cx="11755105" cy="1384916"/>
-          </a:xfrm>
-          <a:prstGeom prst="rect">
-            <a:avLst/>
-          </a:prstGeom>
-        </p:spPr>
-        <p:txBody>
-          <a:bodyPr vert="horz" lIns="91440" tIns="45720" rIns="91440" bIns="45720" rtlCol="0" anchor="ctr">
-            <a:noAutofit/>
-          </a:bodyPr>
-          <a:lstStyle>
-            <a:lvl1pPr algn="l" defTabSz="914400" rtl="0" eaLnBrk="1" latinLnBrk="0" hangingPunct="1">
-              <a:lnSpc>
-                <a:spcPct val="90000"/>
-              </a:lnSpc>
-              <a:spcBef>
-                <a:spcPct val="0"/>
-              </a:spcBef>
-              <a:buNone/>
-              <a:defRPr sz="4400" kern="1200">
-                <a:solidFill>
-                  <a:schemeClr val="tx1"/>
-                </a:solidFill>
-                <a:latin typeface="+mj-lt"/>
-                <a:ea typeface="+mj-ea"/>
-                <a:cs typeface="+mj-cs"/>
-              </a:defRPr>
-            </a:lvl1pPr>
-          </a:lstStyle>
-          <a:p>
-            <a:r>
-              <a:rPr lang="ru-RU" sz="4000" b="1" i="0" u="none" strike="noStrike" baseline="0" dirty="0"/>
-              <a:t>Сравнительный анализ времени выполнения этапов метода</a:t>
-            </a:r>
-            <a:endParaRPr lang="ru-RU" sz="4000" b="1" dirty="0"/>
-          </a:p>
-        </p:txBody>
-      </p:sp>
-    </p:spTree>
-    <p:extLst>
-      <p:ext uri="{BB962C8B-B14F-4D97-AF65-F5344CB8AC3E}">
-        <p14:creationId xmlns:p14="http://schemas.microsoft.com/office/powerpoint/2010/main" val="4098407753"/>
-      </p:ext>
-    </p:extLst>
-  </p:cSld>
-  <p:clrMapOvr>
-    <a:masterClrMapping/>
-  </p:clrMapOvr>
-</p:sld>
-</file>
-
-<file path=ppt/slides/slide13.xml><?xml version="1.0" encoding="utf-8"?>
-<p:sld xmlns:a="http://schemas.openxmlformats.org/drawingml/2006/main" xmlns:r="http://schemas.openxmlformats.org/officeDocument/2006/relationships" xmlns:p="http://schemas.openxmlformats.org/presentationml/2006/main">
-  <p:cSld>
-    <p:spTree>
-      <p:nvGrpSpPr>
-        <p:cNvPr id="1" name=""/>
-        <p:cNvGrpSpPr/>
-        <p:nvPr/>
-      </p:nvGrpSpPr>
-      <p:grpSpPr>
-        <a:xfrm>
-          <a:off x="0" y="0"/>
-          <a:ext cx="0" cy="0"/>
-          <a:chOff x="0" y="0"/>
-          <a:chExt cx="0" cy="0"/>
-        </a:xfrm>
-      </p:grpSpPr>
-      <p:sp>
-        <p:nvSpPr>
-          <p:cNvPr id="2" name="Заголовок 1">
-            <a:extLst>
-              <a:ext uri="{FF2B5EF4-FFF2-40B4-BE49-F238E27FC236}">
-                <a16:creationId xmlns:a16="http://schemas.microsoft.com/office/drawing/2014/main" id="{1802D59D-6A83-151A-EEA2-678960399BE4}"/>
-              </a:ext>
-            </a:extLst>
-          </p:cNvPr>
-          <p:cNvSpPr>
-            <a:spLocks noGrp="1"/>
-          </p:cNvSpPr>
-          <p:nvPr>
-            <p:ph type="title"/>
-          </p:nvPr>
-        </p:nvSpPr>
-        <p:spPr>
-          <a:xfrm>
-            <a:off x="428017" y="0"/>
-            <a:ext cx="10515600" cy="863601"/>
-          </a:xfrm>
-        </p:spPr>
-        <p:txBody>
-          <a:bodyPr>
-            <a:normAutofit/>
-          </a:bodyPr>
-          <a:lstStyle/>
-          <a:p>
-            <a:r>
-              <a:rPr lang="ru-RU" sz="4000" b="1" dirty="0"/>
-              <a:t>Заключение</a:t>
-            </a:r>
-          </a:p>
-        </p:txBody>
-      </p:sp>
-      <p:sp>
-        <p:nvSpPr>
-          <p:cNvPr id="3" name="Номер слайда 2">
-            <a:extLst>
-              <a:ext uri="{FF2B5EF4-FFF2-40B4-BE49-F238E27FC236}">
-                <a16:creationId xmlns:a16="http://schemas.microsoft.com/office/drawing/2014/main" id="{EB930BD0-D85B-F112-101C-B409455C44FB}"/>
-              </a:ext>
-            </a:extLst>
-          </p:cNvPr>
-          <p:cNvSpPr>
-            <a:spLocks noGrp="1"/>
-          </p:cNvSpPr>
-          <p:nvPr>
-            <p:ph type="sldNum" sz="quarter" idx="12"/>
-          </p:nvPr>
-        </p:nvSpPr>
-        <p:spPr/>
-        <p:txBody>
-          <a:bodyPr/>
-          <a:lstStyle/>
-          <a:p>
-            <a:fld id="{E83D2FD5-BBDA-43D0-B172-791327EA2B6A}" type="slidenum">
-              <a:rPr lang="ru-RU" smtClean="0"/>
-              <a:t>13</a:t>
-            </a:fld>
-            <a:endParaRPr lang="ru-RU" dirty="0"/>
-          </a:p>
-        </p:txBody>
-      </p:sp>
-      <p:sp>
-        <p:nvSpPr>
-          <p:cNvPr id="5" name="Объект 2">
-            <a:extLst>
-              <a:ext uri="{FF2B5EF4-FFF2-40B4-BE49-F238E27FC236}">
-                <a16:creationId xmlns:a16="http://schemas.microsoft.com/office/drawing/2014/main" id="{02C33000-B0B7-4509-AD8C-600B0EFAA229}"/>
-              </a:ext>
-            </a:extLst>
-          </p:cNvPr>
-          <p:cNvSpPr>
-            <a:spLocks noGrp="1"/>
-          </p:cNvSpPr>
-          <p:nvPr>
-            <p:ph idx="1"/>
-          </p:nvPr>
-        </p:nvSpPr>
-        <p:spPr>
-          <a:xfrm>
-            <a:off x="428017" y="863601"/>
-            <a:ext cx="11182378" cy="5994398"/>
-          </a:xfrm>
-        </p:spPr>
-        <p:txBody>
-          <a:bodyPr>
-            <a:noAutofit/>
-          </a:bodyPr>
-          <a:lstStyle/>
-          <a:p>
-            <a:pPr indent="0">
-              <a:lnSpc>
-                <a:spcPct val="100000"/>
-              </a:lnSpc>
-              <a:buNone/>
-            </a:pPr>
-            <a:r>
-              <a:rPr lang="ru-RU" sz="2600" dirty="0">
-                <a:effectLst/>
-                <a:latin typeface="Times New Roman" panose="02020603050405020304" pitchFamily="18" charset="0"/>
-                <a:ea typeface="Times New Roman" panose="02020603050405020304" pitchFamily="18" charset="0"/>
-              </a:rPr>
-              <a:t>По итогу проделанной работы была достигнута </a:t>
-            </a:r>
-            <a:r>
-              <a:rPr lang="ru-RU" sz="2600" b="1" dirty="0">
-                <a:effectLst/>
-                <a:latin typeface="Times New Roman" panose="02020603050405020304" pitchFamily="18" charset="0"/>
-                <a:ea typeface="Times New Roman" panose="02020603050405020304" pitchFamily="18" charset="0"/>
-              </a:rPr>
-              <a:t>цель</a:t>
-            </a:r>
-            <a:r>
-              <a:rPr lang="ru-RU" sz="2600" dirty="0">
-                <a:effectLst/>
-                <a:latin typeface="Times New Roman" panose="02020603050405020304" pitchFamily="18" charset="0"/>
-                <a:ea typeface="Times New Roman" panose="02020603050405020304" pitchFamily="18" charset="0"/>
-              </a:rPr>
-              <a:t> - разработан и программно реализован метод анализа активности пользователей САПР с использованием поиска последовательных шаблонов.</a:t>
-            </a:r>
-          </a:p>
-          <a:p>
-            <a:pPr indent="0">
-              <a:lnSpc>
-                <a:spcPct val="100000"/>
-              </a:lnSpc>
-              <a:buNone/>
-            </a:pPr>
-            <a:r>
-              <a:rPr lang="ru-RU" sz="2600" dirty="0">
-                <a:effectLst/>
-                <a:latin typeface="Times New Roman" panose="02020603050405020304" pitchFamily="18" charset="0"/>
-                <a:ea typeface="Times New Roman" panose="02020603050405020304" pitchFamily="18" charset="0"/>
-              </a:rPr>
-              <a:t>Также были решены все поставленные </a:t>
-            </a:r>
-            <a:r>
-              <a:rPr lang="ru-RU" sz="2600" b="1" dirty="0">
-                <a:effectLst/>
-                <a:latin typeface="Times New Roman" panose="02020603050405020304" pitchFamily="18" charset="0"/>
-                <a:ea typeface="Times New Roman" panose="02020603050405020304" pitchFamily="18" charset="0"/>
-              </a:rPr>
-              <a:t>задачи</a:t>
-            </a:r>
-            <a:r>
-              <a:rPr lang="ru-RU" sz="2600" dirty="0">
-                <a:effectLst/>
-                <a:latin typeface="Times New Roman" panose="02020603050405020304" pitchFamily="18" charset="0"/>
-                <a:ea typeface="Times New Roman" panose="02020603050405020304" pitchFamily="18" charset="0"/>
-              </a:rPr>
-              <a:t>, а именно:</a:t>
-            </a:r>
-          </a:p>
-          <a:p>
-            <a:pPr marL="742950" indent="-514350">
-              <a:lnSpc>
-                <a:spcPct val="100000"/>
-              </a:lnSpc>
-              <a:buFont typeface="+mj-lt"/>
-              <a:buAutoNum type="arabicParenR"/>
-            </a:pPr>
-            <a:r>
-              <a:rPr lang="ru-RU" sz="2600" dirty="0">
-                <a:effectLst/>
-                <a:latin typeface="Times New Roman" panose="02020603050405020304" pitchFamily="18" charset="0"/>
-                <a:ea typeface="Times New Roman" panose="02020603050405020304" pitchFamily="18" charset="0"/>
-              </a:rPr>
-              <a:t>рассмотрены существующие решения в области анализа активности пользователей, выбраны для них критерии оценки и проведено сравнение;</a:t>
-            </a:r>
-          </a:p>
-          <a:p>
-            <a:pPr marL="742950" indent="-514350">
-              <a:lnSpc>
-                <a:spcPct val="100000"/>
-              </a:lnSpc>
-              <a:buFont typeface="+mj-lt"/>
-              <a:buAutoNum type="arabicParenR"/>
-            </a:pPr>
-            <a:r>
-              <a:rPr lang="ru-RU" sz="2600" dirty="0">
-                <a:effectLst/>
-                <a:latin typeface="Times New Roman" panose="02020603050405020304" pitchFamily="18" charset="0"/>
-                <a:ea typeface="Times New Roman" panose="02020603050405020304" pitchFamily="18" charset="0"/>
-              </a:rPr>
-              <a:t>формализована задача в виде IDEF0-диаграммы;</a:t>
-            </a:r>
-          </a:p>
-          <a:p>
-            <a:pPr marL="742950" indent="-514350">
-              <a:lnSpc>
-                <a:spcPct val="100000"/>
-              </a:lnSpc>
-              <a:buFont typeface="+mj-lt"/>
-              <a:buAutoNum type="arabicParenR"/>
-            </a:pPr>
-            <a:r>
-              <a:rPr lang="ru-RU" sz="2600" dirty="0">
-                <a:effectLst/>
-                <a:latin typeface="Times New Roman" panose="02020603050405020304" pitchFamily="18" charset="0"/>
-                <a:ea typeface="Times New Roman" panose="02020603050405020304" pitchFamily="18" charset="0"/>
-              </a:rPr>
-              <a:t>разработан метод анализа активности пользователей САПР с использованием поиска последовательных шаблонов;</a:t>
-            </a:r>
-          </a:p>
-          <a:p>
-            <a:pPr marL="742950" indent="-514350">
-              <a:lnSpc>
-                <a:spcPct val="100000"/>
-              </a:lnSpc>
-              <a:buFont typeface="+mj-lt"/>
-              <a:buAutoNum type="arabicParenR"/>
-            </a:pPr>
-            <a:r>
-              <a:rPr lang="ru-RU" sz="2600" dirty="0">
-                <a:effectLst/>
-                <a:latin typeface="Times New Roman" panose="02020603050405020304" pitchFamily="18" charset="0"/>
-                <a:ea typeface="Times New Roman" panose="02020603050405020304" pitchFamily="18" charset="0"/>
-              </a:rPr>
-              <a:t>разработано программное обеспечение, реализующее описанный метод;</a:t>
-            </a:r>
-            <a:endParaRPr lang="ru-RU" sz="2600" dirty="0">
-              <a:latin typeface="Times New Roman" panose="02020603050405020304" pitchFamily="18" charset="0"/>
-              <a:ea typeface="Times New Roman" panose="02020603050405020304" pitchFamily="18" charset="0"/>
-            </a:endParaRPr>
-          </a:p>
-          <a:p>
-            <a:pPr marL="742950" indent="-514350">
-              <a:lnSpc>
-                <a:spcPct val="100000"/>
-              </a:lnSpc>
-              <a:buFont typeface="+mj-lt"/>
-              <a:buAutoNum type="arabicParenR"/>
-            </a:pPr>
-            <a:r>
-              <a:rPr lang="ru-RU" sz="2600" dirty="0">
-                <a:effectLst/>
-                <a:latin typeface="Times New Roman" panose="02020603050405020304" pitchFamily="18" charset="0"/>
-                <a:ea typeface="Times New Roman" panose="02020603050405020304" pitchFamily="18" charset="0"/>
-              </a:rPr>
-              <a:t>исследованы характеристики разработанного метода.</a:t>
-            </a:r>
-          </a:p>
-        </p:txBody>
-      </p:sp>
-    </p:spTree>
-    <p:extLst>
-      <p:ext uri="{BB962C8B-B14F-4D97-AF65-F5344CB8AC3E}">
-        <p14:creationId xmlns:p14="http://schemas.microsoft.com/office/powerpoint/2010/main" val="1045649332"/>
       </p:ext>
     </p:extLst>
   </p:cSld>
@@ -5765,6 +5775,150 @@
       </p:grpSpPr>
       <p:sp>
         <p:nvSpPr>
+          <p:cNvPr id="3" name="Номер слайда 2">
+            <a:extLst>
+              <a:ext uri="{FF2B5EF4-FFF2-40B4-BE49-F238E27FC236}">
+                <a16:creationId xmlns:a16="http://schemas.microsoft.com/office/drawing/2014/main" id="{EB930BD0-D85B-F112-101C-B409455C44FB}"/>
+              </a:ext>
+            </a:extLst>
+          </p:cNvPr>
+          <p:cNvSpPr>
+            <a:spLocks noGrp="1"/>
+          </p:cNvSpPr>
+          <p:nvPr>
+            <p:ph type="sldNum" sz="quarter" idx="12"/>
+          </p:nvPr>
+        </p:nvSpPr>
+        <p:spPr/>
+        <p:txBody>
+          <a:bodyPr/>
+          <a:lstStyle/>
+          <a:p>
+            <a:fld id="{E83D2FD5-BBDA-43D0-B172-791327EA2B6A}" type="slidenum">
+              <a:rPr lang="ru-RU" smtClean="0"/>
+              <a:t>14</a:t>
+            </a:fld>
+            <a:endParaRPr lang="ru-RU" dirty="0"/>
+          </a:p>
+        </p:txBody>
+      </p:sp>
+      <p:pic>
+        <p:nvPicPr>
+          <p:cNvPr id="6" name="Рисунок 5">
+            <a:extLst>
+              <a:ext uri="{FF2B5EF4-FFF2-40B4-BE49-F238E27FC236}">
+                <a16:creationId xmlns:a16="http://schemas.microsoft.com/office/drawing/2014/main" id="{E4AF167E-B902-4DA5-9117-6696044BFD8B}"/>
+              </a:ext>
+            </a:extLst>
+          </p:cNvPr>
+          <p:cNvPicPr>
+            <a:picLocks noChangeAspect="1"/>
+          </p:cNvPicPr>
+          <p:nvPr/>
+        </p:nvPicPr>
+        <p:blipFill>
+          <a:blip r:embed="rId3"/>
+          <a:stretch>
+            <a:fillRect/>
+          </a:stretch>
+        </p:blipFill>
+        <p:spPr>
+          <a:xfrm>
+            <a:off x="2532802" y="1201751"/>
+            <a:ext cx="6077798" cy="5039428"/>
+          </a:xfrm>
+          <a:prstGeom prst="rect">
+            <a:avLst/>
+          </a:prstGeom>
+        </p:spPr>
+      </p:pic>
+      <p:sp>
+        <p:nvSpPr>
+          <p:cNvPr id="16" name="Заголовок 1">
+            <a:extLst>
+              <a:ext uri="{FF2B5EF4-FFF2-40B4-BE49-F238E27FC236}">
+                <a16:creationId xmlns:a16="http://schemas.microsoft.com/office/drawing/2014/main" id="{63212DA7-C870-40ED-9C9F-C1361A03DD47}"/>
+              </a:ext>
+            </a:extLst>
+          </p:cNvPr>
+          <p:cNvSpPr txBox="1">
+            <a:spLocks/>
+          </p:cNvSpPr>
+          <p:nvPr/>
+        </p:nvSpPr>
+        <p:spPr>
+          <a:xfrm>
+            <a:off x="436894" y="1"/>
+            <a:ext cx="11755105" cy="1384916"/>
+          </a:xfrm>
+          <a:prstGeom prst="rect">
+            <a:avLst/>
+          </a:prstGeom>
+        </p:spPr>
+        <p:txBody>
+          <a:bodyPr vert="horz" lIns="91440" tIns="45720" rIns="91440" bIns="45720" rtlCol="0" anchor="ctr">
+            <a:noAutofit/>
+          </a:bodyPr>
+          <a:lstStyle>
+            <a:lvl1pPr algn="l" defTabSz="914400" rtl="0" eaLnBrk="1" latinLnBrk="0" hangingPunct="1">
+              <a:lnSpc>
+                <a:spcPct val="90000"/>
+              </a:lnSpc>
+              <a:spcBef>
+                <a:spcPct val="0"/>
+              </a:spcBef>
+              <a:buNone/>
+              <a:defRPr sz="4400" kern="1200">
+                <a:solidFill>
+                  <a:schemeClr val="tx1"/>
+                </a:solidFill>
+                <a:latin typeface="+mj-lt"/>
+                <a:ea typeface="+mj-ea"/>
+                <a:cs typeface="+mj-cs"/>
+              </a:defRPr>
+            </a:lvl1pPr>
+          </a:lstStyle>
+          <a:p>
+            <a:r>
+              <a:rPr lang="ru-RU" sz="4000" b="1" i="0" u="none" strike="noStrike" baseline="0" dirty="0"/>
+              <a:t>Сравнительный анализ времени выполнения этапов метода</a:t>
+            </a:r>
+            <a:endParaRPr lang="ru-RU" sz="4000" b="1" dirty="0"/>
+          </a:p>
+        </p:txBody>
+      </p:sp>
+    </p:spTree>
+    <p:extLst>
+      <p:ext uri="{BB962C8B-B14F-4D97-AF65-F5344CB8AC3E}">
+        <p14:creationId xmlns:p14="http://schemas.microsoft.com/office/powerpoint/2010/main" val="4098407753"/>
+      </p:ext>
+    </p:extLst>
+  </p:cSld>
+  <p:clrMapOvr>
+    <a:masterClrMapping/>
+  </p:clrMapOvr>
+</p:sld>
+</file>
+
+<file path=ppt/slides/slide15.xml><?xml version="1.0" encoding="utf-8"?>
+<p:sld xmlns:a="http://schemas.openxmlformats.org/drawingml/2006/main" xmlns:r="http://schemas.openxmlformats.org/officeDocument/2006/relationships" xmlns:p="http://schemas.openxmlformats.org/presentationml/2006/main">
+  <p:cSld>
+    <p:spTree>
+      <p:nvGrpSpPr>
+        <p:cNvPr id="1" name=""/>
+        <p:cNvGrpSpPr/>
+        <p:nvPr/>
+      </p:nvGrpSpPr>
+      <p:grpSpPr>
+        <a:xfrm>
+          <a:off x="0" y="0"/>
+          <a:ext cx="0" cy="0"/>
+          <a:chOff x="0" y="0"/>
+          <a:chExt cx="0" cy="0"/>
+        </a:xfrm>
+      </p:grpSpPr>
+      <p:sp>
+        <p:nvSpPr>
           <p:cNvPr id="2" name="Заголовок 1">
             <a:extLst>
               <a:ext uri="{FF2B5EF4-FFF2-40B4-BE49-F238E27FC236}">
@@ -5792,13 +5946,9 @@
           <a:lstStyle/>
           <a:p>
             <a:r>
-              <a:rPr lang="ru-RU" sz="4000" b="1" dirty="0">
-                <a:effectLst/>
-                <a:ea typeface="Times New Roman" panose="02020603050405020304" pitchFamily="18" charset="0"/>
-              </a:rPr>
-              <a:t>Перспективы дальнейшего развития</a:t>
-            </a:r>
-            <a:endParaRPr lang="ru-RU" sz="4000" b="1" dirty="0"/>
+              <a:rPr lang="ru-RU" sz="4000" b="1" dirty="0"/>
+              <a:t>Заключение</a:t>
+            </a:r>
           </a:p>
         </p:txBody>
       </p:sp>
@@ -5825,7 +5975,7 @@
           <a:p>
             <a:fld id="{E83D2FD5-BBDA-43D0-B172-791327EA2B6A}" type="slidenum">
               <a:rPr lang="ru-RU" smtClean="0"/>
-              <a:t>14</a:t>
+              <a:t>15</a:t>
             </a:fld>
             <a:endParaRPr lang="ru-RU" dirty="0"/>
           </a:p>
@@ -5859,6 +6009,286 @@
           </a:bodyPr>
           <a:lstStyle/>
           <a:p>
+            <a:pPr indent="0">
+              <a:lnSpc>
+                <a:spcPct val="100000"/>
+              </a:lnSpc>
+              <a:buNone/>
+            </a:pPr>
+            <a:r>
+              <a:rPr lang="ru-RU" sz="2600" dirty="0">
+                <a:effectLst/>
+                <a:latin typeface="Times New Roman" panose="02020603050405020304" pitchFamily="18" charset="0"/>
+                <a:ea typeface="Times New Roman" panose="02020603050405020304" pitchFamily="18" charset="0"/>
+              </a:rPr>
+              <a:t>По итогу проделанной работы была достигнута </a:t>
+            </a:r>
+            <a:r>
+              <a:rPr lang="ru-RU" sz="2600" b="1" dirty="0">
+                <a:effectLst/>
+                <a:latin typeface="Times New Roman" panose="02020603050405020304" pitchFamily="18" charset="0"/>
+                <a:ea typeface="Times New Roman" panose="02020603050405020304" pitchFamily="18" charset="0"/>
+              </a:rPr>
+              <a:t>цель</a:t>
+            </a:r>
+            <a:r>
+              <a:rPr lang="ru-RU" sz="2600" dirty="0">
+                <a:effectLst/>
+                <a:latin typeface="Times New Roman" panose="02020603050405020304" pitchFamily="18" charset="0"/>
+                <a:ea typeface="Times New Roman" panose="02020603050405020304" pitchFamily="18" charset="0"/>
+              </a:rPr>
+              <a:t> - разработан и программно реализован метод анализа активности пользователей САПР с использованием поиска последовательных шаблонов.</a:t>
+            </a:r>
+          </a:p>
+          <a:p>
+            <a:pPr indent="0">
+              <a:lnSpc>
+                <a:spcPct val="100000"/>
+              </a:lnSpc>
+              <a:buNone/>
+            </a:pPr>
+            <a:r>
+              <a:rPr lang="ru-RU" sz="2600" dirty="0">
+                <a:effectLst/>
+                <a:latin typeface="Times New Roman" panose="02020603050405020304" pitchFamily="18" charset="0"/>
+                <a:ea typeface="Times New Roman" panose="02020603050405020304" pitchFamily="18" charset="0"/>
+              </a:rPr>
+              <a:t>Также были решены все поставленные </a:t>
+            </a:r>
+            <a:r>
+              <a:rPr lang="ru-RU" sz="2600" b="1" dirty="0">
+                <a:effectLst/>
+                <a:latin typeface="Times New Roman" panose="02020603050405020304" pitchFamily="18" charset="0"/>
+                <a:ea typeface="Times New Roman" panose="02020603050405020304" pitchFamily="18" charset="0"/>
+              </a:rPr>
+              <a:t>задачи</a:t>
+            </a:r>
+            <a:r>
+              <a:rPr lang="ru-RU" sz="2600" dirty="0">
+                <a:effectLst/>
+                <a:latin typeface="Times New Roman" panose="02020603050405020304" pitchFamily="18" charset="0"/>
+                <a:ea typeface="Times New Roman" panose="02020603050405020304" pitchFamily="18" charset="0"/>
+              </a:rPr>
+              <a:t>, а именно:</a:t>
+            </a:r>
+          </a:p>
+          <a:p>
+            <a:pPr marL="742950" indent="-514350">
+              <a:lnSpc>
+                <a:spcPct val="100000"/>
+              </a:lnSpc>
+              <a:buFont typeface="+mj-lt"/>
+              <a:buAutoNum type="arabicParenR"/>
+            </a:pPr>
+            <a:r>
+              <a:rPr lang="ru-RU" sz="2600" dirty="0">
+                <a:effectLst/>
+                <a:latin typeface="Times New Roman" panose="02020603050405020304" pitchFamily="18" charset="0"/>
+                <a:ea typeface="Times New Roman" panose="02020603050405020304" pitchFamily="18" charset="0"/>
+              </a:rPr>
+              <a:t>рассмотрены существующие решения в области анализа активности пользователей, выбраны для них критерии оценки и проведено сравнение;</a:t>
+            </a:r>
+          </a:p>
+          <a:p>
+            <a:pPr marL="742950" indent="-514350">
+              <a:lnSpc>
+                <a:spcPct val="100000"/>
+              </a:lnSpc>
+              <a:buFont typeface="+mj-lt"/>
+              <a:buAutoNum type="arabicParenR"/>
+            </a:pPr>
+            <a:r>
+              <a:rPr lang="ru-RU" sz="2600" dirty="0">
+                <a:effectLst/>
+                <a:latin typeface="Times New Roman" panose="02020603050405020304" pitchFamily="18" charset="0"/>
+                <a:ea typeface="Times New Roman" panose="02020603050405020304" pitchFamily="18" charset="0"/>
+              </a:rPr>
+              <a:t>формализована задача в виде IDEF0-диаграммы;</a:t>
+            </a:r>
+          </a:p>
+          <a:p>
+            <a:pPr marL="742950" indent="-514350">
+              <a:lnSpc>
+                <a:spcPct val="100000"/>
+              </a:lnSpc>
+              <a:buFont typeface="+mj-lt"/>
+              <a:buAutoNum type="arabicParenR"/>
+            </a:pPr>
+            <a:r>
+              <a:rPr lang="ru-RU" sz="2600" dirty="0">
+                <a:effectLst/>
+                <a:latin typeface="Times New Roman" panose="02020603050405020304" pitchFamily="18" charset="0"/>
+                <a:ea typeface="Times New Roman" panose="02020603050405020304" pitchFamily="18" charset="0"/>
+              </a:rPr>
+              <a:t>разработан метод анализа активности пользователей САПР с использованием поиска последовательных шаблонов;</a:t>
+            </a:r>
+          </a:p>
+          <a:p>
+            <a:pPr marL="742950" indent="-514350">
+              <a:lnSpc>
+                <a:spcPct val="100000"/>
+              </a:lnSpc>
+              <a:buFont typeface="+mj-lt"/>
+              <a:buAutoNum type="arabicParenR"/>
+            </a:pPr>
+            <a:r>
+              <a:rPr lang="ru-RU" sz="2600" dirty="0">
+                <a:effectLst/>
+                <a:latin typeface="Times New Roman" panose="02020603050405020304" pitchFamily="18" charset="0"/>
+                <a:ea typeface="Times New Roman" panose="02020603050405020304" pitchFamily="18" charset="0"/>
+              </a:rPr>
+              <a:t>разработано программное обеспечение, реализующее описанный метод;</a:t>
+            </a:r>
+            <a:endParaRPr lang="ru-RU" sz="2600" dirty="0">
+              <a:latin typeface="Times New Roman" panose="02020603050405020304" pitchFamily="18" charset="0"/>
+              <a:ea typeface="Times New Roman" panose="02020603050405020304" pitchFamily="18" charset="0"/>
+            </a:endParaRPr>
+          </a:p>
+          <a:p>
+            <a:pPr marL="742950" indent="-514350">
+              <a:lnSpc>
+                <a:spcPct val="100000"/>
+              </a:lnSpc>
+              <a:buFont typeface="+mj-lt"/>
+              <a:buAutoNum type="arabicParenR"/>
+            </a:pPr>
+            <a:r>
+              <a:rPr lang="ru-RU" sz="2600" dirty="0">
+                <a:effectLst/>
+                <a:latin typeface="Times New Roman" panose="02020603050405020304" pitchFamily="18" charset="0"/>
+                <a:ea typeface="Times New Roman" panose="02020603050405020304" pitchFamily="18" charset="0"/>
+              </a:rPr>
+              <a:t>исследованы характеристики разработанного метода.</a:t>
+            </a:r>
+          </a:p>
+        </p:txBody>
+      </p:sp>
+    </p:spTree>
+    <p:extLst>
+      <p:ext uri="{BB962C8B-B14F-4D97-AF65-F5344CB8AC3E}">
+        <p14:creationId xmlns:p14="http://schemas.microsoft.com/office/powerpoint/2010/main" val="1045649332"/>
+      </p:ext>
+    </p:extLst>
+  </p:cSld>
+  <p:clrMapOvr>
+    <a:masterClrMapping/>
+  </p:clrMapOvr>
+</p:sld>
+</file>
+
+<file path=ppt/slides/slide16.xml><?xml version="1.0" encoding="utf-8"?>
+<p:sld xmlns:a="http://schemas.openxmlformats.org/drawingml/2006/main" xmlns:r="http://schemas.openxmlformats.org/officeDocument/2006/relationships" xmlns:p="http://schemas.openxmlformats.org/presentationml/2006/main">
+  <p:cSld>
+    <p:spTree>
+      <p:nvGrpSpPr>
+        <p:cNvPr id="1" name=""/>
+        <p:cNvGrpSpPr/>
+        <p:nvPr/>
+      </p:nvGrpSpPr>
+      <p:grpSpPr>
+        <a:xfrm>
+          <a:off x="0" y="0"/>
+          <a:ext cx="0" cy="0"/>
+          <a:chOff x="0" y="0"/>
+          <a:chExt cx="0" cy="0"/>
+        </a:xfrm>
+      </p:grpSpPr>
+      <p:sp>
+        <p:nvSpPr>
+          <p:cNvPr id="2" name="Заголовок 1">
+            <a:extLst>
+              <a:ext uri="{FF2B5EF4-FFF2-40B4-BE49-F238E27FC236}">
+                <a16:creationId xmlns:a16="http://schemas.microsoft.com/office/drawing/2014/main" id="{1802D59D-6A83-151A-EEA2-678960399BE4}"/>
+              </a:ext>
+            </a:extLst>
+          </p:cNvPr>
+          <p:cNvSpPr>
+            <a:spLocks noGrp="1"/>
+          </p:cNvSpPr>
+          <p:nvPr>
+            <p:ph type="title"/>
+          </p:nvPr>
+        </p:nvSpPr>
+        <p:spPr>
+          <a:xfrm>
+            <a:off x="428017" y="0"/>
+            <a:ext cx="10515600" cy="863601"/>
+          </a:xfrm>
+        </p:spPr>
+        <p:txBody>
+          <a:bodyPr>
+            <a:normAutofit/>
+          </a:bodyPr>
+          <a:lstStyle/>
+          <a:p>
+            <a:r>
+              <a:rPr lang="ru-RU" sz="4000" b="1" dirty="0">
+                <a:effectLst/>
+                <a:ea typeface="Times New Roman" panose="02020603050405020304" pitchFamily="18" charset="0"/>
+              </a:rPr>
+              <a:t>Перспективы дальнейшего развития</a:t>
+            </a:r>
+            <a:endParaRPr lang="ru-RU" sz="4000" b="1" dirty="0"/>
+          </a:p>
+        </p:txBody>
+      </p:sp>
+      <p:sp>
+        <p:nvSpPr>
+          <p:cNvPr id="3" name="Номер слайда 2">
+            <a:extLst>
+              <a:ext uri="{FF2B5EF4-FFF2-40B4-BE49-F238E27FC236}">
+                <a16:creationId xmlns:a16="http://schemas.microsoft.com/office/drawing/2014/main" id="{EB930BD0-D85B-F112-101C-B409455C44FB}"/>
+              </a:ext>
+            </a:extLst>
+          </p:cNvPr>
+          <p:cNvSpPr>
+            <a:spLocks noGrp="1"/>
+          </p:cNvSpPr>
+          <p:nvPr>
+            <p:ph type="sldNum" sz="quarter" idx="12"/>
+          </p:nvPr>
+        </p:nvSpPr>
+        <p:spPr/>
+        <p:txBody>
+          <a:bodyPr/>
+          <a:lstStyle/>
+          <a:p>
+            <a:fld id="{E83D2FD5-BBDA-43D0-B172-791327EA2B6A}" type="slidenum">
+              <a:rPr lang="ru-RU" smtClean="0"/>
+              <a:t>16</a:t>
+            </a:fld>
+            <a:endParaRPr lang="ru-RU" dirty="0"/>
+          </a:p>
+        </p:txBody>
+      </p:sp>
+      <p:sp>
+        <p:nvSpPr>
+          <p:cNvPr id="5" name="Объект 2">
+            <a:extLst>
+              <a:ext uri="{FF2B5EF4-FFF2-40B4-BE49-F238E27FC236}">
+                <a16:creationId xmlns:a16="http://schemas.microsoft.com/office/drawing/2014/main" id="{02C33000-B0B7-4509-AD8C-600B0EFAA229}"/>
+              </a:ext>
+            </a:extLst>
+          </p:cNvPr>
+          <p:cNvSpPr>
+            <a:spLocks noGrp="1"/>
+          </p:cNvSpPr>
+          <p:nvPr>
+            <p:ph idx="1"/>
+          </p:nvPr>
+        </p:nvSpPr>
+        <p:spPr>
+          <a:xfrm>
+            <a:off x="428017" y="954783"/>
+            <a:ext cx="11182378" cy="5412912"/>
+          </a:xfrm>
+        </p:spPr>
+        <p:txBody>
+          <a:bodyPr>
+            <a:noAutofit/>
+          </a:bodyPr>
+          <a:lstStyle/>
+          <a:p>
             <a:pPr marL="685800" indent="-457200">
               <a:lnSpc>
                 <a:spcPct val="100000"/>
@@ -5869,7 +6299,7 @@
                 <a:latin typeface="Times New Roman" panose="02020603050405020304" pitchFamily="18" charset="0"/>
                 <a:ea typeface="Times New Roman" panose="02020603050405020304" pitchFamily="18" charset="0"/>
               </a:rPr>
-              <a:t>в</a:t>
+              <a:t>В</a:t>
             </a:r>
             <a:r>
               <a:rPr lang="ru-RU" sz="2600" dirty="0">
@@ -5877,7 +6307,7 @@
                 <a:latin typeface="Times New Roman" panose="02020603050405020304" pitchFamily="18" charset="0"/>
                 <a:ea typeface="Times New Roman" panose="02020603050405020304" pitchFamily="18" charset="0"/>
               </a:rPr>
-              <a:t>озможность предсказания следующей команды;</a:t>
+              <a:t>озможность предсказания следующей команды</a:t>
             </a:r>
           </a:p>
           <a:p>
@@ -5886,13 +6316,6 @@
                 <a:spcPct val="100000"/>
               </a:lnSpc>
             </a:pPr>
-            <a:r>
-              <a:rPr lang="ru-RU" sz="2600" dirty="0">
-                <a:latin typeface="Times New Roman" panose="02020603050405020304" pitchFamily="18" charset="0"/>
-                <a:ea typeface="Times New Roman" panose="02020603050405020304" pitchFamily="18" charset="0"/>
-              </a:rPr>
-              <a:t>подсчет процента содержания найденных последовательностей в сессиях или других характеристик для получения дополнительной информации;</a:t>
-            </a:r>
             <a:endParaRPr lang="ru-RU" sz="2600" dirty="0">
               <a:effectLst/>
               <a:latin typeface="Times New Roman" panose="02020603050405020304" pitchFamily="18" charset="0"/>
@@ -5910,7 +6333,33 @@
                 <a:latin typeface="Times New Roman" panose="02020603050405020304" pitchFamily="18" charset="0"/>
                 <a:ea typeface="Times New Roman" panose="02020603050405020304" pitchFamily="18" charset="0"/>
               </a:rPr>
-              <a:t>Что-то еще.</a:t>
+              <a:t>Подсчет процента содержания найденных последовательностей в сессиях или других характеристик для получения дополнительной информации</a:t>
+            </a:r>
+          </a:p>
+          <a:p>
+            <a:pPr marL="685800" indent="-457200">
+              <a:lnSpc>
+                <a:spcPct val="100000"/>
+              </a:lnSpc>
+            </a:pPr>
+            <a:endParaRPr lang="ru-RU" sz="2600" dirty="0">
+              <a:effectLst/>
+              <a:latin typeface="Times New Roman" panose="02020603050405020304" pitchFamily="18" charset="0"/>
+              <a:ea typeface="Times New Roman" panose="02020603050405020304" pitchFamily="18" charset="0"/>
+            </a:endParaRPr>
+          </a:p>
+          <a:p>
+            <a:pPr marL="685800" indent="-457200">
+              <a:lnSpc>
+                <a:spcPct val="100000"/>
+              </a:lnSpc>
+            </a:pPr>
+            <a:r>
+              <a:rPr lang="ru-RU" sz="2600" dirty="0">
+                <a:latin typeface="Times New Roman" panose="02020603050405020304" pitchFamily="18" charset="0"/>
+                <a:ea typeface="Times New Roman" panose="02020603050405020304" pitchFamily="18" charset="0"/>
+              </a:rPr>
+              <a:t>Оценка времени, необходимого для выполнения последовательности</a:t>
             </a:r>
             <a:endParaRPr lang="ru-RU" sz="2600" dirty="0">
               <a:effectLst/>
@@ -6032,8 +6481,8 @@
         </p:nvSpPr>
         <p:spPr>
           <a:xfrm>
-            <a:off x="428017" y="863601"/>
-            <a:ext cx="11182378" cy="5994398"/>
+            <a:off x="428017" y="961255"/>
+            <a:ext cx="11182378" cy="3883548"/>
           </a:xfrm>
         </p:spPr>
         <p:txBody>
@@ -6055,37 +6504,15 @@
               </a:rPr>
               <a:t>Оптимизация пользовательского опыта</a:t>
             </a:r>
-            <a:endParaRPr lang="en-US" sz="2600" dirty="0">
-              <a:effectLst/>
-              <a:latin typeface="Times New Roman" panose="02020603050405020304" pitchFamily="18" charset="0"/>
-              <a:ea typeface="Times New Roman" panose="02020603050405020304" pitchFamily="18" charset="0"/>
-            </a:endParaRPr>
-          </a:p>
-          <a:p>
-            <a:pPr marL="685800" indent="-457200">
+          </a:p>
+          <a:p>
+            <a:pPr indent="0">
               <a:lnSpc>
                 <a:spcPct val="100000"/>
               </a:lnSpc>
+              <a:buNone/>
             </a:pPr>
-            <a:r>
-              <a:rPr lang="ru-RU" sz="2600" dirty="0">
-                <a:solidFill>
-                  <a:schemeClr val="bg1">
-                    <a:lumMod val="50000"/>
-                  </a:schemeClr>
-                </a:solidFill>
-                <a:effectLst/>
-                <a:latin typeface="Times New Roman" panose="02020603050405020304" pitchFamily="18" charset="0"/>
-                <a:ea typeface="Times New Roman" panose="02020603050405020304" pitchFamily="18" charset="0"/>
-              </a:rPr>
-              <a:t>Выявление необычного или нежелательного поведения</a:t>
-            </a:r>
             <a:endParaRPr lang="en-US" sz="2600" dirty="0">
-              <a:solidFill>
-                <a:schemeClr val="bg1">
-                  <a:lumMod val="50000"/>
-                </a:schemeClr>
-              </a:solidFill>
               <a:effectLst/>
               <a:latin typeface="Times New Roman" panose="02020603050405020304" pitchFamily="18" charset="0"/>
               <a:ea typeface="Times New Roman" panose="02020603050405020304" pitchFamily="18" charset="0"/>
@@ -6104,6 +6531,34 @@
                 <a:ea typeface="Times New Roman" panose="02020603050405020304" pitchFamily="18" charset="0"/>
               </a:rPr>
               <a:t>Улучшение процесса разработки</a:t>
+            </a:r>
+          </a:p>
+          <a:p>
+            <a:pPr indent="0">
+              <a:lnSpc>
+                <a:spcPct val="100000"/>
+              </a:lnSpc>
+              <a:buNone/>
+            </a:pPr>
+            <a:endParaRPr lang="ru-RU" sz="2600" dirty="0">
+              <a:effectLst/>
+              <a:latin typeface="Times New Roman" panose="02020603050405020304" pitchFamily="18" charset="0"/>
+              <a:ea typeface="Times New Roman" panose="02020603050405020304" pitchFamily="18" charset="0"/>
+            </a:endParaRPr>
+          </a:p>
+          <a:p>
+            <a:pPr marL="685800" indent="-457200">
+              <a:lnSpc>
+                <a:spcPct val="100000"/>
+              </a:lnSpc>
+            </a:pPr>
+            <a:r>
+              <a:rPr lang="ru-RU" sz="2600" dirty="0">
+                <a:effectLst/>
+                <a:latin typeface="Times New Roman" panose="02020603050405020304" pitchFamily="18" charset="0"/>
+                <a:ea typeface="Times New Roman" panose="02020603050405020304" pitchFamily="18" charset="0"/>
+              </a:rPr>
+              <a:t>Выявление необычного или нежелательного поведения</a:t>
             </a:r>
             <a:endParaRPr lang="en-US" sz="2600" dirty="0">
               <a:effectLst/>
@@ -6672,7 +7127,7 @@
                 <a:latin typeface="Times New Roman" panose="02020603050405020304" pitchFamily="18" charset="0"/>
                 <a:ea typeface="Times New Roman" panose="02020603050405020304" pitchFamily="18" charset="0"/>
               </a:rPr>
-              <a:t>Данные о выполненных командах должны содержать информацию об их последовательности.</a:t>
+              <a:t>Данные о выполненных командах должны содержать информацию об их последовательности</a:t>
             </a:r>
           </a:p>
           <a:p>
@@ -6847,12 +7302,23 @@
           <a:p>
             <a:r>
               <a:rPr lang="ru-RU" sz="4000" b="1" dirty="0">
+                <a:solidFill>
+                  <a:schemeClr val="bg1">
+                    <a:lumMod val="50000"/>
+                  </a:schemeClr>
+                </a:solidFill>
                 <a:effectLst/>
                 <a:ea typeface="Times New Roman" panose="02020603050405020304" pitchFamily="18" charset="0"/>
               </a:rPr>
               <a:t>Характеристики последовательностей</a:t>
             </a:r>
-            <a:endParaRPr lang="ru-RU" sz="4000" b="1" dirty="0"/>
+            <a:endParaRPr lang="ru-RU" sz="4000" b="1" dirty="0">
+              <a:solidFill>
+                <a:schemeClr val="bg1">
+                  <a:lumMod val="50000"/>
+                </a:schemeClr>
+              </a:solidFill>
+            </a:endParaRPr>
           </a:p>
         </p:txBody>
       </p:sp>
@@ -6913,84 +7379,41 @@
           </a:bodyPr>
           <a:lstStyle/>
           <a:p>
-            <a:pPr indent="0">
+            <a:pPr marL="685800" indent="-457200">
               <a:lnSpc>
                 <a:spcPct val="100000"/>
               </a:lnSpc>
-              <a:buNone/>
             </a:pPr>
             <a:r>
-              <a:rPr lang="ru-RU" sz="2600" b="1" dirty="0">
+              <a:rPr lang="ru-RU" sz="2600" dirty="0">
+                <a:solidFill>
+                  <a:schemeClr val="bg1">
+                    <a:lumMod val="50000"/>
+                  </a:schemeClr>
+                </a:solidFill>
                 <a:latin typeface="Times New Roman" panose="02020603050405020304" pitchFamily="18" charset="0"/>
                 <a:ea typeface="Times New Roman" panose="02020603050405020304" pitchFamily="18" charset="0"/>
               </a:rPr>
-              <a:t>Значение</a:t>
-            </a:r>
-            <a:r>
-              <a:rPr lang="ru-RU" sz="2600" dirty="0">
-                <a:latin typeface="Times New Roman" panose="02020603050405020304" pitchFamily="18" charset="0"/>
-                <a:ea typeface="Times New Roman" panose="02020603050405020304" pitchFamily="18" charset="0"/>
-              </a:rPr>
-              <a:t> </a:t>
-            </a:r>
-            <a:r>
-              <a:rPr lang="ru-RU" sz="2600" b="1" dirty="0">
-                <a:latin typeface="Times New Roman" panose="02020603050405020304" pitchFamily="18" charset="0"/>
-                <a:ea typeface="Times New Roman" panose="02020603050405020304" pitchFamily="18" charset="0"/>
-              </a:rPr>
-              <a:t>поддержки</a:t>
-            </a:r>
-            <a:r>
-              <a:rPr lang="ru-RU" sz="2600" dirty="0">
-                <a:latin typeface="Times New Roman" panose="02020603050405020304" pitchFamily="18" charset="0"/>
-                <a:ea typeface="Times New Roman" panose="02020603050405020304" pitchFamily="18" charset="0"/>
-              </a:rPr>
-              <a:t> последовательности равно проценту сессий, которые ее поддерживают. </a:t>
-            </a:r>
-          </a:p>
-          <a:p>
-            <a:pPr indent="0">
+              <a:t>Уровень поддержки</a:t>
+            </a:r>
+          </a:p>
+          <a:p>
+            <a:pPr marL="685800" indent="-457200">
               <a:lnSpc>
                 <a:spcPct val="100000"/>
               </a:lnSpc>
-              <a:buNone/>
             </a:pPr>
             <a:r>
               <a:rPr lang="ru-RU" sz="2600" dirty="0">
-                <a:effectLst/>
-                <a:latin typeface="Times New Roman" panose="02020603050405020304" pitchFamily="18" charset="0"/>
-                <a:ea typeface="Times New Roman" panose="02020603050405020304" pitchFamily="18" charset="0"/>
-              </a:rPr>
-              <a:t>Сессия поддерживает</a:t>
-            </a:r>
-            <a:r>
-              <a:rPr lang="ru-RU" sz="2600" dirty="0">
-                <a:latin typeface="Times New Roman" panose="02020603050405020304" pitchFamily="18" charset="0"/>
-                <a:ea typeface="Times New Roman" panose="02020603050405020304" pitchFamily="18" charset="0"/>
-              </a:rPr>
-              <a:t> последовательность, если содержит все ее элементы в том же порядке и временной промежуток между каждыми двумя соседними командами удовлетворяет параметрам заданным пользователем.</a:t>
-            </a:r>
-          </a:p>
-          <a:p>
-            <a:pPr indent="0">
-              <a:lnSpc>
-                <a:spcPct val="100000"/>
-              </a:lnSpc>
-              <a:buNone/>
-            </a:pPr>
-            <a:r>
-              <a:rPr lang="ru-RU" sz="2600" b="1" dirty="0">
+                <a:solidFill>
+                  <a:schemeClr val="bg1">
+                    <a:lumMod val="50000"/>
+                  </a:schemeClr>
+                </a:solidFill>
                 <a:latin typeface="Times New Roman" panose="02020603050405020304" pitchFamily="18" charset="0"/>
                 <a:ea typeface="Times New Roman" panose="02020603050405020304" pitchFamily="18" charset="0"/>
               </a:rPr>
               <a:t>Коэффициент зависимости</a:t>
-            </a:r>
-            <a:r>
-              <a:rPr lang="ru-RU" sz="2600" dirty="0">
-                <a:latin typeface="Times New Roman" panose="02020603050405020304" pitchFamily="18" charset="0"/>
-                <a:ea typeface="Times New Roman" panose="02020603050405020304" pitchFamily="18" charset="0"/>
-              </a:rPr>
-              <a:t> показывает, насколько команды в последовательности зависят друг от друга и считается как отношение поддержки последовательности к произведению поддержек всех подпоследовательностей, состоящих из 1 команды. Если значение коэффициента &lt;= 1, значит зависимости нету. Если же &gt; 1, то зависимость есть. Чем больше единицы, тем вероятней то, что эти команды использовались вместе.</a:t>
             </a:r>
           </a:p>
         </p:txBody>
@@ -7055,13 +7478,10 @@
           <a:p>
             <a:r>
               <a:rPr lang="ru-RU" sz="4000" b="1" dirty="0">
-                <a:solidFill>
-                  <a:schemeClr val="bg1">
-                    <a:lumMod val="50000"/>
-                  </a:schemeClr>
-                </a:solidFill>
+                <a:effectLst/>
+                <a:ea typeface="Times New Roman" panose="02020603050405020304" pitchFamily="18" charset="0"/>
               </a:rPr>
-              <a:t>Ключевые этапы алгоритма</a:t>
+              <a:t>Уровень поддержки</a:t>
             </a:r>
           </a:p>
         </p:txBody>
@@ -7131,68 +7551,284 @@
             </a:pPr>
             <a:r>
               <a:rPr lang="ru-RU" sz="2600" dirty="0">
-                <a:solidFill>
-                  <a:schemeClr val="bg1">
-                    <a:lumMod val="50000"/>
-                  </a:schemeClr>
-                </a:solidFill>
-                <a:effectLst/>
                 <a:latin typeface="Times New Roman" panose="02020603050405020304" pitchFamily="18" charset="0"/>
                 <a:ea typeface="Times New Roman" panose="02020603050405020304" pitchFamily="18" charset="0"/>
               </a:rPr>
-              <a:t>Разработанный метод состоит из двух основных этапов:</a:t>
-            </a:r>
-          </a:p>
-          <a:p>
-            <a:pPr marL="742950" indent="-514350">
+              <a:t>Пусть есть сессия:</a:t>
+            </a:r>
+          </a:p>
+          <a:p>
+            <a:pPr marL="685800" indent="-457200">
               <a:lnSpc>
                 <a:spcPct val="100000"/>
               </a:lnSpc>
-              <a:buFont typeface="+mj-lt"/>
-              <a:buAutoNum type="arabicPeriod"/>
             </a:pPr>
+            <a:endParaRPr lang="ru-RU" sz="2600" dirty="0">
+              <a:latin typeface="Times New Roman" panose="02020603050405020304" pitchFamily="18" charset="0"/>
+              <a:ea typeface="Times New Roman" panose="02020603050405020304" pitchFamily="18" charset="0"/>
+            </a:endParaRPr>
+          </a:p>
+          <a:p>
+            <a:pPr marL="685800" indent="-457200">
+              <a:lnSpc>
+                <a:spcPct val="100000"/>
+              </a:lnSpc>
+            </a:pPr>
+            <a:endParaRPr lang="ru-RU" sz="2600" dirty="0">
+              <a:latin typeface="Times New Roman" panose="02020603050405020304" pitchFamily="18" charset="0"/>
+              <a:ea typeface="Times New Roman" panose="02020603050405020304" pitchFamily="18" charset="0"/>
+            </a:endParaRPr>
+          </a:p>
+          <a:p>
+            <a:pPr marL="685800" indent="-457200">
+              <a:lnSpc>
+                <a:spcPct val="100000"/>
+              </a:lnSpc>
+            </a:pPr>
+            <a:endParaRPr lang="ru-RU" sz="2600" dirty="0">
+              <a:latin typeface="Times New Roman" panose="02020603050405020304" pitchFamily="18" charset="0"/>
+              <a:ea typeface="Times New Roman" panose="02020603050405020304" pitchFamily="18" charset="0"/>
+            </a:endParaRPr>
+          </a:p>
+          <a:p>
+            <a:pPr indent="0">
+              <a:lnSpc>
+                <a:spcPct val="100000"/>
+              </a:lnSpc>
+              <a:buNone/>
+            </a:pPr>
             <a:r>
               <a:rPr lang="ru-RU" sz="2600" dirty="0">
-                <a:solidFill>
-                  <a:schemeClr val="bg1">
-                    <a:lumMod val="50000"/>
-                  </a:schemeClr>
-                </a:solidFill>
-                <a:effectLst/>
                 <a:latin typeface="Times New Roman" panose="02020603050405020304" pitchFamily="18" charset="0"/>
                 <a:ea typeface="Times New Roman" panose="02020603050405020304" pitchFamily="18" charset="0"/>
               </a:rPr>
-              <a:t>Генерация кандидатов.</a:t>
-            </a:r>
-          </a:p>
-          <a:p>
-            <a:pPr marL="742950" indent="-514350">
+              <a:t>Сессия не поддерживает пос-ть </a:t>
+            </a:r>
+            <a:r>
+              <a:rPr lang="en-US" sz="2600" dirty="0">
+                <a:latin typeface="Times New Roman" panose="02020603050405020304" pitchFamily="18" charset="0"/>
+                <a:ea typeface="Times New Roman" panose="02020603050405020304" pitchFamily="18" charset="0"/>
+              </a:rPr>
+              <a:t>&lt;</a:t>
+            </a:r>
+            <a:r>
+              <a:rPr lang="ru-RU" sz="2600" dirty="0">
+                <a:latin typeface="Times New Roman" panose="02020603050405020304" pitchFamily="18" charset="0"/>
+                <a:ea typeface="Times New Roman" panose="02020603050405020304" pitchFamily="18" charset="0"/>
+              </a:rPr>
+              <a:t>3</a:t>
+            </a:r>
+            <a:r>
+              <a:rPr lang="en-US" sz="2600" dirty="0">
+                <a:latin typeface="Times New Roman" panose="02020603050405020304" pitchFamily="18" charset="0"/>
+                <a:ea typeface="Times New Roman" panose="02020603050405020304" pitchFamily="18" charset="0"/>
+              </a:rPr>
+              <a:t>, 2, </a:t>
+            </a:r>
+            <a:r>
+              <a:rPr lang="ru-RU" sz="2600" dirty="0">
+                <a:latin typeface="Times New Roman" panose="02020603050405020304" pitchFamily="18" charset="0"/>
+                <a:ea typeface="Times New Roman" panose="02020603050405020304" pitchFamily="18" charset="0"/>
+              </a:rPr>
+              <a:t>1</a:t>
+            </a:r>
+            <a:r>
+              <a:rPr lang="en-US" sz="2600" dirty="0">
+                <a:latin typeface="Times New Roman" panose="02020603050405020304" pitchFamily="18" charset="0"/>
+                <a:ea typeface="Times New Roman" panose="02020603050405020304" pitchFamily="18" charset="0"/>
+              </a:rPr>
+              <a:t>&gt;</a:t>
+            </a:r>
+          </a:p>
+          <a:p>
+            <a:pPr indent="0">
               <a:lnSpc>
                 <a:spcPct val="100000"/>
               </a:lnSpc>
-              <a:buFont typeface="+mj-lt"/>
-              <a:buAutoNum type="arabicPeriod"/>
+              <a:buNone/>
             </a:pPr>
             <a:r>
               <a:rPr lang="ru-RU" sz="2600" dirty="0">
-                <a:solidFill>
-                  <a:schemeClr val="bg1">
-                    <a:lumMod val="50000"/>
-                  </a:schemeClr>
-                </a:solidFill>
-                <a:effectLst/>
                 <a:latin typeface="Times New Roman" panose="02020603050405020304" pitchFamily="18" charset="0"/>
                 <a:ea typeface="Times New Roman" panose="02020603050405020304" pitchFamily="18" charset="0"/>
               </a:rPr>
-              <a:t>Подсчет поддержки кандидатов.</a:t>
-            </a:r>
-          </a:p>
-        </p:txBody>
-      </p:sp>
+              <a:t>При </a:t>
+            </a:r>
+            <a:r>
+              <a:rPr lang="en-US" sz="2600" dirty="0">
+                <a:latin typeface="Times New Roman" panose="02020603050405020304" pitchFamily="18" charset="0"/>
+                <a:ea typeface="Times New Roman" panose="02020603050405020304" pitchFamily="18" charset="0"/>
+              </a:rPr>
+              <a:t>min_gap = </a:t>
+            </a:r>
+            <a:r>
+              <a:rPr lang="ru-RU" sz="2600" dirty="0">
+                <a:latin typeface="Times New Roman" panose="02020603050405020304" pitchFamily="18" charset="0"/>
+                <a:ea typeface="Times New Roman" panose="02020603050405020304" pitchFamily="18" charset="0"/>
+              </a:rPr>
+              <a:t>0</a:t>
+            </a:r>
+            <a:r>
+              <a:rPr lang="en-US" sz="2600" dirty="0">
+                <a:latin typeface="Times New Roman" panose="02020603050405020304" pitchFamily="18" charset="0"/>
+                <a:ea typeface="Times New Roman" panose="02020603050405020304" pitchFamily="18" charset="0"/>
+              </a:rPr>
+              <a:t>,</a:t>
+            </a:r>
+            <a:r>
+              <a:rPr lang="ru-RU" sz="2600" dirty="0">
+                <a:latin typeface="Times New Roman" panose="02020603050405020304" pitchFamily="18" charset="0"/>
+                <a:ea typeface="Times New Roman" panose="02020603050405020304" pitchFamily="18" charset="0"/>
+              </a:rPr>
+              <a:t> </a:t>
+            </a:r>
+            <a:r>
+              <a:rPr lang="en-US" sz="2600" dirty="0">
+                <a:latin typeface="Times New Roman" panose="02020603050405020304" pitchFamily="18" charset="0"/>
+                <a:ea typeface="Times New Roman" panose="02020603050405020304" pitchFamily="18" charset="0"/>
+              </a:rPr>
+              <a:t>max_gap =</a:t>
+            </a:r>
+            <a:r>
+              <a:rPr lang="ru-RU" sz="2600" dirty="0">
+                <a:latin typeface="Times New Roman" panose="02020603050405020304" pitchFamily="18" charset="0"/>
+                <a:ea typeface="Times New Roman" panose="02020603050405020304" pitchFamily="18" charset="0"/>
+              </a:rPr>
+              <a:t> </a:t>
+            </a:r>
+            <a:r>
+              <a:rPr lang="en-US" sz="2600" dirty="0">
+                <a:latin typeface="Times New Roman" panose="02020603050405020304" pitchFamily="18" charset="0"/>
+                <a:ea typeface="Times New Roman" panose="02020603050405020304" pitchFamily="18" charset="0"/>
+              </a:rPr>
+              <a:t>3</a:t>
+            </a:r>
+            <a:r>
+              <a:rPr lang="ru-RU" sz="2600" dirty="0">
+                <a:latin typeface="Times New Roman" panose="02020603050405020304" pitchFamily="18" charset="0"/>
+                <a:ea typeface="Times New Roman" panose="02020603050405020304" pitchFamily="18" charset="0"/>
+              </a:rPr>
+              <a:t> сессия поддерживает пос-ть </a:t>
+            </a:r>
+            <a:r>
+              <a:rPr lang="en-US" sz="2600" dirty="0">
+                <a:latin typeface="Times New Roman" panose="02020603050405020304" pitchFamily="18" charset="0"/>
+                <a:ea typeface="Times New Roman" panose="02020603050405020304" pitchFamily="18" charset="0"/>
+              </a:rPr>
+              <a:t>&lt;1, 2, 3&gt;</a:t>
+            </a:r>
+          </a:p>
+          <a:p>
+            <a:pPr indent="0">
+              <a:lnSpc>
+                <a:spcPct val="100000"/>
+              </a:lnSpc>
+              <a:buNone/>
+            </a:pPr>
+            <a:r>
+              <a:rPr lang="ru-RU" sz="2600" dirty="0">
+                <a:latin typeface="Times New Roman" panose="02020603050405020304" pitchFamily="18" charset="0"/>
+                <a:ea typeface="Times New Roman" panose="02020603050405020304" pitchFamily="18" charset="0"/>
+              </a:rPr>
+              <a:t>При </a:t>
+            </a:r>
+            <a:r>
+              <a:rPr lang="en-US" sz="2600" dirty="0">
+                <a:latin typeface="Times New Roman" panose="02020603050405020304" pitchFamily="18" charset="0"/>
+                <a:ea typeface="Times New Roman" panose="02020603050405020304" pitchFamily="18" charset="0"/>
+              </a:rPr>
+              <a:t>min_gap &gt; </a:t>
+            </a:r>
+            <a:r>
+              <a:rPr lang="ru-RU" sz="2600" dirty="0">
+                <a:latin typeface="Times New Roman" panose="02020603050405020304" pitchFamily="18" charset="0"/>
+                <a:ea typeface="Times New Roman" panose="02020603050405020304" pitchFamily="18" charset="0"/>
+              </a:rPr>
+              <a:t>0</a:t>
+            </a:r>
+            <a:r>
+              <a:rPr lang="en-US" sz="2600" dirty="0">
+                <a:latin typeface="Times New Roman" panose="02020603050405020304" pitchFamily="18" charset="0"/>
+                <a:ea typeface="Times New Roman" panose="02020603050405020304" pitchFamily="18" charset="0"/>
+              </a:rPr>
+              <a:t> </a:t>
+            </a:r>
+            <a:r>
+              <a:rPr lang="ru-RU" sz="2600" dirty="0">
+                <a:latin typeface="Times New Roman" panose="02020603050405020304" pitchFamily="18" charset="0"/>
+                <a:ea typeface="Times New Roman" panose="02020603050405020304" pitchFamily="18" charset="0"/>
+              </a:rPr>
+              <a:t>или </a:t>
+            </a:r>
+            <a:r>
+              <a:rPr lang="en-US" sz="2600" dirty="0">
+                <a:latin typeface="Times New Roman" panose="02020603050405020304" pitchFamily="18" charset="0"/>
+                <a:ea typeface="Times New Roman" panose="02020603050405020304" pitchFamily="18" charset="0"/>
+              </a:rPr>
+              <a:t>max_gap &lt; 3</a:t>
+            </a:r>
+            <a:r>
+              <a:rPr lang="ru-RU" sz="2600" dirty="0">
+                <a:latin typeface="Times New Roman" panose="02020603050405020304" pitchFamily="18" charset="0"/>
+                <a:ea typeface="Times New Roman" panose="02020603050405020304" pitchFamily="18" charset="0"/>
+              </a:rPr>
+              <a:t> сессия не поддерживает пос-ть </a:t>
+            </a:r>
+            <a:r>
+              <a:rPr lang="en-US" sz="2600" dirty="0">
+                <a:latin typeface="Times New Roman" panose="02020603050405020304" pitchFamily="18" charset="0"/>
+                <a:ea typeface="Times New Roman" panose="02020603050405020304" pitchFamily="18" charset="0"/>
+              </a:rPr>
+              <a:t>&lt;1, 2, </a:t>
+            </a:r>
+            <a:r>
+              <a:rPr lang="en-US" sz="2600">
+                <a:latin typeface="Times New Roman" panose="02020603050405020304" pitchFamily="18" charset="0"/>
+                <a:ea typeface="Times New Roman" panose="02020603050405020304" pitchFamily="18" charset="0"/>
+              </a:rPr>
+              <a:t>3&gt;</a:t>
+            </a:r>
+            <a:endParaRPr lang="en-US" sz="2600" dirty="0">
+              <a:latin typeface="Times New Roman" panose="02020603050405020304" pitchFamily="18" charset="0"/>
+              <a:ea typeface="Times New Roman" panose="02020603050405020304" pitchFamily="18" charset="0"/>
+            </a:endParaRPr>
+          </a:p>
+        </p:txBody>
+      </p:sp>
+      <p:pic>
+        <p:nvPicPr>
+          <p:cNvPr id="10" name="Рисунок 9">
+            <a:extLst>
+              <a:ext uri="{FF2B5EF4-FFF2-40B4-BE49-F238E27FC236}">
+                <a16:creationId xmlns:a16="http://schemas.microsoft.com/office/drawing/2014/main" id="{18FA217C-BB3C-469C-B80C-27E9FA6E074F}"/>
+              </a:ext>
+            </a:extLst>
+          </p:cNvPr>
+          <p:cNvPicPr>
+            <a:picLocks noChangeAspect="1"/>
+          </p:cNvPicPr>
+          <p:nvPr/>
+        </p:nvPicPr>
+        <p:blipFill>
+          <a:blip r:embed="rId3"/>
+          <a:stretch>
+            <a:fillRect/>
+          </a:stretch>
+        </p:blipFill>
+        <p:spPr>
+          <a:xfrm>
+            <a:off x="581605" y="1395276"/>
+            <a:ext cx="3203448" cy="1355816"/>
+          </a:xfrm>
+          <a:prstGeom prst="rect">
+            <a:avLst/>
+          </a:prstGeom>
+        </p:spPr>
+      </p:pic>
     </p:spTree>
     <p:extLst>
       <p:ext uri="{BB962C8B-B14F-4D97-AF65-F5344CB8AC3E}">
-        <p14:creationId xmlns:p14="http://schemas.microsoft.com/office/powerpoint/2010/main" val="1533887340"/>
+        <p14:creationId xmlns:p14="http://schemas.microsoft.com/office/powerpoint/2010/main" val="1861515205"/>
       </p:ext>
     </p:extLst>
   </p:cSld>
@@ -7248,8 +7884,11 @@
           <a:lstStyle/>
           <a:p>
             <a:r>
-              <a:rPr lang="ru-RU" sz="4000" b="1" dirty="0"/>
-              <a:t>Генерация кандидатов</a:t>
+              <a:rPr lang="ru-RU" sz="4000" b="1" dirty="0">
+                <a:effectLst/>
+                <a:ea typeface="Times New Roman" panose="02020603050405020304" pitchFamily="18" charset="0"/>
+              </a:rPr>
+              <a:t>Коэффициент зависимости</a:t>
             </a:r>
           </a:p>
         </p:txBody>
@@ -7283,46 +7922,349 @@
           </a:p>
         </p:txBody>
       </p:sp>
-      <p:pic>
-        <p:nvPicPr>
-          <p:cNvPr id="8" name="Рисунок 7">
-            <a:extLst>
-              <a:ext uri="{FF2B5EF4-FFF2-40B4-BE49-F238E27FC236}">
-                <a16:creationId xmlns:a16="http://schemas.microsoft.com/office/drawing/2014/main" id="{6AF78E23-D493-4862-A255-AD1BF5665867}"/>
-              </a:ext>
-            </a:extLst>
-          </p:cNvPr>
-          <p:cNvPicPr>
-            <a:picLocks noChangeAspect="1"/>
-          </p:cNvPicPr>
-          <p:nvPr/>
-        </p:nvPicPr>
-        <p:blipFill>
-          <a:blip r:embed="rId3">
-            <a:extLst>
-              <a:ext uri="{28A0092B-C50C-407E-A947-70E740481C1C}">
-                <a14:useLocalDpi xmlns:a14="http://schemas.microsoft.com/office/drawing/2010/main" val="0"/>
-              </a:ext>
-            </a:extLst>
-          </a:blip>
-          <a:stretch>
-            <a:fillRect/>
-          </a:stretch>
-        </p:blipFill>
-        <p:spPr>
-          <a:xfrm>
-            <a:off x="212659" y="954733"/>
-            <a:ext cx="11766681" cy="5401617"/>
-          </a:xfrm>
-          <a:prstGeom prst="rect">
-            <a:avLst/>
-          </a:prstGeom>
-        </p:spPr>
-      </p:pic>
+      <mc:AlternateContent xmlns:mc="http://schemas.openxmlformats.org/markup-compatibility/2006">
+        <mc:Choice xmlns:a14="http://schemas.microsoft.com/office/drawing/2010/main" Requires="a14">
+          <p:sp>
+            <p:nvSpPr>
+              <p:cNvPr id="5" name="Объект 2">
+                <a:extLst>
+                  <a:ext uri="{FF2B5EF4-FFF2-40B4-BE49-F238E27FC236}">
+                    <a16:creationId xmlns:a16="http://schemas.microsoft.com/office/drawing/2014/main" id="{02C33000-B0B7-4509-AD8C-600B0EFAA229}"/>
+                  </a:ext>
+                </a:extLst>
+              </p:cNvPr>
+              <p:cNvSpPr>
+                <a:spLocks noGrp="1"/>
+              </p:cNvSpPr>
+              <p:nvPr>
+                <p:ph idx="1"/>
+              </p:nvPr>
+            </p:nvSpPr>
+            <p:spPr>
+              <a:xfrm>
+                <a:off x="428017" y="863601"/>
+                <a:ext cx="11182378" cy="5994398"/>
+              </a:xfrm>
+            </p:spPr>
+            <p:txBody>
+              <a:bodyPr>
+                <a:noAutofit/>
+              </a:bodyPr>
+              <a:lstStyle/>
+              <a:p>
+                <a:pPr indent="0">
+                  <a:lnSpc>
+                    <a:spcPct val="100000"/>
+                  </a:lnSpc>
+                  <a:buNone/>
+                </a:pPr>
+                <a:r>
+                  <a:rPr lang="ru-RU" sz="2600" dirty="0">
+                    <a:latin typeface="Times New Roman" panose="02020603050405020304" pitchFamily="18" charset="0"/>
+                    <a:ea typeface="Times New Roman" panose="02020603050405020304" pitchFamily="18" charset="0"/>
+                  </a:rPr>
+                  <a:t>Пусть поддержка последовательности </a:t>
+                </a:r>
+                <a:r>
+                  <a:rPr lang="en-US" sz="2600" dirty="0">
+                    <a:latin typeface="Times New Roman" panose="02020603050405020304" pitchFamily="18" charset="0"/>
+                    <a:ea typeface="Times New Roman" panose="02020603050405020304" pitchFamily="18" charset="0"/>
+                  </a:rPr>
+                  <a:t>&lt;1, 2, 3&gt; </a:t>
+                </a:r>
+                <a:r>
+                  <a:rPr lang="ru-RU" sz="2600" dirty="0">
+                    <a:latin typeface="Times New Roman" panose="02020603050405020304" pitchFamily="18" charset="0"/>
+                    <a:ea typeface="Times New Roman" panose="02020603050405020304" pitchFamily="18" charset="0"/>
+                  </a:rPr>
+                  <a:t>равна </a:t>
+                </a:r>
+                <a:r>
+                  <a:rPr lang="en-US" sz="2600" dirty="0">
+                    <a:latin typeface="Times New Roman" panose="02020603050405020304" pitchFamily="18" charset="0"/>
+                    <a:ea typeface="Times New Roman" panose="02020603050405020304" pitchFamily="18" charset="0"/>
+                  </a:rPr>
+                  <a:t>0.5, </a:t>
+                </a:r>
+                <a:r>
+                  <a:rPr lang="ru-RU" sz="2600" dirty="0">
+                    <a:latin typeface="Times New Roman" panose="02020603050405020304" pitchFamily="18" charset="0"/>
+                    <a:ea typeface="Times New Roman" panose="02020603050405020304" pitchFamily="18" charset="0"/>
+                  </a:rPr>
+                  <a:t>а последовательностей </a:t>
+                </a:r>
+                <a:r>
+                  <a:rPr lang="en-US" sz="2600" dirty="0">
+                    <a:latin typeface="Times New Roman" panose="02020603050405020304" pitchFamily="18" charset="0"/>
+                    <a:ea typeface="Times New Roman" panose="02020603050405020304" pitchFamily="18" charset="0"/>
+                  </a:rPr>
+                  <a:t>&lt;1&gt;, &lt;2&gt; </a:t>
+                </a:r>
+                <a:r>
+                  <a:rPr lang="ru-RU" sz="2600" dirty="0">
+                    <a:latin typeface="Times New Roman" panose="02020603050405020304" pitchFamily="18" charset="0"/>
+                    <a:ea typeface="Times New Roman" panose="02020603050405020304" pitchFamily="18" charset="0"/>
+                  </a:rPr>
+                  <a:t>и </a:t>
+                </a:r>
+                <a:r>
+                  <a:rPr lang="en-US" sz="2600" dirty="0">
+                    <a:latin typeface="Times New Roman" panose="02020603050405020304" pitchFamily="18" charset="0"/>
+                    <a:ea typeface="Times New Roman" panose="02020603050405020304" pitchFamily="18" charset="0"/>
+                  </a:rPr>
+                  <a:t>&lt;3&gt; </a:t>
+                </a:r>
+                <a:r>
+                  <a:rPr lang="ru-RU" sz="2600" dirty="0">
+                    <a:latin typeface="Times New Roman" panose="02020603050405020304" pitchFamily="18" charset="0"/>
+                    <a:ea typeface="Times New Roman" panose="02020603050405020304" pitchFamily="18" charset="0"/>
+                  </a:rPr>
+                  <a:t>равны </a:t>
+                </a:r>
+                <a:r>
+                  <a:rPr lang="en-US" sz="2600" dirty="0">
+                    <a:latin typeface="Times New Roman" panose="02020603050405020304" pitchFamily="18" charset="0"/>
+                    <a:ea typeface="Times New Roman" panose="02020603050405020304" pitchFamily="18" charset="0"/>
+                  </a:rPr>
+                  <a:t>0.6, 0.8 </a:t>
+                </a:r>
+                <a:r>
+                  <a:rPr lang="ru-RU" sz="2600" dirty="0">
+                    <a:latin typeface="Times New Roman" panose="02020603050405020304" pitchFamily="18" charset="0"/>
+                    <a:ea typeface="Times New Roman" panose="02020603050405020304" pitchFamily="18" charset="0"/>
+                  </a:rPr>
+                  <a:t>и 1 соответственно</a:t>
+                </a:r>
+              </a:p>
+              <a:p>
+                <a:pPr indent="0">
+                  <a:lnSpc>
+                    <a:spcPct val="100000"/>
+                  </a:lnSpc>
+                  <a:buNone/>
+                </a:pPr>
+                <a:r>
+                  <a:rPr lang="ru-RU" sz="2600" dirty="0">
+                    <a:latin typeface="Times New Roman" panose="02020603050405020304" pitchFamily="18" charset="0"/>
+                    <a:ea typeface="Times New Roman" panose="02020603050405020304" pitchFamily="18" charset="0"/>
+                  </a:rPr>
+                  <a:t>В таком случае, коэффициент зависимости </a:t>
+                </a:r>
+                <a14:m>
+                  <m:oMath xmlns:m="http://schemas.openxmlformats.org/officeDocument/2006/math">
+                    <m:r>
+                      <a:rPr lang="en-US" sz="2600" b="0" i="1" smtClean="0">
+                        <a:latin typeface="Cambria Math" panose="02040503050406030204" pitchFamily="18" charset="0"/>
+                        <a:ea typeface="Times New Roman" panose="02020603050405020304" pitchFamily="18" charset="0"/>
+                      </a:rPr>
+                      <m:t>=</m:t>
+                    </m:r>
+                    <m:f>
+                      <m:fPr>
+                        <m:ctrlPr>
+                          <a:rPr lang="ru-RU" sz="2600" b="0" i="1" smtClean="0">
+                            <a:latin typeface="Cambria Math" panose="02040503050406030204" pitchFamily="18" charset="0"/>
+                          </a:rPr>
+                        </m:ctrlPr>
+                      </m:fPr>
+                      <m:num>
+                        <m:r>
+                          <a:rPr lang="ru-RU" sz="2600" b="0" i="1" smtClean="0">
+                            <a:latin typeface="Cambria Math" panose="02040503050406030204" pitchFamily="18" charset="0"/>
+                          </a:rPr>
+                          <m:t>0.5</m:t>
+                        </m:r>
+                      </m:num>
+                      <m:den>
+                        <m:r>
+                          <a:rPr lang="en-US" sz="2600" b="0" i="1" smtClean="0">
+                            <a:latin typeface="Cambria Math" panose="02040503050406030204" pitchFamily="18" charset="0"/>
+                          </a:rPr>
+                          <m:t>0.6</m:t>
+                        </m:r>
+                        <m:r>
+                          <a:rPr lang="en-US" sz="2600" b="0" i="1" smtClean="0">
+                            <a:latin typeface="Cambria Math" panose="02040503050406030204" pitchFamily="18" charset="0"/>
+                            <a:ea typeface="Cambria Math" panose="02040503050406030204" pitchFamily="18" charset="0"/>
+                          </a:rPr>
+                          <m:t>×</m:t>
+                        </m:r>
+                        <m:r>
+                          <a:rPr lang="en-US" sz="2600" b="0" i="1" smtClean="0">
+                            <a:latin typeface="Cambria Math" panose="02040503050406030204" pitchFamily="18" charset="0"/>
+                          </a:rPr>
+                          <m:t>0.8</m:t>
+                        </m:r>
+                        <m:r>
+                          <a:rPr lang="en-US" sz="2600" b="0" i="1" smtClean="0">
+                            <a:latin typeface="Cambria Math" panose="02040503050406030204" pitchFamily="18" charset="0"/>
+                            <a:ea typeface="Cambria Math" panose="02040503050406030204" pitchFamily="18" charset="0"/>
+                          </a:rPr>
+                          <m:t>×</m:t>
+                        </m:r>
+                        <m:r>
+                          <a:rPr lang="en-US" sz="2600" b="0" i="1" smtClean="0">
+                            <a:latin typeface="Cambria Math" panose="02040503050406030204" pitchFamily="18" charset="0"/>
+                          </a:rPr>
+                          <m:t>1</m:t>
+                        </m:r>
+                      </m:den>
+                    </m:f>
+                    <m:r>
+                      <a:rPr lang="en-US" sz="2600" b="0" i="1" smtClean="0">
+                        <a:latin typeface="Cambria Math" panose="02040503050406030204" pitchFamily="18" charset="0"/>
+                        <a:ea typeface="Cambria Math" panose="02040503050406030204" pitchFamily="18" charset="0"/>
+                      </a:rPr>
+                      <m:t>≈</m:t>
+                    </m:r>
+                    <m:r>
+                      <a:rPr lang="ru-RU" sz="2600" b="0" i="1" smtClean="0">
+                        <a:latin typeface="Cambria Math" panose="02040503050406030204" pitchFamily="18" charset="0"/>
+                      </a:rPr>
+                      <m:t>1.042</m:t>
+                    </m:r>
+                  </m:oMath>
+                </a14:m>
+                <a:endParaRPr lang="ru-RU" sz="2600" dirty="0">
+                  <a:latin typeface="Times New Roman" panose="02020603050405020304" pitchFamily="18" charset="0"/>
+                  <a:ea typeface="Times New Roman" panose="02020603050405020304" pitchFamily="18" charset="0"/>
+                </a:endParaRPr>
+              </a:p>
+              <a:p>
+                <a:pPr indent="0">
+                  <a:lnSpc>
+                    <a:spcPct val="100000"/>
+                  </a:lnSpc>
+                  <a:buNone/>
+                </a:pPr>
+                <a:endParaRPr lang="ru-RU" sz="2600" dirty="0">
+                  <a:latin typeface="Times New Roman" panose="02020603050405020304" pitchFamily="18" charset="0"/>
+                  <a:ea typeface="Times New Roman" panose="02020603050405020304" pitchFamily="18" charset="0"/>
+                </a:endParaRPr>
+              </a:p>
+              <a:p>
+                <a:pPr indent="0">
+                  <a:lnSpc>
+                    <a:spcPct val="100000"/>
+                  </a:lnSpc>
+                  <a:buNone/>
+                </a:pPr>
+                <a:r>
+                  <a:rPr lang="ru-RU" sz="2600" dirty="0">
+                    <a:latin typeface="Times New Roman" panose="02020603050405020304" pitchFamily="18" charset="0"/>
+                    <a:ea typeface="Times New Roman" panose="02020603050405020304" pitchFamily="18" charset="0"/>
+                  </a:rPr>
+                  <a:t>Если коэффициент </a:t>
+                </a:r>
+                <a:r>
+                  <a:rPr lang="en-US" sz="2600" dirty="0">
+                    <a:latin typeface="Times New Roman" panose="02020603050405020304" pitchFamily="18" charset="0"/>
+                    <a:ea typeface="Times New Roman" panose="02020603050405020304" pitchFamily="18" charset="0"/>
+                  </a:rPr>
+                  <a:t>&lt;</a:t>
+                </a:r>
+                <a:r>
+                  <a:rPr lang="ru-RU" sz="2600" dirty="0">
+                    <a:latin typeface="Times New Roman" panose="02020603050405020304" pitchFamily="18" charset="0"/>
+                    <a:ea typeface="Times New Roman" panose="02020603050405020304" pitchFamily="18" charset="0"/>
+                  </a:rPr>
+                  <a:t>= 1, то команды в последовательности независимы</a:t>
+                </a:r>
+              </a:p>
+              <a:p>
+                <a:pPr indent="0">
+                  <a:lnSpc>
+                    <a:spcPct val="100000"/>
+                  </a:lnSpc>
+                  <a:buNone/>
+                </a:pPr>
+                <a:r>
+                  <a:rPr lang="ru-RU" sz="2600" dirty="0">
+                    <a:latin typeface="Times New Roman" panose="02020603050405020304" pitchFamily="18" charset="0"/>
+                    <a:ea typeface="Times New Roman" panose="02020603050405020304" pitchFamily="18" charset="0"/>
+                  </a:rPr>
+                  <a:t>Если коэффициент </a:t>
+                </a:r>
+                <a:r>
+                  <a:rPr lang="en-US" sz="2600" dirty="0">
+                    <a:latin typeface="Times New Roman" panose="02020603050405020304" pitchFamily="18" charset="0"/>
+                    <a:ea typeface="Times New Roman" panose="02020603050405020304" pitchFamily="18" charset="0"/>
+                  </a:rPr>
+                  <a:t>&gt; 1, </a:t>
+                </a:r>
+                <a:r>
+                  <a:rPr lang="ru-RU" sz="2600" dirty="0">
+                    <a:latin typeface="Times New Roman" panose="02020603050405020304" pitchFamily="18" charset="0"/>
+                    <a:ea typeface="Times New Roman" panose="02020603050405020304" pitchFamily="18" charset="0"/>
+                  </a:rPr>
+                  <a:t>то</a:t>
+                </a:r>
+                <a:r>
+                  <a:rPr lang="en-US" sz="2600" dirty="0">
+                    <a:latin typeface="Times New Roman" panose="02020603050405020304" pitchFamily="18" charset="0"/>
+                    <a:ea typeface="Times New Roman" panose="02020603050405020304" pitchFamily="18" charset="0"/>
+                  </a:rPr>
+                  <a:t> </a:t>
+                </a:r>
+                <a:r>
+                  <a:rPr lang="ru-RU" sz="2600" dirty="0">
+                    <a:latin typeface="Times New Roman" panose="02020603050405020304" pitchFamily="18" charset="0"/>
+                    <a:ea typeface="Times New Roman" panose="02020603050405020304" pitchFamily="18" charset="0"/>
+                  </a:rPr>
+                  <a:t>зависимость есть</a:t>
+                </a:r>
+              </a:p>
+            </p:txBody>
+          </p:sp>
+        </mc:Choice>
+        <mc:Fallback>
+          <p:sp>
+            <p:nvSpPr>
+              <p:cNvPr id="5" name="Объект 2">
+                <a:extLst>
+                  <a:ext uri="{FF2B5EF4-FFF2-40B4-BE49-F238E27FC236}">
+                    <a16:creationId xmlns:a16="http://schemas.microsoft.com/office/drawing/2014/main" id="{02C33000-B0B7-4509-AD8C-600B0EFAA229}"/>
+                  </a:ext>
+                </a:extLst>
+              </p:cNvPr>
+              <p:cNvSpPr>
+                <a:spLocks noGrp="1" noRot="1" noChangeAspect="1" noMove="1" noResize="1" noEditPoints="1" noAdjustHandles="1" noChangeArrowheads="1" noChangeShapeType="1" noTextEdit="1"/>
+              </p:cNvSpPr>
+              <p:nvPr>
+                <p:ph idx="1"/>
+              </p:nvPr>
+            </p:nvSpPr>
+            <p:spPr>
+              <a:xfrm>
+                <a:off x="428017" y="863601"/>
+                <a:ext cx="11182378" cy="5994398"/>
+              </a:xfrm>
+              <a:blipFill>
+                <a:blip r:embed="rId3"/>
+                <a:stretch>
+                  <a:fillRect t="-1017"/>
+                </a:stretch>
+              </a:blipFill>
+            </p:spPr>
+            <p:txBody>
+              <a:bodyPr/>
+              <a:lstStyle/>
+              <a:p>
+                <a:r>
+                  <a:rPr lang="ru-RU">
+                    <a:noFill/>
+                  </a:rPr>
+                  <a:t> </a:t>
+                </a:r>
+              </a:p>
+            </p:txBody>
+          </p:sp>
+        </mc:Fallback>
+      </mc:AlternateContent>
     </p:spTree>
     <p:extLst>
       <p:ext uri="{BB962C8B-B14F-4D97-AF65-F5344CB8AC3E}">
-        <p14:creationId xmlns:p14="http://schemas.microsoft.com/office/powerpoint/2010/main" val="2884998727"/>
+        <p14:creationId xmlns:p14="http://schemas.microsoft.com/office/powerpoint/2010/main" val="3563752867"/>
       </p:ext>
     </p:extLst>
   </p:cSld>
@@ -7378,8 +8320,14 @@
           <a:lstStyle/>
           <a:p>
             <a:r>
-              <a:rPr lang="ru-RU" sz="4000" b="1" dirty="0"/>
-              <a:t>Проверка поддержки кандидата сессией</a:t>
+              <a:rPr lang="ru-RU" sz="4000" b="1" dirty="0">
+                <a:solidFill>
+                  <a:schemeClr val="bg1">
+                    <a:lumMod val="50000"/>
+                  </a:schemeClr>
+                </a:solidFill>
+              </a:rPr>
+              <a:t>Ключевые этапы алгоритма</a:t>
             </a:r>
           </a:p>
         </p:txBody>
@@ -7413,46 +8361,104 @@
           </a:p>
         </p:txBody>
       </p:sp>
-      <p:pic>
-        <p:nvPicPr>
-          <p:cNvPr id="10" name="Рисунок 9">
-            <a:extLst>
-              <a:ext uri="{FF2B5EF4-FFF2-40B4-BE49-F238E27FC236}">
-                <a16:creationId xmlns:a16="http://schemas.microsoft.com/office/drawing/2014/main" id="{581815B5-8490-4C22-A79B-494F79BC9F15}"/>
-              </a:ext>
-            </a:extLst>
-          </p:cNvPr>
-          <p:cNvPicPr>
-            <a:picLocks noChangeAspect="1"/>
-          </p:cNvPicPr>
-          <p:nvPr/>
-        </p:nvPicPr>
-        <p:blipFill>
-          <a:blip r:embed="rId3">
-            <a:extLst>
-              <a:ext uri="{28A0092B-C50C-407E-A947-70E740481C1C}">
-                <a14:useLocalDpi xmlns:a14="http://schemas.microsoft.com/office/drawing/2010/main" val="0"/>
-              </a:ext>
-            </a:extLst>
-          </a:blip>
-          <a:stretch>
-            <a:fillRect/>
-          </a:stretch>
-        </p:blipFill>
+      <p:sp>
+        <p:nvSpPr>
+          <p:cNvPr id="5" name="Объект 2">
+            <a:extLst>
+              <a:ext uri="{FF2B5EF4-FFF2-40B4-BE49-F238E27FC236}">
+                <a16:creationId xmlns:a16="http://schemas.microsoft.com/office/drawing/2014/main" id="{02C33000-B0B7-4509-AD8C-600B0EFAA229}"/>
+              </a:ext>
+            </a:extLst>
+          </p:cNvPr>
+          <p:cNvSpPr>
+            <a:spLocks noGrp="1"/>
+          </p:cNvSpPr>
+          <p:nvPr>
+            <p:ph idx="1"/>
+          </p:nvPr>
+        </p:nvSpPr>
         <p:spPr>
           <a:xfrm>
-            <a:off x="1431260" y="863601"/>
-            <a:ext cx="8509114" cy="5860444"/>
+            <a:off x="428017" y="863601"/>
+            <a:ext cx="11182378" cy="5994398"/>
           </a:xfrm>
-          <a:prstGeom prst="rect">
-            <a:avLst/>
-          </a:prstGeom>
         </p:spPr>
-      </p:pic>
+        <p:txBody>
+          <a:bodyPr>
+            <a:noAutofit/>
+          </a:bodyPr>
+          <a:lstStyle/>
+          <a:p>
+            <a:pPr indent="0">
+              <a:lnSpc>
+                <a:spcPct val="100000"/>
+              </a:lnSpc>
+              <a:buNone/>
+            </a:pPr>
+            <a:r>
+              <a:rPr lang="ru-RU" sz="2600" dirty="0">
+                <a:solidFill>
+                  <a:schemeClr val="bg1">
+                    <a:lumMod val="50000"/>
+                  </a:schemeClr>
+                </a:solidFill>
+                <a:effectLst/>
+                <a:latin typeface="Times New Roman" panose="02020603050405020304" pitchFamily="18" charset="0"/>
+                <a:ea typeface="Times New Roman" panose="02020603050405020304" pitchFamily="18" charset="0"/>
+              </a:rPr>
+              <a:t>Разработанный метод состоит из двух основных этапов:</a:t>
+            </a:r>
+          </a:p>
+          <a:p>
+            <a:pPr marL="742950" indent="-514350">
+              <a:lnSpc>
+                <a:spcPct val="100000"/>
+              </a:lnSpc>
+              <a:buFont typeface="+mj-lt"/>
+              <a:buAutoNum type="arabicPeriod"/>
+            </a:pPr>
+            <a:r>
+              <a:rPr lang="ru-RU" sz="2600" dirty="0">
+                <a:solidFill>
+                  <a:schemeClr val="bg1">
+                    <a:lumMod val="50000"/>
+                  </a:schemeClr>
+                </a:solidFill>
+                <a:effectLst/>
+                <a:latin typeface="Times New Roman" panose="02020603050405020304" pitchFamily="18" charset="0"/>
+                <a:ea typeface="Times New Roman" panose="02020603050405020304" pitchFamily="18" charset="0"/>
+              </a:rPr>
+              <a:t>Генерация кандидатов.</a:t>
+            </a:r>
+          </a:p>
+          <a:p>
+            <a:pPr marL="742950" indent="-514350">
+              <a:lnSpc>
+                <a:spcPct val="100000"/>
+              </a:lnSpc>
+              <a:buFont typeface="+mj-lt"/>
+              <a:buAutoNum type="arabicPeriod"/>
+            </a:pPr>
+            <a:r>
+              <a:rPr lang="ru-RU" sz="2600" dirty="0">
+                <a:solidFill>
+                  <a:schemeClr val="bg1">
+                    <a:lumMod val="50000"/>
+                  </a:schemeClr>
+                </a:solidFill>
+                <a:effectLst/>
+                <a:latin typeface="Times New Roman" panose="02020603050405020304" pitchFamily="18" charset="0"/>
+                <a:ea typeface="Times New Roman" panose="02020603050405020304" pitchFamily="18" charset="0"/>
+              </a:rPr>
+              <a:t>Подсчет поддержки кандидатов.</a:t>
+            </a:r>
+          </a:p>
+        </p:txBody>
+      </p:sp>
     </p:spTree>
     <p:extLst>
       <p:ext uri="{BB962C8B-B14F-4D97-AF65-F5344CB8AC3E}">
-        <p14:creationId xmlns:p14="http://schemas.microsoft.com/office/powerpoint/2010/main" val="1246671588"/>
+        <p14:creationId xmlns:p14="http://schemas.microsoft.com/office/powerpoint/2010/main" val="1533887340"/>
       </p:ext>
     </p:extLst>
   </p:cSld>

</xml_diff>